<commit_message>
Updated with security group
</commit_message>
<xml_diff>
--- a/Infrastructure/Network_Architect.pptx
+++ b/Infrastructure/Network_Architect.pptx
@@ -7,6 +7,7 @@
   <p:sldIdLst>
     <p:sldId id="471" r:id="rId2"/>
     <p:sldId id="470" r:id="rId3"/>
+    <p:sldId id="472" r:id="rId4"/>
   </p:sldIdLst>
   <p:sldSz cx="12192000" cy="6858000"/>
   <p:notesSz cx="6858000" cy="9144000"/>
@@ -105,6 +106,11 @@
       </a:defRPr>
     </a:lvl9pPr>
   </p:defaultTextStyle>
+  <p:extLst>
+    <p:ext uri="{EFAFB233-063F-42B5-8137-9DF3F51BA10A}">
+      <p15:sldGuideLst xmlns:p15="http://schemas.microsoft.com/office/powerpoint/2012/main"/>
+    </p:ext>
+  </p:extLst>
 </p:presentation>
 </file>
 
@@ -13732,6 +13738,2617 @@
 </p:sld>
 </file>
 
+<file path=ppt/slides/slide3.xml><?xml version="1.0" encoding="utf-8"?>
+<p:sld xmlns:a="http://schemas.openxmlformats.org/drawingml/2006/main" xmlns:r="http://schemas.openxmlformats.org/officeDocument/2006/relationships" xmlns:p="http://schemas.openxmlformats.org/presentationml/2006/main">
+  <p:cSld>
+    <p:spTree>
+      <p:nvGrpSpPr>
+        <p:cNvPr id="1" name=""/>
+        <p:cNvGrpSpPr/>
+        <p:nvPr/>
+      </p:nvGrpSpPr>
+      <p:grpSpPr>
+        <a:xfrm>
+          <a:off x="0" y="0"/>
+          <a:ext cx="0" cy="0"/>
+          <a:chOff x="0" y="0"/>
+          <a:chExt cx="0" cy="0"/>
+        </a:xfrm>
+      </p:grpSpPr>
+      <p:sp>
+        <p:nvSpPr>
+          <p:cNvPr id="47117" name="Slide Number Placeholder 37">
+            <a:extLst>
+              <a:ext uri="{FF2B5EF4-FFF2-40B4-BE49-F238E27FC236}">
+                <a16:creationId xmlns:a16="http://schemas.microsoft.com/office/drawing/2014/main" id="{2E567938-C0BD-E540-B624-F078B8BCE8A1}"/>
+              </a:ext>
+            </a:extLst>
+          </p:cNvPr>
+          <p:cNvSpPr>
+            <a:spLocks noGrp="1" noChangeArrowheads="1"/>
+          </p:cNvSpPr>
+          <p:nvPr>
+            <p:ph type="sldNum" sz="quarter" idx="4"/>
+          </p:nvPr>
+        </p:nvSpPr>
+        <p:spPr bwMode="auto">
+          <a:noFill/>
+          <a:extLst>
+            <a:ext uri="{909E8E84-426E-40DD-AFC4-6F175D3DCCD1}">
+              <a14:hiddenFill xmlns:a14="http://schemas.microsoft.com/office/drawing/2010/main">
+                <a:solidFill>
+                  <a:srgbClr val="FFFFFF"/>
+                </a:solidFill>
+              </a14:hiddenFill>
+            </a:ext>
+            <a:ext uri="{91240B29-F687-4F45-9708-019B960494DF}">
+              <a14:hiddenLine xmlns:a14="http://schemas.microsoft.com/office/drawing/2010/main" w="9525">
+                <a:solidFill>
+                  <a:srgbClr val="000000"/>
+                </a:solidFill>
+                <a:miter lim="800000"/>
+                <a:headEnd/>
+                <a:tailEnd/>
+              </a14:hiddenLine>
+            </a:ext>
+          </a:extLst>
+        </p:spPr>
+        <p:txBody>
+          <a:bodyPr wrap="square" numCol="1" anchorCtr="0" compatLnSpc="1">
+            <a:prstTxWarp prst="textNoShape">
+              <a:avLst/>
+            </a:prstTxWarp>
+          </a:bodyPr>
+          <a:lstStyle>
+            <a:lvl1pPr>
+              <a:defRPr>
+                <a:solidFill>
+                  <a:schemeClr val="tx1"/>
+                </a:solidFill>
+                <a:latin typeface="Calibri" panose="020F0502020204030204" pitchFamily="34" charset="0"/>
+              </a:defRPr>
+            </a:lvl1pPr>
+            <a:lvl2pPr marL="742950" indent="-285750">
+              <a:defRPr>
+                <a:solidFill>
+                  <a:schemeClr val="tx1"/>
+                </a:solidFill>
+                <a:latin typeface="Calibri" panose="020F0502020204030204" pitchFamily="34" charset="0"/>
+              </a:defRPr>
+            </a:lvl2pPr>
+            <a:lvl3pPr marL="1143000" indent="-228600">
+              <a:defRPr>
+                <a:solidFill>
+                  <a:schemeClr val="tx1"/>
+                </a:solidFill>
+                <a:latin typeface="Calibri" panose="020F0502020204030204" pitchFamily="34" charset="0"/>
+              </a:defRPr>
+            </a:lvl3pPr>
+            <a:lvl4pPr marL="1600200" indent="-228600">
+              <a:defRPr>
+                <a:solidFill>
+                  <a:schemeClr val="tx1"/>
+                </a:solidFill>
+                <a:latin typeface="Calibri" panose="020F0502020204030204" pitchFamily="34" charset="0"/>
+              </a:defRPr>
+            </a:lvl4pPr>
+            <a:lvl5pPr marL="2057400" indent="-228600">
+              <a:defRPr>
+                <a:solidFill>
+                  <a:schemeClr val="tx1"/>
+                </a:solidFill>
+                <a:latin typeface="Calibri" panose="020F0502020204030204" pitchFamily="34" charset="0"/>
+              </a:defRPr>
+            </a:lvl5pPr>
+            <a:lvl6pPr marL="2514600" indent="-228600" eaLnBrk="0" fontAlgn="base" hangingPunct="0">
+              <a:spcBef>
+                <a:spcPct val="0"/>
+              </a:spcBef>
+              <a:spcAft>
+                <a:spcPct val="0"/>
+              </a:spcAft>
+              <a:defRPr>
+                <a:solidFill>
+                  <a:schemeClr val="tx1"/>
+                </a:solidFill>
+                <a:latin typeface="Calibri" panose="020F0502020204030204" pitchFamily="34" charset="0"/>
+              </a:defRPr>
+            </a:lvl6pPr>
+            <a:lvl7pPr marL="2971800" indent="-228600" eaLnBrk="0" fontAlgn="base" hangingPunct="0">
+              <a:spcBef>
+                <a:spcPct val="0"/>
+              </a:spcBef>
+              <a:spcAft>
+                <a:spcPct val="0"/>
+              </a:spcAft>
+              <a:defRPr>
+                <a:solidFill>
+                  <a:schemeClr val="tx1"/>
+                </a:solidFill>
+                <a:latin typeface="Calibri" panose="020F0502020204030204" pitchFamily="34" charset="0"/>
+              </a:defRPr>
+            </a:lvl7pPr>
+            <a:lvl8pPr marL="3429000" indent="-228600" eaLnBrk="0" fontAlgn="base" hangingPunct="0">
+              <a:spcBef>
+                <a:spcPct val="0"/>
+              </a:spcBef>
+              <a:spcAft>
+                <a:spcPct val="0"/>
+              </a:spcAft>
+              <a:defRPr>
+                <a:solidFill>
+                  <a:schemeClr val="tx1"/>
+                </a:solidFill>
+                <a:latin typeface="Calibri" panose="020F0502020204030204" pitchFamily="34" charset="0"/>
+              </a:defRPr>
+            </a:lvl8pPr>
+            <a:lvl9pPr marL="3886200" indent="-228600" eaLnBrk="0" fontAlgn="base" hangingPunct="0">
+              <a:spcBef>
+                <a:spcPct val="0"/>
+              </a:spcBef>
+              <a:spcAft>
+                <a:spcPct val="0"/>
+              </a:spcAft>
+              <a:defRPr>
+                <a:solidFill>
+                  <a:schemeClr val="tx1"/>
+                </a:solidFill>
+                <a:latin typeface="Calibri" panose="020F0502020204030204" pitchFamily="34" charset="0"/>
+              </a:defRPr>
+            </a:lvl9pPr>
+          </a:lstStyle>
+          <a:p>
+            <a:pPr marL="0" marR="0" lvl="0" indent="0" algn="r" defTabSz="914400" rtl="0" eaLnBrk="0" fontAlgn="base" latinLnBrk="0" hangingPunct="0">
+              <a:lnSpc>
+                <a:spcPct val="100000"/>
+              </a:lnSpc>
+              <a:spcBef>
+                <a:spcPct val="0"/>
+              </a:spcBef>
+              <a:spcAft>
+                <a:spcPct val="0"/>
+              </a:spcAft>
+              <a:buClrTx/>
+              <a:buSzTx/>
+              <a:buFontTx/>
+              <a:buNone/>
+              <a:tabLst/>
+              <a:defRPr/>
+            </a:pPr>
+            <a:fld id="{006A2D43-0584-8040-91B5-2138A277CB9C}" type="slidenum">
+              <a:rPr kumimoji="0" lang="en-US" altLang="en-US" sz="1200" b="0" i="0" u="none" strike="noStrike" kern="1200" cap="none" spc="0" normalizeH="0" baseline="0" noProof="0" smtClean="0">
+                <a:ln>
+                  <a:noFill/>
+                </a:ln>
+                <a:solidFill>
+                  <a:prstClr val="white"/>
+                </a:solidFill>
+                <a:effectLst/>
+                <a:uLnTx/>
+                <a:uFillTx/>
+                <a:latin typeface="Arial" panose="020B0604020202020204" pitchFamily="34" charset="0"/>
+                <a:ea typeface="+mn-ea"/>
+                <a:cs typeface="Arial" panose="020B0604020202020204" pitchFamily="34" charset="0"/>
+              </a:rPr>
+              <a:pPr marL="0" marR="0" lvl="0" indent="0" algn="r" defTabSz="914400" rtl="0" eaLnBrk="0" fontAlgn="base" latinLnBrk="0" hangingPunct="0">
+                <a:lnSpc>
+                  <a:spcPct val="100000"/>
+                </a:lnSpc>
+                <a:spcBef>
+                  <a:spcPct val="0"/>
+                </a:spcBef>
+                <a:spcAft>
+                  <a:spcPct val="0"/>
+                </a:spcAft>
+                <a:buClrTx/>
+                <a:buSzTx/>
+                <a:buFontTx/>
+                <a:buNone/>
+                <a:tabLst/>
+                <a:defRPr/>
+              </a:pPr>
+              <a:t>3</a:t>
+            </a:fld>
+            <a:endParaRPr kumimoji="0" lang="en-US" altLang="en-US" sz="1200" b="0" i="0" u="none" strike="noStrike" kern="1200" cap="none" spc="0" normalizeH="0" baseline="0" noProof="0" dirty="0">
+              <a:ln>
+                <a:noFill/>
+              </a:ln>
+              <a:solidFill>
+                <a:prstClr val="white"/>
+              </a:solidFill>
+              <a:effectLst/>
+              <a:uLnTx/>
+              <a:uFillTx/>
+              <a:latin typeface="Arial" panose="020B0604020202020204" pitchFamily="34" charset="0"/>
+              <a:ea typeface="+mn-ea"/>
+              <a:cs typeface="Arial" panose="020B0604020202020204" pitchFamily="34" charset="0"/>
+            </a:endParaRPr>
+          </a:p>
+        </p:txBody>
+      </p:sp>
+      <p:sp>
+        <p:nvSpPr>
+          <p:cNvPr id="47105" name="Title 1">
+            <a:extLst>
+              <a:ext uri="{FF2B5EF4-FFF2-40B4-BE49-F238E27FC236}">
+                <a16:creationId xmlns:a16="http://schemas.microsoft.com/office/drawing/2014/main" id="{6EA39E97-4C97-AD40-972C-394E863845C9}"/>
+              </a:ext>
+            </a:extLst>
+          </p:cNvPr>
+          <p:cNvSpPr>
+            <a:spLocks noGrp="1" noChangeArrowheads="1"/>
+          </p:cNvSpPr>
+          <p:nvPr>
+            <p:ph type="title"/>
+          </p:nvPr>
+        </p:nvSpPr>
+        <p:spPr/>
+        <p:txBody>
+          <a:bodyPr/>
+          <a:lstStyle/>
+          <a:p>
+            <a:pPr eaLnBrk="1" hangingPunct="1"/>
+            <a:r>
+              <a:rPr lang="en-US" altLang="en-US" dirty="0"/>
+              <a:t>SECURITY_GROUP_1</a:t>
+            </a:r>
+          </a:p>
+        </p:txBody>
+      </p:sp>
+      <p:sp>
+        <p:nvSpPr>
+          <p:cNvPr id="48" name="Rectangle 47">
+            <a:extLst>
+              <a:ext uri="{FF2B5EF4-FFF2-40B4-BE49-F238E27FC236}">
+                <a16:creationId xmlns:a16="http://schemas.microsoft.com/office/drawing/2014/main" id="{D4ED084E-134F-3C43-88B0-C497DC66EF56}"/>
+              </a:ext>
+            </a:extLst>
+          </p:cNvPr>
+          <p:cNvSpPr/>
+          <p:nvPr/>
+        </p:nvSpPr>
+        <p:spPr>
+          <a:xfrm>
+            <a:off x="1427369" y="2088481"/>
+            <a:ext cx="6831151" cy="3394919"/>
+          </a:xfrm>
+          <a:prstGeom prst="rect">
+            <a:avLst/>
+          </a:prstGeom>
+          <a:noFill/>
+          <a:ln w="12700">
+            <a:solidFill>
+              <a:schemeClr val="accent6"/>
+            </a:solidFill>
+          </a:ln>
+        </p:spPr>
+        <p:style>
+          <a:lnRef idx="2">
+            <a:schemeClr val="accent1">
+              <a:shade val="50000"/>
+            </a:schemeClr>
+          </a:lnRef>
+          <a:fillRef idx="1">
+            <a:schemeClr val="accent1"/>
+          </a:fillRef>
+          <a:effectRef idx="0">
+            <a:schemeClr val="accent1"/>
+          </a:effectRef>
+          <a:fontRef idx="minor">
+            <a:schemeClr val="lt1"/>
+          </a:fontRef>
+        </p:style>
+        <p:txBody>
+          <a:bodyPr rot="0" spcFirstLastPara="0" vertOverflow="overflow" horzOverflow="overflow" vert="horz" wrap="square" lIns="457200" tIns="91440" rIns="91440" bIns="45720" numCol="1" spcCol="0" rtlCol="0" fromWordArt="0" anchor="t" anchorCtr="0" forceAA="0" compatLnSpc="1">
+            <a:prstTxWarp prst="textNoShape">
+              <a:avLst/>
+            </a:prstTxWarp>
+            <a:noAutofit/>
+          </a:bodyPr>
+          <a:lstStyle/>
+          <a:p>
+            <a:pPr marL="0" marR="0" lvl="0" indent="0" algn="l" defTabSz="914400" rtl="0" eaLnBrk="0" fontAlgn="base" latinLnBrk="0" hangingPunct="0">
+              <a:lnSpc>
+                <a:spcPct val="100000"/>
+              </a:lnSpc>
+              <a:spcBef>
+                <a:spcPct val="0"/>
+              </a:spcBef>
+              <a:spcAft>
+                <a:spcPct val="0"/>
+              </a:spcAft>
+              <a:buClrTx/>
+              <a:buSzTx/>
+              <a:buFontTx/>
+              <a:buNone/>
+              <a:tabLst/>
+              <a:defRPr/>
+            </a:pPr>
+            <a:r>
+              <a:rPr kumimoji="0" lang="en-US" sz="1200" b="0" i="0" u="none" strike="noStrike" kern="1200" cap="none" spc="0" normalizeH="0" baseline="0" noProof="0" dirty="0">
+                <a:ln w="0"/>
+                <a:solidFill>
+                  <a:srgbClr val="70AD47"/>
+                </a:solidFill>
+                <a:effectLst/>
+                <a:uLnTx/>
+                <a:uFillTx/>
+                <a:latin typeface="Arial" panose="020B0604020202020204" pitchFamily="34" charset="0"/>
+                <a:ea typeface="+mn-ea"/>
+                <a:cs typeface="Arial" panose="020B0604020202020204" pitchFamily="34" charset="0"/>
+              </a:rPr>
+              <a:t>VPC</a:t>
+            </a:r>
+          </a:p>
+        </p:txBody>
+      </p:sp>
+      <p:sp>
+        <p:nvSpPr>
+          <p:cNvPr id="49" name="Rectangle 48">
+            <a:extLst>
+              <a:ext uri="{FF2B5EF4-FFF2-40B4-BE49-F238E27FC236}">
+                <a16:creationId xmlns:a16="http://schemas.microsoft.com/office/drawing/2014/main" id="{C4B84CB2-3636-3247-BF16-7F5D8F01E041}"/>
+              </a:ext>
+            </a:extLst>
+          </p:cNvPr>
+          <p:cNvSpPr/>
+          <p:nvPr/>
+        </p:nvSpPr>
+        <p:spPr>
+          <a:xfrm>
+            <a:off x="1353758" y="1209216"/>
+            <a:ext cx="7167409" cy="4715862"/>
+          </a:xfrm>
+          <a:prstGeom prst="rect">
+            <a:avLst/>
+          </a:prstGeom>
+          <a:noFill/>
+          <a:ln w="12700">
+            <a:solidFill>
+              <a:srgbClr val="FAFAFA"/>
+            </a:solidFill>
+          </a:ln>
+        </p:spPr>
+        <p:style>
+          <a:lnRef idx="2">
+            <a:schemeClr val="accent1">
+              <a:shade val="50000"/>
+            </a:schemeClr>
+          </a:lnRef>
+          <a:fillRef idx="1">
+            <a:schemeClr val="accent1"/>
+          </a:fillRef>
+          <a:effectRef idx="0">
+            <a:schemeClr val="accent1"/>
+          </a:effectRef>
+          <a:fontRef idx="minor">
+            <a:schemeClr val="lt1"/>
+          </a:fontRef>
+        </p:style>
+        <p:txBody>
+          <a:bodyPr rot="0" spcFirstLastPara="0" vertOverflow="overflow" horzOverflow="overflow" vert="horz" wrap="square" lIns="457200" tIns="91440" rIns="91440" bIns="45720" numCol="1" spcCol="0" rtlCol="0" fromWordArt="0" anchor="t" anchorCtr="0" forceAA="0" compatLnSpc="1">
+            <a:prstTxWarp prst="textNoShape">
+              <a:avLst/>
+            </a:prstTxWarp>
+            <a:noAutofit/>
+          </a:bodyPr>
+          <a:lstStyle/>
+          <a:p>
+            <a:pPr marL="0" marR="0" lvl="0" indent="0" algn="l" defTabSz="914400" rtl="0" eaLnBrk="0" fontAlgn="base" latinLnBrk="0" hangingPunct="0">
+              <a:lnSpc>
+                <a:spcPct val="100000"/>
+              </a:lnSpc>
+              <a:spcBef>
+                <a:spcPct val="0"/>
+              </a:spcBef>
+              <a:spcAft>
+                <a:spcPct val="0"/>
+              </a:spcAft>
+              <a:buClrTx/>
+              <a:buSzTx/>
+              <a:buFontTx/>
+              <a:buNone/>
+              <a:tabLst/>
+              <a:defRPr/>
+            </a:pPr>
+            <a:r>
+              <a:rPr kumimoji="0" lang="en-US" sz="1200" b="0" i="0" u="none" strike="noStrike" kern="1200" cap="none" spc="0" normalizeH="0" baseline="0" noProof="0" dirty="0">
+                <a:ln>
+                  <a:noFill/>
+                </a:ln>
+                <a:solidFill>
+                  <a:srgbClr val="FAFAFA"/>
+                </a:solidFill>
+                <a:effectLst/>
+                <a:uLnTx/>
+                <a:uFillTx/>
+                <a:latin typeface="Arial" panose="020B0604020202020204" pitchFamily="34" charset="0"/>
+                <a:ea typeface="+mn-ea"/>
+                <a:cs typeface="Arial" panose="020B0604020202020204" pitchFamily="34" charset="0"/>
+              </a:rPr>
+              <a:t>AWS Cloud</a:t>
+            </a:r>
+          </a:p>
+        </p:txBody>
+      </p:sp>
+      <p:sp>
+        <p:nvSpPr>
+          <p:cNvPr id="50" name="Rectangle 49">
+            <a:extLst>
+              <a:ext uri="{FF2B5EF4-FFF2-40B4-BE49-F238E27FC236}">
+                <a16:creationId xmlns:a16="http://schemas.microsoft.com/office/drawing/2014/main" id="{850D0C08-8DB5-A34E-9C0A-542E572D39EE}"/>
+              </a:ext>
+            </a:extLst>
+          </p:cNvPr>
+          <p:cNvSpPr/>
+          <p:nvPr/>
+        </p:nvSpPr>
+        <p:spPr>
+          <a:xfrm>
+            <a:off x="1805285" y="1702744"/>
+            <a:ext cx="1943131" cy="3891076"/>
+          </a:xfrm>
+          <a:prstGeom prst="rect">
+            <a:avLst/>
+          </a:prstGeom>
+          <a:noFill/>
+          <a:ln w="12700">
+            <a:solidFill>
+              <a:srgbClr val="00A0C8"/>
+            </a:solidFill>
+            <a:prstDash val="dash"/>
+          </a:ln>
+        </p:spPr>
+        <p:style>
+          <a:lnRef idx="2">
+            <a:schemeClr val="accent1">
+              <a:shade val="50000"/>
+            </a:schemeClr>
+          </a:lnRef>
+          <a:fillRef idx="1">
+            <a:schemeClr val="accent1"/>
+          </a:fillRef>
+          <a:effectRef idx="0">
+            <a:schemeClr val="accent1"/>
+          </a:effectRef>
+          <a:fontRef idx="minor">
+            <a:schemeClr val="lt1"/>
+          </a:fontRef>
+        </p:style>
+        <p:txBody>
+          <a:bodyPr rot="0" spcFirstLastPara="0" vertOverflow="overflow" horzOverflow="overflow" vert="horz" wrap="square" lIns="91440" tIns="91440" rIns="91440" bIns="45720" numCol="1" spcCol="0" rtlCol="0" fromWordArt="0" anchor="t" anchorCtr="0" forceAA="0" compatLnSpc="1">
+            <a:prstTxWarp prst="textNoShape">
+              <a:avLst/>
+            </a:prstTxWarp>
+            <a:noAutofit/>
+          </a:bodyPr>
+          <a:lstStyle/>
+          <a:p>
+            <a:pPr marL="0" marR="0" lvl="0" indent="0" algn="ctr" defTabSz="914400" rtl="0" eaLnBrk="0" fontAlgn="base" latinLnBrk="0" hangingPunct="0">
+              <a:lnSpc>
+                <a:spcPct val="100000"/>
+              </a:lnSpc>
+              <a:spcBef>
+                <a:spcPct val="0"/>
+              </a:spcBef>
+              <a:spcAft>
+                <a:spcPct val="0"/>
+              </a:spcAft>
+              <a:buClrTx/>
+              <a:buSzTx/>
+              <a:buFontTx/>
+              <a:buNone/>
+              <a:tabLst/>
+              <a:defRPr/>
+            </a:pPr>
+            <a:r>
+              <a:rPr kumimoji="0" lang="en-US" sz="1200" b="0" i="0" u="none" strike="noStrike" kern="1200" cap="none" spc="0" normalizeH="0" baseline="0" noProof="0" dirty="0">
+                <a:ln>
+                  <a:noFill/>
+                </a:ln>
+                <a:solidFill>
+                  <a:srgbClr val="00A0C8"/>
+                </a:solidFill>
+                <a:effectLst/>
+                <a:uLnTx/>
+                <a:uFillTx/>
+                <a:latin typeface="Arial" panose="020B0604020202020204" pitchFamily="34" charset="0"/>
+                <a:ea typeface="+mn-ea"/>
+                <a:cs typeface="Arial" panose="020B0604020202020204" pitchFamily="34" charset="0"/>
+              </a:rPr>
+              <a:t>Availability Zone 1</a:t>
+            </a:r>
+          </a:p>
+        </p:txBody>
+      </p:sp>
+      <p:sp>
+        <p:nvSpPr>
+          <p:cNvPr id="51" name="Rectangle 50">
+            <a:extLst>
+              <a:ext uri="{FF2B5EF4-FFF2-40B4-BE49-F238E27FC236}">
+                <a16:creationId xmlns:a16="http://schemas.microsoft.com/office/drawing/2014/main" id="{DC1E2E24-48B0-E648-A152-EDE87C541201}"/>
+              </a:ext>
+            </a:extLst>
+          </p:cNvPr>
+          <p:cNvSpPr/>
+          <p:nvPr/>
+        </p:nvSpPr>
+        <p:spPr>
+          <a:xfrm>
+            <a:off x="1892328" y="2918754"/>
+            <a:ext cx="6072055" cy="976172"/>
+          </a:xfrm>
+          <a:prstGeom prst="rect">
+            <a:avLst/>
+          </a:prstGeom>
+          <a:noFill/>
+          <a:ln w="12700">
+            <a:solidFill>
+              <a:srgbClr val="FF9900"/>
+            </a:solidFill>
+            <a:prstDash val="dash"/>
+          </a:ln>
+        </p:spPr>
+        <p:style>
+          <a:lnRef idx="2">
+            <a:schemeClr val="accent1">
+              <a:shade val="50000"/>
+            </a:schemeClr>
+          </a:lnRef>
+          <a:fillRef idx="1">
+            <a:schemeClr val="accent1"/>
+          </a:fillRef>
+          <a:effectRef idx="0">
+            <a:schemeClr val="accent1"/>
+          </a:effectRef>
+          <a:fontRef idx="minor">
+            <a:schemeClr val="lt1"/>
+          </a:fontRef>
+        </p:style>
+        <p:txBody>
+          <a:bodyPr rot="0" spcFirstLastPara="0" vertOverflow="overflow" horzOverflow="overflow" vert="horz" wrap="square" lIns="91440" tIns="91440" rIns="91440" bIns="45720" numCol="1" spcCol="0" rtlCol="0" fromWordArt="0" anchor="t" anchorCtr="0" forceAA="0" compatLnSpc="1">
+            <a:prstTxWarp prst="textNoShape">
+              <a:avLst/>
+            </a:prstTxWarp>
+            <a:noAutofit/>
+          </a:bodyPr>
+          <a:lstStyle/>
+          <a:p>
+            <a:pPr marL="0" marR="0" lvl="0" indent="0" algn="ctr" defTabSz="914400" rtl="0" eaLnBrk="0" fontAlgn="base" latinLnBrk="0" hangingPunct="0">
+              <a:lnSpc>
+                <a:spcPct val="100000"/>
+              </a:lnSpc>
+              <a:spcBef>
+                <a:spcPct val="0"/>
+              </a:spcBef>
+              <a:spcAft>
+                <a:spcPct val="0"/>
+              </a:spcAft>
+              <a:buClrTx/>
+              <a:buSzTx/>
+              <a:buFontTx/>
+              <a:buNone/>
+              <a:tabLst/>
+              <a:defRPr/>
+            </a:pPr>
+            <a:endParaRPr kumimoji="0" lang="en-US" sz="1400" b="0" i="0" u="none" strike="noStrike" kern="1200" cap="none" spc="0" normalizeH="0" baseline="0" noProof="0" dirty="0">
+              <a:ln>
+                <a:noFill/>
+              </a:ln>
+              <a:solidFill>
+                <a:srgbClr val="FF9900"/>
+              </a:solidFill>
+              <a:effectLst/>
+              <a:uLnTx/>
+              <a:uFillTx/>
+              <a:latin typeface="Calibri" panose="020F0502020204030204"/>
+              <a:ea typeface="+mn-ea"/>
+              <a:cs typeface="+mn-cs"/>
+            </a:endParaRPr>
+          </a:p>
+        </p:txBody>
+      </p:sp>
+      <p:sp>
+        <p:nvSpPr>
+          <p:cNvPr id="52" name="Rectangle 51">
+            <a:extLst>
+              <a:ext uri="{FF2B5EF4-FFF2-40B4-BE49-F238E27FC236}">
+                <a16:creationId xmlns:a16="http://schemas.microsoft.com/office/drawing/2014/main" id="{3FC0DD88-617F-1443-9D58-968DC97591C9}"/>
+              </a:ext>
+            </a:extLst>
+          </p:cNvPr>
+          <p:cNvSpPr/>
+          <p:nvPr/>
+        </p:nvSpPr>
+        <p:spPr>
+          <a:xfrm>
+            <a:off x="6033521" y="1702744"/>
+            <a:ext cx="2017905" cy="3891076"/>
+          </a:xfrm>
+          <a:prstGeom prst="rect">
+            <a:avLst/>
+          </a:prstGeom>
+          <a:noFill/>
+          <a:ln w="12700">
+            <a:solidFill>
+              <a:srgbClr val="00A0C8"/>
+            </a:solidFill>
+            <a:prstDash val="dash"/>
+          </a:ln>
+        </p:spPr>
+        <p:style>
+          <a:lnRef idx="2">
+            <a:schemeClr val="accent1">
+              <a:shade val="50000"/>
+            </a:schemeClr>
+          </a:lnRef>
+          <a:fillRef idx="1">
+            <a:schemeClr val="accent1"/>
+          </a:fillRef>
+          <a:effectRef idx="0">
+            <a:schemeClr val="accent1"/>
+          </a:effectRef>
+          <a:fontRef idx="minor">
+            <a:schemeClr val="lt1"/>
+          </a:fontRef>
+        </p:style>
+        <p:txBody>
+          <a:bodyPr rot="0" spcFirstLastPara="0" vertOverflow="overflow" horzOverflow="overflow" vert="horz" wrap="square" lIns="91440" tIns="91440" rIns="91440" bIns="45720" numCol="1" spcCol="0" rtlCol="0" fromWordArt="0" anchor="t" anchorCtr="0" forceAA="0" compatLnSpc="1">
+            <a:prstTxWarp prst="textNoShape">
+              <a:avLst/>
+            </a:prstTxWarp>
+            <a:noAutofit/>
+          </a:bodyPr>
+          <a:lstStyle/>
+          <a:p>
+            <a:pPr marL="0" marR="0" lvl="0" indent="0" algn="ctr" defTabSz="914400" rtl="0" eaLnBrk="0" fontAlgn="base" latinLnBrk="0" hangingPunct="0">
+              <a:lnSpc>
+                <a:spcPct val="100000"/>
+              </a:lnSpc>
+              <a:spcBef>
+                <a:spcPct val="0"/>
+              </a:spcBef>
+              <a:spcAft>
+                <a:spcPct val="0"/>
+              </a:spcAft>
+              <a:buClrTx/>
+              <a:buSzTx/>
+              <a:buFontTx/>
+              <a:buNone/>
+              <a:tabLst/>
+              <a:defRPr/>
+            </a:pPr>
+            <a:r>
+              <a:rPr kumimoji="0" lang="en-US" sz="1200" b="0" i="0" u="none" strike="noStrike" kern="1200" cap="none" spc="0" normalizeH="0" baseline="0" noProof="0" dirty="0">
+                <a:ln>
+                  <a:noFill/>
+                </a:ln>
+                <a:solidFill>
+                  <a:srgbClr val="00A0C8"/>
+                </a:solidFill>
+                <a:effectLst/>
+                <a:uLnTx/>
+                <a:uFillTx/>
+                <a:latin typeface="Arial" panose="020B0604020202020204" pitchFamily="34" charset="0"/>
+                <a:ea typeface="+mn-ea"/>
+                <a:cs typeface="Arial" panose="020B0604020202020204" pitchFamily="34" charset="0"/>
+              </a:rPr>
+              <a:t>Availability Zone 2</a:t>
+            </a:r>
+          </a:p>
+        </p:txBody>
+      </p:sp>
+      <p:sp>
+        <p:nvSpPr>
+          <p:cNvPr id="53" name="Rectangle 52">
+            <a:extLst>
+              <a:ext uri="{FF2B5EF4-FFF2-40B4-BE49-F238E27FC236}">
+                <a16:creationId xmlns:a16="http://schemas.microsoft.com/office/drawing/2014/main" id="{00B4B0C8-6D14-284D-B119-75AD2529DE7F}"/>
+              </a:ext>
+            </a:extLst>
+          </p:cNvPr>
+          <p:cNvSpPr/>
+          <p:nvPr/>
+        </p:nvSpPr>
+        <p:spPr>
+          <a:xfrm>
+            <a:off x="1892328" y="4421346"/>
+            <a:ext cx="6072055" cy="976172"/>
+          </a:xfrm>
+          <a:prstGeom prst="rect">
+            <a:avLst/>
+          </a:prstGeom>
+          <a:noFill/>
+          <a:ln w="12700">
+            <a:solidFill>
+              <a:srgbClr val="FF9900"/>
+            </a:solidFill>
+            <a:prstDash val="dash"/>
+          </a:ln>
+        </p:spPr>
+        <p:style>
+          <a:lnRef idx="2">
+            <a:schemeClr val="accent1">
+              <a:shade val="50000"/>
+            </a:schemeClr>
+          </a:lnRef>
+          <a:fillRef idx="1">
+            <a:schemeClr val="accent1"/>
+          </a:fillRef>
+          <a:effectRef idx="0">
+            <a:schemeClr val="accent1"/>
+          </a:effectRef>
+          <a:fontRef idx="minor">
+            <a:schemeClr val="lt1"/>
+          </a:fontRef>
+        </p:style>
+        <p:txBody>
+          <a:bodyPr rot="0" spcFirstLastPara="0" vertOverflow="overflow" horzOverflow="overflow" vert="horz" wrap="square" lIns="91440" tIns="91440" rIns="91440" bIns="45720" numCol="1" spcCol="0" rtlCol="0" fromWordArt="0" anchor="t" anchorCtr="0" forceAA="0" compatLnSpc="1">
+            <a:prstTxWarp prst="textNoShape">
+              <a:avLst/>
+            </a:prstTxWarp>
+            <a:noAutofit/>
+          </a:bodyPr>
+          <a:lstStyle/>
+          <a:p>
+            <a:pPr marL="0" marR="0" lvl="0" indent="0" algn="ctr" defTabSz="914400" rtl="0" eaLnBrk="0" fontAlgn="base" latinLnBrk="0" hangingPunct="0">
+              <a:lnSpc>
+                <a:spcPct val="100000"/>
+              </a:lnSpc>
+              <a:spcBef>
+                <a:spcPct val="0"/>
+              </a:spcBef>
+              <a:spcAft>
+                <a:spcPct val="0"/>
+              </a:spcAft>
+              <a:buClrTx/>
+              <a:buSzTx/>
+              <a:buFontTx/>
+              <a:buNone/>
+              <a:tabLst/>
+              <a:defRPr/>
+            </a:pPr>
+            <a:endParaRPr kumimoji="0" lang="en-US" sz="1400" b="0" i="0" u="none" strike="noStrike" kern="1200" cap="none" spc="0" normalizeH="0" baseline="0" noProof="0" dirty="0">
+              <a:ln>
+                <a:noFill/>
+              </a:ln>
+              <a:solidFill>
+                <a:srgbClr val="FF9900"/>
+              </a:solidFill>
+              <a:effectLst/>
+              <a:uLnTx/>
+              <a:uFillTx/>
+              <a:latin typeface="Calibri" panose="020F0502020204030204"/>
+              <a:ea typeface="+mn-ea"/>
+              <a:cs typeface="+mn-cs"/>
+            </a:endParaRPr>
+          </a:p>
+        </p:txBody>
+      </p:sp>
+      <p:pic>
+        <p:nvPicPr>
+          <p:cNvPr id="62" name="Graphic 61">
+            <a:extLst>
+              <a:ext uri="{FF2B5EF4-FFF2-40B4-BE49-F238E27FC236}">
+                <a16:creationId xmlns:a16="http://schemas.microsoft.com/office/drawing/2014/main" id="{2E7BD715-16E7-3746-B184-5D905EBA0972}"/>
+              </a:ext>
+            </a:extLst>
+          </p:cNvPr>
+          <p:cNvPicPr>
+            <a:picLocks noChangeAspect="1"/>
+          </p:cNvPicPr>
+          <p:nvPr/>
+        </p:nvPicPr>
+        <p:blipFill>
+          <a:blip r:embed="rId2">
+            <a:extLst>
+              <a:ext uri="{96DAC541-7B7A-43D3-8B79-37D633B846F1}">
+                <asvg:svgBlip xmlns:asvg="http://schemas.microsoft.com/office/drawing/2016/SVG/main" r:embed="rId3"/>
+              </a:ext>
+            </a:extLst>
+          </a:blip>
+          <a:stretch>
+            <a:fillRect/>
+          </a:stretch>
+        </p:blipFill>
+        <p:spPr>
+          <a:xfrm>
+            <a:off x="1353758" y="1203046"/>
+            <a:ext cx="400579" cy="400579"/>
+          </a:xfrm>
+          <a:prstGeom prst="rect">
+            <a:avLst/>
+          </a:prstGeom>
+        </p:spPr>
+      </p:pic>
+      <p:pic>
+        <p:nvPicPr>
+          <p:cNvPr id="64" name="Graphic 63">
+            <a:extLst>
+              <a:ext uri="{FF2B5EF4-FFF2-40B4-BE49-F238E27FC236}">
+                <a16:creationId xmlns:a16="http://schemas.microsoft.com/office/drawing/2014/main" id="{277E78C7-E420-A64E-90B6-C4B20061174A}"/>
+              </a:ext>
+            </a:extLst>
+          </p:cNvPr>
+          <p:cNvPicPr>
+            <a:picLocks noChangeAspect="1"/>
+          </p:cNvPicPr>
+          <p:nvPr/>
+        </p:nvPicPr>
+        <p:blipFill>
+          <a:blip r:embed="rId4">
+            <a:extLst>
+              <a:ext uri="{96DAC541-7B7A-43D3-8B79-37D633B846F1}">
+                <asvg:svgBlip xmlns:asvg="http://schemas.microsoft.com/office/drawing/2016/SVG/main" r:embed="rId5"/>
+              </a:ext>
+            </a:extLst>
+          </a:blip>
+          <a:stretch>
+            <a:fillRect/>
+          </a:stretch>
+        </p:blipFill>
+        <p:spPr>
+          <a:xfrm>
+            <a:off x="1418660" y="2092126"/>
+            <a:ext cx="340775" cy="340775"/>
+          </a:xfrm>
+          <a:prstGeom prst="rect">
+            <a:avLst/>
+          </a:prstGeom>
+        </p:spPr>
+      </p:pic>
+      <p:sp>
+        <p:nvSpPr>
+          <p:cNvPr id="38" name="Footer Placeholder 3">
+            <a:extLst>
+              <a:ext uri="{FF2B5EF4-FFF2-40B4-BE49-F238E27FC236}">
+                <a16:creationId xmlns:a16="http://schemas.microsoft.com/office/drawing/2014/main" id="{D0396B8E-F8E8-A04C-B870-9D224E3AAF12}"/>
+              </a:ext>
+            </a:extLst>
+          </p:cNvPr>
+          <p:cNvSpPr txBox="1">
+            <a:spLocks noChangeArrowheads="1"/>
+          </p:cNvSpPr>
+          <p:nvPr/>
+        </p:nvSpPr>
+        <p:spPr bwMode="auto">
+          <a:xfrm>
+            <a:off x="1090613" y="6249988"/>
+            <a:ext cx="4462462" cy="365125"/>
+          </a:xfrm>
+          <a:prstGeom prst="rect">
+            <a:avLst/>
+          </a:prstGeom>
+          <a:noFill/>
+          <a:extLst>
+            <a:ext uri="{909E8E84-426E-40DD-AFC4-6F175D3DCCD1}">
+              <a14:hiddenFill xmlns:a14="http://schemas.microsoft.com/office/drawing/2010/main">
+                <a:solidFill>
+                  <a:srgbClr val="FFFFFF"/>
+                </a:solidFill>
+              </a14:hiddenFill>
+            </a:ext>
+            <a:ext uri="{91240B29-F687-4F45-9708-019B960494DF}">
+              <a14:hiddenLine xmlns:a14="http://schemas.microsoft.com/office/drawing/2010/main" w="9525">
+                <a:solidFill>
+                  <a:srgbClr val="000000"/>
+                </a:solidFill>
+                <a:miter lim="800000"/>
+                <a:headEnd/>
+                <a:tailEnd/>
+              </a14:hiddenLine>
+            </a:ext>
+          </a:extLst>
+        </p:spPr>
+        <p:txBody>
+          <a:bodyPr vert="horz" wrap="square" lIns="91440" tIns="45720" rIns="91440" bIns="45720" numCol="1" rtlCol="0" anchor="ctr" anchorCtr="0" compatLnSpc="1">
+            <a:prstTxWarp prst="textNoShape">
+              <a:avLst/>
+            </a:prstTxWarp>
+          </a:bodyPr>
+          <a:lstStyle>
+            <a:defPPr>
+              <a:defRPr lang="en-US"/>
+            </a:defPPr>
+            <a:lvl1pPr marL="0" marR="0" indent="0" algn="l" defTabSz="914400" rtl="0" eaLnBrk="1" fontAlgn="auto" latinLnBrk="0" hangingPunct="1">
+              <a:lnSpc>
+                <a:spcPct val="100000"/>
+              </a:lnSpc>
+              <a:spcBef>
+                <a:spcPts val="0"/>
+              </a:spcBef>
+              <a:spcAft>
+                <a:spcPts val="0"/>
+              </a:spcAft>
+              <a:buClrTx/>
+              <a:buSzTx/>
+              <a:buFontTx/>
+              <a:buNone/>
+              <a:tabLst/>
+              <a:defRPr sz="1000" kern="1200">
+                <a:solidFill>
+                  <a:schemeClr val="bg1"/>
+                </a:solidFill>
+                <a:latin typeface="Arial" panose="020B0604020202020204" pitchFamily="34" charset="0"/>
+                <a:ea typeface="+mn-ea"/>
+                <a:cs typeface="Arial" panose="020B0604020202020204" pitchFamily="34" charset="0"/>
+              </a:defRPr>
+            </a:lvl1pPr>
+            <a:lvl2pPr marL="457200" algn="l" defTabSz="914400" rtl="0" eaLnBrk="0" fontAlgn="base" latinLnBrk="0" hangingPunct="0">
+              <a:spcBef>
+                <a:spcPct val="0"/>
+              </a:spcBef>
+              <a:spcAft>
+                <a:spcPct val="0"/>
+              </a:spcAft>
+              <a:defRPr sz="1800" kern="1200">
+                <a:solidFill>
+                  <a:schemeClr val="tx1"/>
+                </a:solidFill>
+                <a:latin typeface="Calibri" panose="020F0502020204030204" pitchFamily="34" charset="0"/>
+                <a:ea typeface="+mn-ea"/>
+                <a:cs typeface="+mn-cs"/>
+              </a:defRPr>
+            </a:lvl2pPr>
+            <a:lvl3pPr marL="914400" algn="l" defTabSz="914400" rtl="0" eaLnBrk="0" fontAlgn="base" latinLnBrk="0" hangingPunct="0">
+              <a:spcBef>
+                <a:spcPct val="0"/>
+              </a:spcBef>
+              <a:spcAft>
+                <a:spcPct val="0"/>
+              </a:spcAft>
+              <a:defRPr sz="1800" kern="1200">
+                <a:solidFill>
+                  <a:schemeClr val="tx1"/>
+                </a:solidFill>
+                <a:latin typeface="Calibri" panose="020F0502020204030204" pitchFamily="34" charset="0"/>
+                <a:ea typeface="+mn-ea"/>
+                <a:cs typeface="+mn-cs"/>
+              </a:defRPr>
+            </a:lvl3pPr>
+            <a:lvl4pPr marL="1371600" algn="l" defTabSz="914400" rtl="0" eaLnBrk="0" fontAlgn="base" latinLnBrk="0" hangingPunct="0">
+              <a:spcBef>
+                <a:spcPct val="0"/>
+              </a:spcBef>
+              <a:spcAft>
+                <a:spcPct val="0"/>
+              </a:spcAft>
+              <a:defRPr sz="1800" kern="1200">
+                <a:solidFill>
+                  <a:schemeClr val="tx1"/>
+                </a:solidFill>
+                <a:latin typeface="Calibri" panose="020F0502020204030204" pitchFamily="34" charset="0"/>
+                <a:ea typeface="+mn-ea"/>
+                <a:cs typeface="+mn-cs"/>
+              </a:defRPr>
+            </a:lvl4pPr>
+            <a:lvl5pPr marL="1828800" algn="l" defTabSz="914400" rtl="0" eaLnBrk="0" fontAlgn="base" latinLnBrk="0" hangingPunct="0">
+              <a:spcBef>
+                <a:spcPct val="0"/>
+              </a:spcBef>
+              <a:spcAft>
+                <a:spcPct val="0"/>
+              </a:spcAft>
+              <a:defRPr sz="1800" kern="1200">
+                <a:solidFill>
+                  <a:schemeClr val="tx1"/>
+                </a:solidFill>
+                <a:latin typeface="Calibri" panose="020F0502020204030204" pitchFamily="34" charset="0"/>
+                <a:ea typeface="+mn-ea"/>
+                <a:cs typeface="+mn-cs"/>
+              </a:defRPr>
+            </a:lvl5pPr>
+            <a:lvl6pPr marL="2286000" algn="l" defTabSz="914400" rtl="0" eaLnBrk="1" latinLnBrk="0" hangingPunct="1">
+              <a:defRPr sz="1800" kern="1200">
+                <a:solidFill>
+                  <a:schemeClr val="tx1"/>
+                </a:solidFill>
+                <a:latin typeface="Calibri" panose="020F0502020204030204" pitchFamily="34" charset="0"/>
+                <a:ea typeface="+mn-ea"/>
+                <a:cs typeface="+mn-cs"/>
+              </a:defRPr>
+            </a:lvl6pPr>
+            <a:lvl7pPr marL="2743200" algn="l" defTabSz="914400" rtl="0" eaLnBrk="1" latinLnBrk="0" hangingPunct="1">
+              <a:defRPr sz="1800" kern="1200">
+                <a:solidFill>
+                  <a:schemeClr val="tx1"/>
+                </a:solidFill>
+                <a:latin typeface="Calibri" panose="020F0502020204030204" pitchFamily="34" charset="0"/>
+                <a:ea typeface="+mn-ea"/>
+                <a:cs typeface="+mn-cs"/>
+              </a:defRPr>
+            </a:lvl7pPr>
+            <a:lvl8pPr marL="3200400" algn="l" defTabSz="914400" rtl="0" eaLnBrk="1" latinLnBrk="0" hangingPunct="1">
+              <a:defRPr sz="1800" kern="1200">
+                <a:solidFill>
+                  <a:schemeClr val="tx1"/>
+                </a:solidFill>
+                <a:latin typeface="Calibri" panose="020F0502020204030204" pitchFamily="34" charset="0"/>
+                <a:ea typeface="+mn-ea"/>
+                <a:cs typeface="+mn-cs"/>
+              </a:defRPr>
+            </a:lvl8pPr>
+            <a:lvl9pPr marL="3657600" algn="l" defTabSz="914400" rtl="0" eaLnBrk="1" latinLnBrk="0" hangingPunct="1">
+              <a:defRPr sz="1800" kern="1200">
+                <a:solidFill>
+                  <a:schemeClr val="tx1"/>
+                </a:solidFill>
+                <a:latin typeface="Calibri" panose="020F0502020204030204" pitchFamily="34" charset="0"/>
+                <a:ea typeface="+mn-ea"/>
+                <a:cs typeface="+mn-cs"/>
+              </a:defRPr>
+            </a:lvl9pPr>
+          </a:lstStyle>
+          <a:p>
+            <a:pPr fontAlgn="base">
+              <a:spcBef>
+                <a:spcPct val="0"/>
+              </a:spcBef>
+              <a:spcAft>
+                <a:spcPct val="0"/>
+              </a:spcAft>
+            </a:pPr>
+            <a:r>
+              <a:rPr lang="en-US"/>
+              <a:t>© 2021, AussieCloudGuru. All rights reserved.</a:t>
+            </a:r>
+            <a:endParaRPr lang="en-US" altLang="en-US" dirty="0"/>
+          </a:p>
+        </p:txBody>
+      </p:sp>
+      <p:sp>
+        <p:nvSpPr>
+          <p:cNvPr id="72" name="Rectangle 71">
+            <a:extLst>
+              <a:ext uri="{FF2B5EF4-FFF2-40B4-BE49-F238E27FC236}">
+                <a16:creationId xmlns:a16="http://schemas.microsoft.com/office/drawing/2014/main" id="{3F9D0200-8001-B946-A8D2-F6128AF39CD6}"/>
+              </a:ext>
+            </a:extLst>
+          </p:cNvPr>
+          <p:cNvSpPr/>
+          <p:nvPr/>
+        </p:nvSpPr>
+        <p:spPr>
+          <a:xfrm>
+            <a:off x="1970370" y="4473145"/>
+            <a:ext cx="1677239" cy="830389"/>
+          </a:xfrm>
+          <a:prstGeom prst="rect">
+            <a:avLst/>
+          </a:prstGeom>
+          <a:solidFill>
+            <a:srgbClr val="C1F3FF">
+              <a:alpha val="14902"/>
+            </a:srgbClr>
+          </a:solidFill>
+          <a:ln w="12700">
+            <a:noFill/>
+            <a:prstDash val="dash"/>
+          </a:ln>
+        </p:spPr>
+        <p:style>
+          <a:lnRef idx="2">
+            <a:schemeClr val="accent1">
+              <a:shade val="50000"/>
+            </a:schemeClr>
+          </a:lnRef>
+          <a:fillRef idx="1">
+            <a:schemeClr val="accent1"/>
+          </a:fillRef>
+          <a:effectRef idx="0">
+            <a:schemeClr val="accent1"/>
+          </a:effectRef>
+          <a:fontRef idx="minor">
+            <a:schemeClr val="lt1"/>
+          </a:fontRef>
+        </p:style>
+        <p:txBody>
+          <a:bodyPr lIns="338328"/>
+          <a:lstStyle/>
+          <a:p>
+            <a:pPr eaLnBrk="1" fontAlgn="auto" hangingPunct="1">
+              <a:spcBef>
+                <a:spcPts val="0"/>
+              </a:spcBef>
+              <a:spcAft>
+                <a:spcPts val="0"/>
+              </a:spcAft>
+              <a:defRPr/>
+            </a:pPr>
+            <a:r>
+              <a:rPr lang="en-US" sz="1200" dirty="0">
+                <a:solidFill>
+                  <a:srgbClr val="00A0C8"/>
+                </a:solidFill>
+                <a:latin typeface="Arial" panose="020B0604020202020204" pitchFamily="34" charset="0"/>
+                <a:cs typeface="Arial" panose="020B0604020202020204" pitchFamily="34" charset="0"/>
+              </a:rPr>
+              <a:t>Private subnet1</a:t>
+            </a:r>
+          </a:p>
+          <a:p>
+            <a:pPr eaLnBrk="1" fontAlgn="auto" hangingPunct="1">
+              <a:spcBef>
+                <a:spcPts val="0"/>
+              </a:spcBef>
+              <a:spcAft>
+                <a:spcPts val="0"/>
+              </a:spcAft>
+              <a:defRPr/>
+            </a:pPr>
+            <a:r>
+              <a:rPr lang="en-US" sz="1200" dirty="0">
+                <a:solidFill>
+                  <a:srgbClr val="00A0C8"/>
+                </a:solidFill>
+                <a:latin typeface="Arial" panose="020B0604020202020204" pitchFamily="34" charset="0"/>
+                <a:cs typeface="Arial" panose="020B0604020202020204" pitchFamily="34" charset="0"/>
+              </a:rPr>
+              <a:t>  10.0.30.0/24</a:t>
+            </a:r>
+          </a:p>
+        </p:txBody>
+      </p:sp>
+      <p:sp>
+        <p:nvSpPr>
+          <p:cNvPr id="73" name="Rectangle 72">
+            <a:extLst>
+              <a:ext uri="{FF2B5EF4-FFF2-40B4-BE49-F238E27FC236}">
+                <a16:creationId xmlns:a16="http://schemas.microsoft.com/office/drawing/2014/main" id="{A3E56D60-DC52-5048-B163-A70E6C717B7A}"/>
+              </a:ext>
+            </a:extLst>
+          </p:cNvPr>
+          <p:cNvSpPr/>
+          <p:nvPr/>
+        </p:nvSpPr>
+        <p:spPr>
+          <a:xfrm>
+            <a:off x="6112046" y="4473145"/>
+            <a:ext cx="1693906" cy="830389"/>
+          </a:xfrm>
+          <a:prstGeom prst="rect">
+            <a:avLst/>
+          </a:prstGeom>
+          <a:solidFill>
+            <a:srgbClr val="C1F3FF">
+              <a:alpha val="14902"/>
+            </a:srgbClr>
+          </a:solidFill>
+          <a:ln w="12700">
+            <a:noFill/>
+            <a:prstDash val="dash"/>
+          </a:ln>
+        </p:spPr>
+        <p:style>
+          <a:lnRef idx="2">
+            <a:schemeClr val="accent1">
+              <a:shade val="50000"/>
+            </a:schemeClr>
+          </a:lnRef>
+          <a:fillRef idx="1">
+            <a:schemeClr val="accent1"/>
+          </a:fillRef>
+          <a:effectRef idx="0">
+            <a:schemeClr val="accent1"/>
+          </a:effectRef>
+          <a:fontRef idx="minor">
+            <a:schemeClr val="lt1"/>
+          </a:fontRef>
+        </p:style>
+        <p:txBody>
+          <a:bodyPr lIns="338328"/>
+          <a:lstStyle/>
+          <a:p>
+            <a:pPr>
+              <a:defRPr/>
+            </a:pPr>
+            <a:r>
+              <a:rPr lang="en-US" sz="1200" dirty="0">
+                <a:solidFill>
+                  <a:srgbClr val="00A0C8"/>
+                </a:solidFill>
+                <a:latin typeface="Arial" panose="020B0604020202020204" pitchFamily="34" charset="0"/>
+                <a:cs typeface="Arial" panose="020B0604020202020204" pitchFamily="34" charset="0"/>
+              </a:rPr>
+              <a:t>Private subnet2</a:t>
+            </a:r>
+          </a:p>
+          <a:p>
+            <a:pPr>
+              <a:defRPr/>
+            </a:pPr>
+            <a:r>
+              <a:rPr lang="en-US" sz="1200" dirty="0">
+                <a:solidFill>
+                  <a:srgbClr val="00A0C8"/>
+                </a:solidFill>
+                <a:latin typeface="Arial" panose="020B0604020202020204" pitchFamily="34" charset="0"/>
+                <a:cs typeface="Arial" panose="020B0604020202020204" pitchFamily="34" charset="0"/>
+              </a:rPr>
+              <a:t>  10.0.40.0/24</a:t>
+            </a:r>
+          </a:p>
+        </p:txBody>
+      </p:sp>
+      <p:pic>
+        <p:nvPicPr>
+          <p:cNvPr id="74" name="Graphic 99">
+            <a:extLst>
+              <a:ext uri="{FF2B5EF4-FFF2-40B4-BE49-F238E27FC236}">
+                <a16:creationId xmlns:a16="http://schemas.microsoft.com/office/drawing/2014/main" id="{0350715E-69B4-BF43-ABE2-73D64C420A70}"/>
+              </a:ext>
+            </a:extLst>
+          </p:cNvPr>
+          <p:cNvPicPr>
+            <a:picLocks noChangeAspect="1" noChangeArrowheads="1"/>
+          </p:cNvPicPr>
+          <p:nvPr/>
+        </p:nvPicPr>
+        <p:blipFill>
+          <a:blip r:embed="rId6">
+            <a:extLst>
+              <a:ext uri="{28A0092B-C50C-407E-A947-70E740481C1C}">
+                <a14:useLocalDpi xmlns:a14="http://schemas.microsoft.com/office/drawing/2010/main" val="0"/>
+              </a:ext>
+            </a:extLst>
+          </a:blip>
+          <a:srcRect/>
+          <a:stretch>
+            <a:fillRect/>
+          </a:stretch>
+        </p:blipFill>
+        <p:spPr bwMode="auto">
+          <a:xfrm>
+            <a:off x="1970370" y="4474269"/>
+            <a:ext cx="274637" cy="274637"/>
+          </a:xfrm>
+          <a:prstGeom prst="rect">
+            <a:avLst/>
+          </a:prstGeom>
+          <a:noFill/>
+          <a:ln>
+            <a:noFill/>
+          </a:ln>
+          <a:extLst>
+            <a:ext uri="{909E8E84-426E-40DD-AFC4-6F175D3DCCD1}">
+              <a14:hiddenFill xmlns:a14="http://schemas.microsoft.com/office/drawing/2010/main">
+                <a:solidFill>
+                  <a:srgbClr val="FFFFFF"/>
+                </a:solidFill>
+              </a14:hiddenFill>
+            </a:ext>
+            <a:ext uri="{91240B29-F687-4F45-9708-019B960494DF}">
+              <a14:hiddenLine xmlns:a14="http://schemas.microsoft.com/office/drawing/2010/main" w="9525">
+                <a:solidFill>
+                  <a:srgbClr val="000000"/>
+                </a:solidFill>
+                <a:miter lim="800000"/>
+                <a:headEnd/>
+                <a:tailEnd/>
+              </a14:hiddenLine>
+            </a:ext>
+          </a:extLst>
+        </p:spPr>
+      </p:pic>
+      <p:pic>
+        <p:nvPicPr>
+          <p:cNvPr id="75" name="Graphic 99">
+            <a:extLst>
+              <a:ext uri="{FF2B5EF4-FFF2-40B4-BE49-F238E27FC236}">
+                <a16:creationId xmlns:a16="http://schemas.microsoft.com/office/drawing/2014/main" id="{0D4E25B5-7B47-5541-8BE7-053317DE1ED9}"/>
+              </a:ext>
+            </a:extLst>
+          </p:cNvPr>
+          <p:cNvPicPr>
+            <a:picLocks noChangeAspect="1" noChangeArrowheads="1"/>
+          </p:cNvPicPr>
+          <p:nvPr/>
+        </p:nvPicPr>
+        <p:blipFill>
+          <a:blip r:embed="rId6">
+            <a:extLst>
+              <a:ext uri="{28A0092B-C50C-407E-A947-70E740481C1C}">
+                <a14:useLocalDpi xmlns:a14="http://schemas.microsoft.com/office/drawing/2010/main" val="0"/>
+              </a:ext>
+            </a:extLst>
+          </a:blip>
+          <a:srcRect/>
+          <a:stretch>
+            <a:fillRect/>
+          </a:stretch>
+        </p:blipFill>
+        <p:spPr bwMode="auto">
+          <a:xfrm>
+            <a:off x="6112046" y="4478374"/>
+            <a:ext cx="274637" cy="274637"/>
+          </a:xfrm>
+          <a:prstGeom prst="rect">
+            <a:avLst/>
+          </a:prstGeom>
+          <a:noFill/>
+          <a:ln>
+            <a:noFill/>
+          </a:ln>
+          <a:extLst>
+            <a:ext uri="{909E8E84-426E-40DD-AFC4-6F175D3DCCD1}">
+              <a14:hiddenFill xmlns:a14="http://schemas.microsoft.com/office/drawing/2010/main">
+                <a:solidFill>
+                  <a:srgbClr val="FFFFFF"/>
+                </a:solidFill>
+              </a14:hiddenFill>
+            </a:ext>
+            <a:ext uri="{91240B29-F687-4F45-9708-019B960494DF}">
+              <a14:hiddenLine xmlns:a14="http://schemas.microsoft.com/office/drawing/2010/main" w="9525">
+                <a:solidFill>
+                  <a:srgbClr val="000000"/>
+                </a:solidFill>
+                <a:miter lim="800000"/>
+                <a:headEnd/>
+                <a:tailEnd/>
+              </a14:hiddenLine>
+            </a:ext>
+          </a:extLst>
+        </p:spPr>
+      </p:pic>
+      <p:sp>
+        <p:nvSpPr>
+          <p:cNvPr id="76" name="Rectangle 75">
+            <a:extLst>
+              <a:ext uri="{FF2B5EF4-FFF2-40B4-BE49-F238E27FC236}">
+                <a16:creationId xmlns:a16="http://schemas.microsoft.com/office/drawing/2014/main" id="{BC9F3804-642D-C243-BCC1-0969445CBD75}"/>
+              </a:ext>
+            </a:extLst>
+          </p:cNvPr>
+          <p:cNvSpPr/>
+          <p:nvPr/>
+        </p:nvSpPr>
+        <p:spPr>
+          <a:xfrm>
+            <a:off x="1970370" y="2981492"/>
+            <a:ext cx="1677239" cy="881957"/>
+          </a:xfrm>
+          <a:prstGeom prst="rect">
+            <a:avLst/>
+          </a:prstGeom>
+          <a:solidFill>
+            <a:srgbClr val="E1F2D4">
+              <a:alpha val="20000"/>
+            </a:srgbClr>
+          </a:solidFill>
+          <a:ln w="12700">
+            <a:noFill/>
+            <a:prstDash val="dash"/>
+          </a:ln>
+        </p:spPr>
+        <p:style>
+          <a:lnRef idx="2">
+            <a:schemeClr val="accent1">
+              <a:shade val="50000"/>
+            </a:schemeClr>
+          </a:lnRef>
+          <a:fillRef idx="1">
+            <a:schemeClr val="accent1"/>
+          </a:fillRef>
+          <a:effectRef idx="0">
+            <a:schemeClr val="accent1"/>
+          </a:effectRef>
+          <a:fontRef idx="minor">
+            <a:schemeClr val="lt1"/>
+          </a:fontRef>
+        </p:style>
+        <p:txBody>
+          <a:bodyPr lIns="338328"/>
+          <a:lstStyle/>
+          <a:p>
+            <a:pPr eaLnBrk="1" fontAlgn="auto" hangingPunct="1">
+              <a:spcBef>
+                <a:spcPts val="0"/>
+              </a:spcBef>
+              <a:spcAft>
+                <a:spcPts val="0"/>
+              </a:spcAft>
+              <a:defRPr/>
+            </a:pPr>
+            <a:r>
+              <a:rPr lang="en-US" sz="1200" dirty="0">
+                <a:solidFill>
+                  <a:srgbClr val="69AE35"/>
+                </a:solidFill>
+                <a:latin typeface="Arial" panose="020B0604020202020204" pitchFamily="34" charset="0"/>
+                <a:cs typeface="Arial" panose="020B0604020202020204" pitchFamily="34" charset="0"/>
+              </a:rPr>
+              <a:t>Public subnet1</a:t>
+            </a:r>
+          </a:p>
+          <a:p>
+            <a:pPr eaLnBrk="1" fontAlgn="auto" hangingPunct="1">
+              <a:spcBef>
+                <a:spcPts val="0"/>
+              </a:spcBef>
+              <a:spcAft>
+                <a:spcPts val="0"/>
+              </a:spcAft>
+              <a:defRPr/>
+            </a:pPr>
+            <a:r>
+              <a:rPr lang="en-US" sz="1200" dirty="0">
+                <a:solidFill>
+                  <a:srgbClr val="69AE35"/>
+                </a:solidFill>
+                <a:latin typeface="Arial" panose="020B0604020202020204" pitchFamily="34" charset="0"/>
+                <a:cs typeface="Arial" panose="020B0604020202020204" pitchFamily="34" charset="0"/>
+              </a:rPr>
+              <a:t>10.0.10.0/24</a:t>
+            </a:r>
+          </a:p>
+        </p:txBody>
+      </p:sp>
+      <p:pic>
+        <p:nvPicPr>
+          <p:cNvPr id="77" name="Graphic 107">
+            <a:extLst>
+              <a:ext uri="{FF2B5EF4-FFF2-40B4-BE49-F238E27FC236}">
+                <a16:creationId xmlns:a16="http://schemas.microsoft.com/office/drawing/2014/main" id="{AEF7E3F3-7D39-A747-83E9-CD9372454280}"/>
+              </a:ext>
+            </a:extLst>
+          </p:cNvPr>
+          <p:cNvPicPr>
+            <a:picLocks noChangeAspect="1" noChangeArrowheads="1"/>
+          </p:cNvPicPr>
+          <p:nvPr/>
+        </p:nvPicPr>
+        <p:blipFill>
+          <a:blip r:embed="rId7">
+            <a:extLst>
+              <a:ext uri="{28A0092B-C50C-407E-A947-70E740481C1C}">
+                <a14:useLocalDpi xmlns:a14="http://schemas.microsoft.com/office/drawing/2010/main" val="0"/>
+              </a:ext>
+            </a:extLst>
+          </a:blip>
+          <a:srcRect/>
+          <a:stretch>
+            <a:fillRect/>
+          </a:stretch>
+        </p:blipFill>
+        <p:spPr bwMode="auto">
+          <a:xfrm>
+            <a:off x="1970370" y="2981492"/>
+            <a:ext cx="260938" cy="260937"/>
+          </a:xfrm>
+          <a:prstGeom prst="rect">
+            <a:avLst/>
+          </a:prstGeom>
+          <a:noFill/>
+          <a:ln>
+            <a:noFill/>
+          </a:ln>
+          <a:extLst>
+            <a:ext uri="{909E8E84-426E-40DD-AFC4-6F175D3DCCD1}">
+              <a14:hiddenFill xmlns:a14="http://schemas.microsoft.com/office/drawing/2010/main">
+                <a:solidFill>
+                  <a:srgbClr val="FFFFFF"/>
+                </a:solidFill>
+              </a14:hiddenFill>
+            </a:ext>
+            <a:ext uri="{91240B29-F687-4F45-9708-019B960494DF}">
+              <a14:hiddenLine xmlns:a14="http://schemas.microsoft.com/office/drawing/2010/main" w="9525">
+                <a:solidFill>
+                  <a:srgbClr val="000000"/>
+                </a:solidFill>
+                <a:miter lim="800000"/>
+                <a:headEnd/>
+                <a:tailEnd/>
+              </a14:hiddenLine>
+            </a:ext>
+          </a:extLst>
+        </p:spPr>
+      </p:pic>
+      <p:sp>
+        <p:nvSpPr>
+          <p:cNvPr id="78" name="Rectangle 77">
+            <a:extLst>
+              <a:ext uri="{FF2B5EF4-FFF2-40B4-BE49-F238E27FC236}">
+                <a16:creationId xmlns:a16="http://schemas.microsoft.com/office/drawing/2014/main" id="{086164C9-29A7-5746-BB05-E6CEFB28A9AB}"/>
+              </a:ext>
+            </a:extLst>
+          </p:cNvPr>
+          <p:cNvSpPr/>
+          <p:nvPr/>
+        </p:nvSpPr>
+        <p:spPr>
+          <a:xfrm>
+            <a:off x="6128713" y="2981492"/>
+            <a:ext cx="1677239" cy="881957"/>
+          </a:xfrm>
+          <a:prstGeom prst="rect">
+            <a:avLst/>
+          </a:prstGeom>
+          <a:solidFill>
+            <a:srgbClr val="E1F2D4">
+              <a:alpha val="20000"/>
+            </a:srgbClr>
+          </a:solidFill>
+          <a:ln w="12700">
+            <a:noFill/>
+            <a:prstDash val="dash"/>
+          </a:ln>
+        </p:spPr>
+        <p:style>
+          <a:lnRef idx="2">
+            <a:schemeClr val="accent1">
+              <a:shade val="50000"/>
+            </a:schemeClr>
+          </a:lnRef>
+          <a:fillRef idx="1">
+            <a:schemeClr val="accent1"/>
+          </a:fillRef>
+          <a:effectRef idx="0">
+            <a:schemeClr val="accent1"/>
+          </a:effectRef>
+          <a:fontRef idx="minor">
+            <a:schemeClr val="lt1"/>
+          </a:fontRef>
+        </p:style>
+        <p:txBody>
+          <a:bodyPr lIns="338328"/>
+          <a:lstStyle/>
+          <a:p>
+            <a:pPr eaLnBrk="1" fontAlgn="auto" hangingPunct="1">
+              <a:spcBef>
+                <a:spcPts val="0"/>
+              </a:spcBef>
+              <a:spcAft>
+                <a:spcPts val="0"/>
+              </a:spcAft>
+              <a:defRPr/>
+            </a:pPr>
+            <a:r>
+              <a:rPr lang="en-US" sz="1200" dirty="0">
+                <a:solidFill>
+                  <a:srgbClr val="69AE35"/>
+                </a:solidFill>
+                <a:latin typeface="Arial" panose="020B0604020202020204" pitchFamily="34" charset="0"/>
+                <a:cs typeface="Arial" panose="020B0604020202020204" pitchFamily="34" charset="0"/>
+              </a:rPr>
+              <a:t>Public subnet2</a:t>
+            </a:r>
+          </a:p>
+          <a:p>
+            <a:pPr eaLnBrk="1" fontAlgn="auto" hangingPunct="1">
+              <a:spcBef>
+                <a:spcPts val="0"/>
+              </a:spcBef>
+              <a:spcAft>
+                <a:spcPts val="0"/>
+              </a:spcAft>
+              <a:defRPr/>
+            </a:pPr>
+            <a:r>
+              <a:rPr lang="en-US" sz="1200" dirty="0">
+                <a:solidFill>
+                  <a:srgbClr val="69AE35"/>
+                </a:solidFill>
+                <a:latin typeface="Arial" panose="020B0604020202020204" pitchFamily="34" charset="0"/>
+                <a:cs typeface="Arial" panose="020B0604020202020204" pitchFamily="34" charset="0"/>
+              </a:rPr>
+              <a:t>10.0.20.0/24</a:t>
+            </a:r>
+          </a:p>
+        </p:txBody>
+      </p:sp>
+      <p:pic>
+        <p:nvPicPr>
+          <p:cNvPr id="79" name="Graphic 107">
+            <a:extLst>
+              <a:ext uri="{FF2B5EF4-FFF2-40B4-BE49-F238E27FC236}">
+                <a16:creationId xmlns:a16="http://schemas.microsoft.com/office/drawing/2014/main" id="{5626D393-FE13-7E4B-BA3F-A2C1C5A89099}"/>
+              </a:ext>
+            </a:extLst>
+          </p:cNvPr>
+          <p:cNvPicPr>
+            <a:picLocks noChangeAspect="1" noChangeArrowheads="1"/>
+          </p:cNvPicPr>
+          <p:nvPr/>
+        </p:nvPicPr>
+        <p:blipFill>
+          <a:blip r:embed="rId7">
+            <a:extLst>
+              <a:ext uri="{28A0092B-C50C-407E-A947-70E740481C1C}">
+                <a14:useLocalDpi xmlns:a14="http://schemas.microsoft.com/office/drawing/2010/main" val="0"/>
+              </a:ext>
+            </a:extLst>
+          </a:blip>
+          <a:srcRect/>
+          <a:stretch>
+            <a:fillRect/>
+          </a:stretch>
+        </p:blipFill>
+        <p:spPr bwMode="auto">
+          <a:xfrm>
+            <a:off x="6128713" y="2981492"/>
+            <a:ext cx="260938" cy="260937"/>
+          </a:xfrm>
+          <a:prstGeom prst="rect">
+            <a:avLst/>
+          </a:prstGeom>
+          <a:noFill/>
+          <a:ln>
+            <a:noFill/>
+          </a:ln>
+          <a:extLst>
+            <a:ext uri="{909E8E84-426E-40DD-AFC4-6F175D3DCCD1}">
+              <a14:hiddenFill xmlns:a14="http://schemas.microsoft.com/office/drawing/2010/main">
+                <a:solidFill>
+                  <a:srgbClr val="FFFFFF"/>
+                </a:solidFill>
+              </a14:hiddenFill>
+            </a:ext>
+            <a:ext uri="{91240B29-F687-4F45-9708-019B960494DF}">
+              <a14:hiddenLine xmlns:a14="http://schemas.microsoft.com/office/drawing/2010/main" w="9525">
+                <a:solidFill>
+                  <a:srgbClr val="000000"/>
+                </a:solidFill>
+                <a:miter lim="800000"/>
+                <a:headEnd/>
+                <a:tailEnd/>
+              </a14:hiddenLine>
+            </a:ext>
+          </a:extLst>
+        </p:spPr>
+      </p:pic>
+      <p:sp>
+        <p:nvSpPr>
+          <p:cNvPr id="82" name="TextBox 12">
+            <a:extLst>
+              <a:ext uri="{FF2B5EF4-FFF2-40B4-BE49-F238E27FC236}">
+                <a16:creationId xmlns:a16="http://schemas.microsoft.com/office/drawing/2014/main" id="{F9CBC4C8-1AC9-A245-9EB0-1985F570C926}"/>
+              </a:ext>
+            </a:extLst>
+          </p:cNvPr>
+          <p:cNvSpPr txBox="1">
+            <a:spLocks noChangeArrowheads="1"/>
+          </p:cNvSpPr>
+          <p:nvPr/>
+        </p:nvSpPr>
+        <p:spPr bwMode="auto">
+          <a:xfrm>
+            <a:off x="3726555" y="2352799"/>
+            <a:ext cx="968331" cy="215444"/>
+          </a:xfrm>
+          <a:prstGeom prst="rect">
+            <a:avLst/>
+          </a:prstGeom>
+          <a:noFill/>
+          <a:ln>
+            <a:noFill/>
+          </a:ln>
+          <a:extLst>
+            <a:ext uri="{909E8E84-426E-40DD-AFC4-6F175D3DCCD1}">
+              <a14:hiddenFill xmlns:a14="http://schemas.microsoft.com/office/drawing/2010/main">
+                <a:solidFill>
+                  <a:srgbClr val="FFFFFF"/>
+                </a:solidFill>
+              </a14:hiddenFill>
+            </a:ext>
+            <a:ext uri="{91240B29-F687-4F45-9708-019B960494DF}">
+              <a14:hiddenLine xmlns:a14="http://schemas.microsoft.com/office/drawing/2010/main" w="9525">
+                <a:solidFill>
+                  <a:srgbClr val="000000"/>
+                </a:solidFill>
+                <a:miter lim="800000"/>
+                <a:headEnd/>
+                <a:tailEnd/>
+              </a14:hiddenLine>
+            </a:ext>
+          </a:extLst>
+        </p:spPr>
+        <p:txBody>
+          <a:bodyPr wrap="square">
+            <a:spAutoFit/>
+          </a:bodyPr>
+          <a:lstStyle>
+            <a:lvl1pPr>
+              <a:defRPr>
+                <a:solidFill>
+                  <a:schemeClr val="tx1"/>
+                </a:solidFill>
+                <a:latin typeface="Calibri" panose="020F0502020204030204" pitchFamily="34" charset="0"/>
+              </a:defRPr>
+            </a:lvl1pPr>
+            <a:lvl2pPr marL="742950" indent="-285750">
+              <a:defRPr>
+                <a:solidFill>
+                  <a:schemeClr val="tx1"/>
+                </a:solidFill>
+                <a:latin typeface="Calibri" panose="020F0502020204030204" pitchFamily="34" charset="0"/>
+              </a:defRPr>
+            </a:lvl2pPr>
+            <a:lvl3pPr marL="1143000" indent="-228600">
+              <a:defRPr>
+                <a:solidFill>
+                  <a:schemeClr val="tx1"/>
+                </a:solidFill>
+                <a:latin typeface="Calibri" panose="020F0502020204030204" pitchFamily="34" charset="0"/>
+              </a:defRPr>
+            </a:lvl3pPr>
+            <a:lvl4pPr marL="1600200" indent="-228600">
+              <a:defRPr>
+                <a:solidFill>
+                  <a:schemeClr val="tx1"/>
+                </a:solidFill>
+                <a:latin typeface="Calibri" panose="020F0502020204030204" pitchFamily="34" charset="0"/>
+              </a:defRPr>
+            </a:lvl4pPr>
+            <a:lvl5pPr marL="2057400" indent="-228600">
+              <a:defRPr>
+                <a:solidFill>
+                  <a:schemeClr val="tx1"/>
+                </a:solidFill>
+                <a:latin typeface="Calibri" panose="020F0502020204030204" pitchFamily="34" charset="0"/>
+              </a:defRPr>
+            </a:lvl5pPr>
+            <a:lvl6pPr marL="2514600" indent="-228600" eaLnBrk="0" fontAlgn="base" hangingPunct="0">
+              <a:spcBef>
+                <a:spcPct val="0"/>
+              </a:spcBef>
+              <a:spcAft>
+                <a:spcPct val="0"/>
+              </a:spcAft>
+              <a:defRPr>
+                <a:solidFill>
+                  <a:schemeClr val="tx1"/>
+                </a:solidFill>
+                <a:latin typeface="Calibri" panose="020F0502020204030204" pitchFamily="34" charset="0"/>
+              </a:defRPr>
+            </a:lvl6pPr>
+            <a:lvl7pPr marL="2971800" indent="-228600" eaLnBrk="0" fontAlgn="base" hangingPunct="0">
+              <a:spcBef>
+                <a:spcPct val="0"/>
+              </a:spcBef>
+              <a:spcAft>
+                <a:spcPct val="0"/>
+              </a:spcAft>
+              <a:defRPr>
+                <a:solidFill>
+                  <a:schemeClr val="tx1"/>
+                </a:solidFill>
+                <a:latin typeface="Calibri" panose="020F0502020204030204" pitchFamily="34" charset="0"/>
+              </a:defRPr>
+            </a:lvl7pPr>
+            <a:lvl8pPr marL="3429000" indent="-228600" eaLnBrk="0" fontAlgn="base" hangingPunct="0">
+              <a:spcBef>
+                <a:spcPct val="0"/>
+              </a:spcBef>
+              <a:spcAft>
+                <a:spcPct val="0"/>
+              </a:spcAft>
+              <a:defRPr>
+                <a:solidFill>
+                  <a:schemeClr val="tx1"/>
+                </a:solidFill>
+                <a:latin typeface="Calibri" panose="020F0502020204030204" pitchFamily="34" charset="0"/>
+              </a:defRPr>
+            </a:lvl8pPr>
+            <a:lvl9pPr marL="3886200" indent="-228600" eaLnBrk="0" fontAlgn="base" hangingPunct="0">
+              <a:spcBef>
+                <a:spcPct val="0"/>
+              </a:spcBef>
+              <a:spcAft>
+                <a:spcPct val="0"/>
+              </a:spcAft>
+              <a:defRPr>
+                <a:solidFill>
+                  <a:schemeClr val="tx1"/>
+                </a:solidFill>
+                <a:latin typeface="Calibri" panose="020F0502020204030204" pitchFamily="34" charset="0"/>
+              </a:defRPr>
+            </a:lvl9pPr>
+          </a:lstStyle>
+          <a:p>
+            <a:pPr algn="ctr" eaLnBrk="1" hangingPunct="1"/>
+            <a:r>
+              <a:rPr lang="en-US" altLang="en-US" sz="800" dirty="0">
+                <a:solidFill>
+                  <a:schemeClr val="bg1"/>
+                </a:solidFill>
+                <a:latin typeface="Arial" panose="020B0604020202020204" pitchFamily="34" charset="0"/>
+                <a:ea typeface="Amazon Ember" panose="020B0603020204020204" pitchFamily="34" charset="0"/>
+                <a:cs typeface="Arial" panose="020B0604020202020204" pitchFamily="34" charset="0"/>
+              </a:rPr>
+              <a:t>Internet gateway</a:t>
+            </a:r>
+          </a:p>
+        </p:txBody>
+      </p:sp>
+      <p:pic>
+        <p:nvPicPr>
+          <p:cNvPr id="83" name="Graphic 10">
+            <a:extLst>
+              <a:ext uri="{FF2B5EF4-FFF2-40B4-BE49-F238E27FC236}">
+                <a16:creationId xmlns:a16="http://schemas.microsoft.com/office/drawing/2014/main" id="{18B79DB9-DFDD-1145-B518-825244496939}"/>
+              </a:ext>
+            </a:extLst>
+          </p:cNvPr>
+          <p:cNvPicPr>
+            <a:picLocks noChangeAspect="1" noChangeArrowheads="1"/>
+          </p:cNvPicPr>
+          <p:nvPr/>
+        </p:nvPicPr>
+        <p:blipFill>
+          <a:blip r:embed="rId8">
+            <a:extLst>
+              <a:ext uri="{96DAC541-7B7A-43D3-8B79-37D633B846F1}">
+                <asvg:svgBlip xmlns:asvg="http://schemas.microsoft.com/office/drawing/2016/SVG/main" r:embed="rId9"/>
+              </a:ext>
+            </a:extLst>
+          </a:blip>
+          <a:srcRect/>
+          <a:stretch/>
+        </p:blipFill>
+        <p:spPr bwMode="auto">
+          <a:xfrm>
+            <a:off x="4068792" y="2130032"/>
+            <a:ext cx="262302" cy="262302"/>
+          </a:xfrm>
+          <a:prstGeom prst="rect">
+            <a:avLst/>
+          </a:prstGeom>
+          <a:noFill/>
+          <a:ln>
+            <a:noFill/>
+          </a:ln>
+          <a:extLst>
+            <a:ext uri="{909E8E84-426E-40DD-AFC4-6F175D3DCCD1}">
+              <a14:hiddenFill xmlns:a14="http://schemas.microsoft.com/office/drawing/2010/main">
+                <a:solidFill>
+                  <a:srgbClr val="FFFFFF"/>
+                </a:solidFill>
+              </a14:hiddenFill>
+            </a:ext>
+            <a:ext uri="{91240B29-F687-4F45-9708-019B960494DF}">
+              <a14:hiddenLine xmlns:a14="http://schemas.microsoft.com/office/drawing/2010/main" w="9525">
+                <a:solidFill>
+                  <a:srgbClr val="000000"/>
+                </a:solidFill>
+                <a:miter lim="800000"/>
+                <a:headEnd/>
+                <a:tailEnd/>
+              </a14:hiddenLine>
+            </a:ext>
+          </a:extLst>
+        </p:spPr>
+      </p:pic>
+      <p:sp>
+        <p:nvSpPr>
+          <p:cNvPr id="54" name="TextBox 53">
+            <a:extLst>
+              <a:ext uri="{FF2B5EF4-FFF2-40B4-BE49-F238E27FC236}">
+                <a16:creationId xmlns:a16="http://schemas.microsoft.com/office/drawing/2014/main" id="{6CEE8AB2-3FC6-3643-894C-4B461D9242D4}"/>
+              </a:ext>
+            </a:extLst>
+          </p:cNvPr>
+          <p:cNvSpPr txBox="1"/>
+          <p:nvPr/>
+        </p:nvSpPr>
+        <p:spPr>
+          <a:xfrm>
+            <a:off x="2467956" y="4331659"/>
+            <a:ext cx="852176" cy="200055"/>
+          </a:xfrm>
+          <a:prstGeom prst="rect">
+            <a:avLst/>
+          </a:prstGeom>
+          <a:solidFill>
+            <a:srgbClr val="8C5DDF"/>
+          </a:solidFill>
+        </p:spPr>
+        <p:txBody>
+          <a:bodyPr wrap="square" rtlCol="0">
+            <a:spAutoFit/>
+          </a:bodyPr>
+          <a:lstStyle/>
+          <a:p>
+            <a:pPr marL="0" marR="0" lvl="0" indent="0" algn="ctr" defTabSz="914400" rtl="0" eaLnBrk="0" fontAlgn="base" latinLnBrk="0" hangingPunct="0">
+              <a:lnSpc>
+                <a:spcPct val="100000"/>
+              </a:lnSpc>
+              <a:spcBef>
+                <a:spcPct val="0"/>
+              </a:spcBef>
+              <a:spcAft>
+                <a:spcPct val="0"/>
+              </a:spcAft>
+              <a:buClrTx/>
+              <a:buSzTx/>
+              <a:buFontTx/>
+              <a:buNone/>
+              <a:tabLst/>
+              <a:defRPr/>
+            </a:pPr>
+            <a:r>
+              <a:rPr kumimoji="0" lang="en-US" sz="700" b="0" i="0" u="none" strike="noStrike" kern="1200" cap="none" spc="0" normalizeH="0" baseline="0" noProof="0" dirty="0">
+                <a:ln>
+                  <a:noFill/>
+                </a:ln>
+                <a:solidFill>
+                  <a:srgbClr val="FAFAFA"/>
+                </a:solidFill>
+                <a:effectLst/>
+                <a:uLnTx/>
+                <a:uFillTx/>
+                <a:latin typeface="Arial" panose="020B0604020202020204" pitchFamily="34" charset="0"/>
+                <a:ea typeface="+mn-ea"/>
+                <a:cs typeface="Arial" panose="020B0604020202020204" pitchFamily="34" charset="0"/>
+              </a:rPr>
+              <a:t>NAT gateway1</a:t>
+            </a:r>
+          </a:p>
+        </p:txBody>
+      </p:sp>
+      <p:pic>
+        <p:nvPicPr>
+          <p:cNvPr id="70" name="Graphic 69">
+            <a:extLst>
+              <a:ext uri="{FF2B5EF4-FFF2-40B4-BE49-F238E27FC236}">
+                <a16:creationId xmlns:a16="http://schemas.microsoft.com/office/drawing/2014/main" id="{4E0C94BC-0F12-A340-88D9-FA05B186F071}"/>
+              </a:ext>
+            </a:extLst>
+          </p:cNvPr>
+          <p:cNvPicPr>
+            <a:picLocks noChangeAspect="1"/>
+          </p:cNvPicPr>
+          <p:nvPr/>
+        </p:nvPicPr>
+        <p:blipFill>
+          <a:blip r:embed="rId10">
+            <a:extLst>
+              <a:ext uri="{96DAC541-7B7A-43D3-8B79-37D633B846F1}">
+                <asvg:svgBlip xmlns:asvg="http://schemas.microsoft.com/office/drawing/2016/SVG/main" r:embed="rId11"/>
+              </a:ext>
+            </a:extLst>
+          </a:blip>
+          <a:stretch>
+            <a:fillRect/>
+          </a:stretch>
+        </p:blipFill>
+        <p:spPr>
+          <a:xfrm>
+            <a:off x="2776850" y="4024216"/>
+            <a:ext cx="289999" cy="289999"/>
+          </a:xfrm>
+          <a:prstGeom prst="rect">
+            <a:avLst/>
+          </a:prstGeom>
+        </p:spPr>
+      </p:pic>
+      <p:sp>
+        <p:nvSpPr>
+          <p:cNvPr id="84" name="TextBox 83">
+            <a:extLst>
+              <a:ext uri="{FF2B5EF4-FFF2-40B4-BE49-F238E27FC236}">
+                <a16:creationId xmlns:a16="http://schemas.microsoft.com/office/drawing/2014/main" id="{1A3867E0-DB43-2D44-B95C-C7A424E41BCF}"/>
+              </a:ext>
+            </a:extLst>
+          </p:cNvPr>
+          <p:cNvSpPr txBox="1"/>
+          <p:nvPr/>
+        </p:nvSpPr>
+        <p:spPr>
+          <a:xfrm>
+            <a:off x="6652559" y="4336996"/>
+            <a:ext cx="852176" cy="200055"/>
+          </a:xfrm>
+          <a:prstGeom prst="rect">
+            <a:avLst/>
+          </a:prstGeom>
+          <a:solidFill>
+            <a:srgbClr val="8C5DDF"/>
+          </a:solidFill>
+        </p:spPr>
+        <p:txBody>
+          <a:bodyPr wrap="square" rtlCol="0">
+            <a:spAutoFit/>
+          </a:bodyPr>
+          <a:lstStyle/>
+          <a:p>
+            <a:pPr marL="0" marR="0" lvl="0" indent="0" algn="ctr" defTabSz="914400" rtl="0" eaLnBrk="0" fontAlgn="base" latinLnBrk="0" hangingPunct="0">
+              <a:lnSpc>
+                <a:spcPct val="100000"/>
+              </a:lnSpc>
+              <a:spcBef>
+                <a:spcPct val="0"/>
+              </a:spcBef>
+              <a:spcAft>
+                <a:spcPct val="0"/>
+              </a:spcAft>
+              <a:buClrTx/>
+              <a:buSzTx/>
+              <a:buFontTx/>
+              <a:buNone/>
+              <a:tabLst/>
+              <a:defRPr/>
+            </a:pPr>
+            <a:r>
+              <a:rPr kumimoji="0" lang="en-US" sz="700" b="0" i="0" u="none" strike="noStrike" kern="1200" cap="none" spc="0" normalizeH="0" baseline="0" noProof="0" dirty="0">
+                <a:ln>
+                  <a:noFill/>
+                </a:ln>
+                <a:solidFill>
+                  <a:srgbClr val="FAFAFA"/>
+                </a:solidFill>
+                <a:effectLst/>
+                <a:uLnTx/>
+                <a:uFillTx/>
+                <a:latin typeface="Arial" panose="020B0604020202020204" pitchFamily="34" charset="0"/>
+                <a:ea typeface="+mn-ea"/>
+                <a:cs typeface="Arial" panose="020B0604020202020204" pitchFamily="34" charset="0"/>
+              </a:rPr>
+              <a:t>NAT gateway2</a:t>
+            </a:r>
+          </a:p>
+        </p:txBody>
+      </p:sp>
+      <p:pic>
+        <p:nvPicPr>
+          <p:cNvPr id="85" name="Graphic 84">
+            <a:extLst>
+              <a:ext uri="{FF2B5EF4-FFF2-40B4-BE49-F238E27FC236}">
+                <a16:creationId xmlns:a16="http://schemas.microsoft.com/office/drawing/2014/main" id="{2EDC3945-48CC-B145-95BA-F0253A7AC70D}"/>
+              </a:ext>
+            </a:extLst>
+          </p:cNvPr>
+          <p:cNvPicPr>
+            <a:picLocks noChangeAspect="1"/>
+          </p:cNvPicPr>
+          <p:nvPr/>
+        </p:nvPicPr>
+        <p:blipFill>
+          <a:blip r:embed="rId10">
+            <a:extLst>
+              <a:ext uri="{96DAC541-7B7A-43D3-8B79-37D633B846F1}">
+                <asvg:svgBlip xmlns:asvg="http://schemas.microsoft.com/office/drawing/2016/SVG/main" r:embed="rId11"/>
+              </a:ext>
+            </a:extLst>
+          </a:blip>
+          <a:stretch>
+            <a:fillRect/>
+          </a:stretch>
+        </p:blipFill>
+        <p:spPr>
+          <a:xfrm>
+            <a:off x="6961453" y="4029553"/>
+            <a:ext cx="289999" cy="289999"/>
+          </a:xfrm>
+          <a:prstGeom prst="rect">
+            <a:avLst/>
+          </a:prstGeom>
+        </p:spPr>
+      </p:pic>
+      <p:sp>
+        <p:nvSpPr>
+          <p:cNvPr id="86" name="Content Placeholder 3">
+            <a:extLst>
+              <a:ext uri="{FF2B5EF4-FFF2-40B4-BE49-F238E27FC236}">
+                <a16:creationId xmlns:a16="http://schemas.microsoft.com/office/drawing/2014/main" id="{BA4C86CF-BE68-D448-96A4-03FA680D42A7}"/>
+              </a:ext>
+            </a:extLst>
+          </p:cNvPr>
+          <p:cNvSpPr txBox="1">
+            <a:spLocks noChangeArrowheads="1"/>
+          </p:cNvSpPr>
+          <p:nvPr/>
+        </p:nvSpPr>
+        <p:spPr>
+          <a:xfrm>
+            <a:off x="8670464" y="1284354"/>
+            <a:ext cx="2954089" cy="3655211"/>
+          </a:xfrm>
+          <a:prstGeom prst="rect">
+            <a:avLst/>
+          </a:prstGeom>
+        </p:spPr>
+        <p:txBody>
+          <a:bodyPr/>
+          <a:lstStyle>
+            <a:lvl1pPr marL="0" indent="0" algn="l" defTabSz="914400" rtl="0" eaLnBrk="1" latinLnBrk="0" hangingPunct="1">
+              <a:lnSpc>
+                <a:spcPct val="90000"/>
+              </a:lnSpc>
+              <a:spcBef>
+                <a:spcPts val="1000"/>
+              </a:spcBef>
+              <a:buFont typeface="Arial" panose="020B0604020202020204" pitchFamily="34" charset="0"/>
+              <a:buNone/>
+              <a:defRPr sz="2400" kern="1200">
+                <a:solidFill>
+                  <a:schemeClr val="bg1"/>
+                </a:solidFill>
+                <a:latin typeface="Arial" panose="020B0604020202020204" pitchFamily="34" charset="0"/>
+                <a:ea typeface="+mn-ea"/>
+                <a:cs typeface="Arial" panose="020B0604020202020204" pitchFamily="34" charset="0"/>
+              </a:defRPr>
+            </a:lvl1pPr>
+            <a:lvl2pPr marL="457200" indent="0" algn="l" defTabSz="914400" rtl="0" eaLnBrk="1" latinLnBrk="0" hangingPunct="1">
+              <a:lnSpc>
+                <a:spcPct val="90000"/>
+              </a:lnSpc>
+              <a:spcBef>
+                <a:spcPts val="500"/>
+              </a:spcBef>
+              <a:buFont typeface="Arial" panose="020B0604020202020204" pitchFamily="34" charset="0"/>
+              <a:buNone/>
+              <a:defRPr sz="2000" kern="1200">
+                <a:solidFill>
+                  <a:schemeClr val="bg1"/>
+                </a:solidFill>
+                <a:latin typeface="Arial" panose="020B0604020202020204" pitchFamily="34" charset="0"/>
+                <a:ea typeface="+mn-ea"/>
+                <a:cs typeface="Arial" panose="020B0604020202020204" pitchFamily="34" charset="0"/>
+              </a:defRPr>
+            </a:lvl2pPr>
+            <a:lvl3pPr marL="914400" indent="0" algn="l" defTabSz="914400" rtl="0" eaLnBrk="1" latinLnBrk="0" hangingPunct="1">
+              <a:lnSpc>
+                <a:spcPct val="90000"/>
+              </a:lnSpc>
+              <a:spcBef>
+                <a:spcPts val="500"/>
+              </a:spcBef>
+              <a:buFont typeface="Arial" panose="020B0604020202020204" pitchFamily="34" charset="0"/>
+              <a:buNone/>
+              <a:defRPr sz="1800" kern="1200">
+                <a:solidFill>
+                  <a:schemeClr val="bg1"/>
+                </a:solidFill>
+                <a:latin typeface="Arial" panose="020B0604020202020204" pitchFamily="34" charset="0"/>
+                <a:ea typeface="+mn-ea"/>
+                <a:cs typeface="Arial" panose="020B0604020202020204" pitchFamily="34" charset="0"/>
+              </a:defRPr>
+            </a:lvl3pPr>
+            <a:lvl4pPr marL="1371600" indent="0" algn="l" defTabSz="914400" rtl="0" eaLnBrk="1" latinLnBrk="0" hangingPunct="1">
+              <a:lnSpc>
+                <a:spcPct val="90000"/>
+              </a:lnSpc>
+              <a:spcBef>
+                <a:spcPts val="500"/>
+              </a:spcBef>
+              <a:buFont typeface="Arial" panose="020B0604020202020204" pitchFamily="34" charset="0"/>
+              <a:buNone/>
+              <a:defRPr sz="1600" kern="1200">
+                <a:solidFill>
+                  <a:schemeClr val="bg1"/>
+                </a:solidFill>
+                <a:latin typeface="Arial" panose="020B0604020202020204" pitchFamily="34" charset="0"/>
+                <a:ea typeface="+mn-ea"/>
+                <a:cs typeface="Arial" panose="020B0604020202020204" pitchFamily="34" charset="0"/>
+              </a:defRPr>
+            </a:lvl4pPr>
+            <a:lvl5pPr marL="2057400" indent="-228600" algn="l" defTabSz="914400" rtl="0" eaLnBrk="1" latinLnBrk="0" hangingPunct="1">
+              <a:lnSpc>
+                <a:spcPct val="90000"/>
+              </a:lnSpc>
+              <a:spcBef>
+                <a:spcPts val="500"/>
+              </a:spcBef>
+              <a:buFont typeface="Arial" panose="020B0604020202020204" pitchFamily="34" charset="0"/>
+              <a:buChar char="•"/>
+              <a:defRPr sz="1800" kern="1200">
+                <a:solidFill>
+                  <a:schemeClr val="tx1"/>
+                </a:solidFill>
+                <a:latin typeface="Arial" panose="020B0604020202020204" pitchFamily="34" charset="0"/>
+                <a:ea typeface="+mn-ea"/>
+                <a:cs typeface="Arial" panose="020B0604020202020204" pitchFamily="34" charset="0"/>
+              </a:defRPr>
+            </a:lvl5pPr>
+            <a:lvl6pPr marL="2514600" indent="-228600" algn="l" defTabSz="914400" rtl="0" eaLnBrk="1" latinLnBrk="0" hangingPunct="1">
+              <a:lnSpc>
+                <a:spcPct val="90000"/>
+              </a:lnSpc>
+              <a:spcBef>
+                <a:spcPts val="500"/>
+              </a:spcBef>
+              <a:buFont typeface="Arial" panose="020B0604020202020204" pitchFamily="34" charset="0"/>
+              <a:buChar char="•"/>
+              <a:defRPr sz="1800" kern="1200">
+                <a:solidFill>
+                  <a:schemeClr val="tx1"/>
+                </a:solidFill>
+                <a:latin typeface="+mn-lt"/>
+                <a:ea typeface="+mn-ea"/>
+                <a:cs typeface="+mn-cs"/>
+              </a:defRPr>
+            </a:lvl6pPr>
+            <a:lvl7pPr marL="2971800" indent="-228600" algn="l" defTabSz="914400" rtl="0" eaLnBrk="1" latinLnBrk="0" hangingPunct="1">
+              <a:lnSpc>
+                <a:spcPct val="90000"/>
+              </a:lnSpc>
+              <a:spcBef>
+                <a:spcPts val="500"/>
+              </a:spcBef>
+              <a:buFont typeface="Arial" panose="020B0604020202020204" pitchFamily="34" charset="0"/>
+              <a:buChar char="•"/>
+              <a:defRPr sz="1800" kern="1200">
+                <a:solidFill>
+                  <a:schemeClr val="tx1"/>
+                </a:solidFill>
+                <a:latin typeface="+mn-lt"/>
+                <a:ea typeface="+mn-ea"/>
+                <a:cs typeface="+mn-cs"/>
+              </a:defRPr>
+            </a:lvl7pPr>
+            <a:lvl8pPr marL="3429000" indent="-228600" algn="l" defTabSz="914400" rtl="0" eaLnBrk="1" latinLnBrk="0" hangingPunct="1">
+              <a:lnSpc>
+                <a:spcPct val="90000"/>
+              </a:lnSpc>
+              <a:spcBef>
+                <a:spcPts val="500"/>
+              </a:spcBef>
+              <a:buFont typeface="Arial" panose="020B0604020202020204" pitchFamily="34" charset="0"/>
+              <a:buChar char="•"/>
+              <a:defRPr sz="1800" kern="1200">
+                <a:solidFill>
+                  <a:schemeClr val="tx1"/>
+                </a:solidFill>
+                <a:latin typeface="+mn-lt"/>
+                <a:ea typeface="+mn-ea"/>
+                <a:cs typeface="+mn-cs"/>
+              </a:defRPr>
+            </a:lvl8pPr>
+            <a:lvl9pPr marL="3886200" indent="-228600" algn="l" defTabSz="914400" rtl="0" eaLnBrk="1" latinLnBrk="0" hangingPunct="1">
+              <a:lnSpc>
+                <a:spcPct val="90000"/>
+              </a:lnSpc>
+              <a:spcBef>
+                <a:spcPts val="500"/>
+              </a:spcBef>
+              <a:buFont typeface="Arial" panose="020B0604020202020204" pitchFamily="34" charset="0"/>
+              <a:buChar char="•"/>
+              <a:defRPr sz="1800" kern="1200">
+                <a:solidFill>
+                  <a:schemeClr val="tx1"/>
+                </a:solidFill>
+                <a:latin typeface="+mn-lt"/>
+                <a:ea typeface="+mn-ea"/>
+                <a:cs typeface="+mn-cs"/>
+              </a:defRPr>
+            </a:lvl9pPr>
+          </a:lstStyle>
+          <a:p>
+            <a:pPr>
+              <a:spcBef>
+                <a:spcPts val="600"/>
+              </a:spcBef>
+            </a:pPr>
+            <a:r>
+              <a:rPr lang="en-US" sz="1200" b="1" dirty="0"/>
+              <a:t>Optional:</a:t>
+            </a:r>
+          </a:p>
+          <a:p>
+            <a:pPr>
+              <a:spcBef>
+                <a:spcPts val="600"/>
+              </a:spcBef>
+            </a:pPr>
+            <a:r>
+              <a:rPr lang="en-US" sz="1000" dirty="0"/>
+              <a:t>NAT Gateway1 &amp; NAT Gateway2</a:t>
+            </a:r>
+          </a:p>
+          <a:p>
+            <a:pPr>
+              <a:spcBef>
+                <a:spcPts val="600"/>
+              </a:spcBef>
+            </a:pPr>
+            <a:r>
+              <a:rPr lang="en-US" sz="1200" b="1" dirty="0"/>
+              <a:t>Output/Export Name:</a:t>
+            </a:r>
+          </a:p>
+          <a:p>
+            <a:r>
+              <a:rPr lang="en-AU" sz="1000" dirty="0"/>
+              <a:t>VPC:</a:t>
+            </a:r>
+          </a:p>
+          <a:p>
+            <a:pPr lvl="1"/>
+            <a:r>
+              <a:rPr lang="en-AU" sz="1000" dirty="0"/>
+              <a:t>Name: </a:t>
+            </a:r>
+            <a:r>
+              <a:rPr lang="en-AU" sz="1000" dirty="0">
+                <a:solidFill>
+                  <a:srgbClr val="FF9300"/>
+                </a:solidFill>
+              </a:rPr>
+              <a:t>sharedinf-vpcid</a:t>
+            </a:r>
+          </a:p>
+          <a:p>
+            <a:r>
+              <a:rPr lang="en-AU" sz="1000" dirty="0"/>
+              <a:t>PublicSubnet1:</a:t>
+            </a:r>
+          </a:p>
+          <a:p>
+            <a:pPr lvl="1"/>
+            <a:r>
+              <a:rPr lang="en-AU" sz="1000" dirty="0"/>
+              <a:t>Name: </a:t>
+            </a:r>
+            <a:r>
+              <a:rPr lang="en-AU" sz="1000" dirty="0">
+                <a:solidFill>
+                  <a:srgbClr val="FF9300"/>
+                </a:solidFill>
+              </a:rPr>
+              <a:t>sharedinf-publicsubnet1</a:t>
+            </a:r>
+          </a:p>
+          <a:p>
+            <a:r>
+              <a:rPr lang="en-AU" sz="1000" dirty="0"/>
+              <a:t>PublicSubnet2:</a:t>
+            </a:r>
+          </a:p>
+          <a:p>
+            <a:pPr lvl="1"/>
+            <a:r>
+              <a:rPr lang="en-AU" sz="1000" dirty="0"/>
+              <a:t>Name: </a:t>
+            </a:r>
+            <a:r>
+              <a:rPr lang="en-AU" sz="1000" dirty="0">
+                <a:solidFill>
+                  <a:srgbClr val="FF9300"/>
+                </a:solidFill>
+              </a:rPr>
+              <a:t>sharedinf-publicsubnet2</a:t>
+            </a:r>
+          </a:p>
+          <a:p>
+            <a:r>
+              <a:rPr lang="en-AU" sz="1000" dirty="0"/>
+              <a:t>PrivateSubnet1:</a:t>
+            </a:r>
+          </a:p>
+          <a:p>
+            <a:pPr lvl="1"/>
+            <a:r>
+              <a:rPr lang="en-AU" sz="1000" dirty="0"/>
+              <a:t>Name: </a:t>
+            </a:r>
+            <a:r>
+              <a:rPr lang="en-AU" sz="1000" dirty="0">
+                <a:solidFill>
+                  <a:srgbClr val="FF9300"/>
+                </a:solidFill>
+              </a:rPr>
+              <a:t>sharedinf-privatesubnet1</a:t>
+            </a:r>
+          </a:p>
+          <a:p>
+            <a:r>
+              <a:rPr lang="en-AU" sz="1000" dirty="0"/>
+              <a:t>PrivateSubnet2:</a:t>
+            </a:r>
+          </a:p>
+          <a:p>
+            <a:pPr lvl="1"/>
+            <a:r>
+              <a:rPr lang="en-AU" sz="1000" dirty="0"/>
+              <a:t>Name: </a:t>
+            </a:r>
+            <a:r>
+              <a:rPr lang="en-AU" sz="1000" dirty="0">
+                <a:solidFill>
+                  <a:srgbClr val="FF9300"/>
+                </a:solidFill>
+              </a:rPr>
+              <a:t>sharedinf-privatesubnet2</a:t>
+            </a:r>
+          </a:p>
+          <a:p>
+            <a:endParaRPr lang="en-US" sz="1200" dirty="0"/>
+          </a:p>
+        </p:txBody>
+      </p:sp>
+      <p:sp>
+        <p:nvSpPr>
+          <p:cNvPr id="28" name="Rectangle 27">
+            <a:extLst>
+              <a:ext uri="{FF2B5EF4-FFF2-40B4-BE49-F238E27FC236}">
+                <a16:creationId xmlns:a16="http://schemas.microsoft.com/office/drawing/2014/main" id="{CECEABEB-EFC7-3946-963A-AA64D906CEF3}"/>
+              </a:ext>
+            </a:extLst>
+          </p:cNvPr>
+          <p:cNvSpPr/>
+          <p:nvPr/>
+        </p:nvSpPr>
+        <p:spPr>
+          <a:xfrm>
+            <a:off x="4005574" y="2531382"/>
+            <a:ext cx="1765300" cy="345808"/>
+          </a:xfrm>
+          <a:prstGeom prst="rect">
+            <a:avLst/>
+          </a:prstGeom>
+          <a:noFill/>
+          <a:ln w="12700">
+            <a:solidFill>
+              <a:srgbClr val="FC584C"/>
+            </a:solidFill>
+          </a:ln>
+        </p:spPr>
+        <p:style>
+          <a:lnRef idx="2">
+            <a:schemeClr val="accent1">
+              <a:shade val="50000"/>
+            </a:schemeClr>
+          </a:lnRef>
+          <a:fillRef idx="1">
+            <a:schemeClr val="accent1"/>
+          </a:fillRef>
+          <a:effectRef idx="0">
+            <a:schemeClr val="accent1"/>
+          </a:effectRef>
+          <a:fontRef idx="minor">
+            <a:schemeClr val="lt1"/>
+          </a:fontRef>
+        </p:style>
+        <p:txBody>
+          <a:bodyPr tIns="91440" anchorCtr="1"/>
+          <a:lstStyle/>
+          <a:p>
+            <a:pPr algn="ctr" eaLnBrk="1" fontAlgn="auto" hangingPunct="1">
+              <a:spcBef>
+                <a:spcPts val="0"/>
+              </a:spcBef>
+              <a:spcAft>
+                <a:spcPts val="0"/>
+              </a:spcAft>
+              <a:defRPr/>
+            </a:pPr>
+            <a:r>
+              <a:rPr lang="en-US" sz="800" dirty="0">
+                <a:solidFill>
+                  <a:srgbClr val="FC584C"/>
+                </a:solidFill>
+                <a:latin typeface="Arial" panose="020B0604020202020204" pitchFamily="34" charset="0"/>
+                <a:cs typeface="Arial" panose="020B0604020202020204" pitchFamily="34" charset="0"/>
+              </a:rPr>
+              <a:t>Security group</a:t>
+            </a:r>
+          </a:p>
+          <a:p>
+            <a:pPr algn="ctr" eaLnBrk="1" fontAlgn="auto" hangingPunct="1">
+              <a:spcBef>
+                <a:spcPts val="0"/>
+              </a:spcBef>
+              <a:spcAft>
+                <a:spcPts val="0"/>
+              </a:spcAft>
+              <a:defRPr/>
+            </a:pPr>
+            <a:r>
+              <a:rPr lang="en-US" sz="800" dirty="0">
+                <a:solidFill>
+                  <a:srgbClr val="FC584C"/>
+                </a:solidFill>
+                <a:latin typeface="Arial" panose="020B0604020202020204" pitchFamily="34" charset="0"/>
+                <a:cs typeface="Arial" panose="020B0604020202020204" pitchFamily="34" charset="0"/>
+              </a:rPr>
+              <a:t>WebDMZ</a:t>
+            </a:r>
+          </a:p>
+        </p:txBody>
+      </p:sp>
+      <p:sp>
+        <p:nvSpPr>
+          <p:cNvPr id="29" name="Rectangle 28">
+            <a:extLst>
+              <a:ext uri="{FF2B5EF4-FFF2-40B4-BE49-F238E27FC236}">
+                <a16:creationId xmlns:a16="http://schemas.microsoft.com/office/drawing/2014/main" id="{B4C12889-980A-004D-B90E-05F2010ABC3E}"/>
+              </a:ext>
+            </a:extLst>
+          </p:cNvPr>
+          <p:cNvSpPr/>
+          <p:nvPr/>
+        </p:nvSpPr>
+        <p:spPr>
+          <a:xfrm>
+            <a:off x="3994781" y="3985851"/>
+            <a:ext cx="1765300" cy="345808"/>
+          </a:xfrm>
+          <a:prstGeom prst="rect">
+            <a:avLst/>
+          </a:prstGeom>
+          <a:noFill/>
+          <a:ln w="12700">
+            <a:solidFill>
+              <a:srgbClr val="FC584C"/>
+            </a:solidFill>
+          </a:ln>
+        </p:spPr>
+        <p:style>
+          <a:lnRef idx="2">
+            <a:schemeClr val="accent1">
+              <a:shade val="50000"/>
+            </a:schemeClr>
+          </a:lnRef>
+          <a:fillRef idx="1">
+            <a:schemeClr val="accent1"/>
+          </a:fillRef>
+          <a:effectRef idx="0">
+            <a:schemeClr val="accent1"/>
+          </a:effectRef>
+          <a:fontRef idx="minor">
+            <a:schemeClr val="lt1"/>
+          </a:fontRef>
+        </p:style>
+        <p:txBody>
+          <a:bodyPr tIns="91440" anchorCtr="1"/>
+          <a:lstStyle/>
+          <a:p>
+            <a:pPr algn="ctr" eaLnBrk="1" fontAlgn="auto" hangingPunct="1">
+              <a:spcBef>
+                <a:spcPts val="0"/>
+              </a:spcBef>
+              <a:spcAft>
+                <a:spcPts val="0"/>
+              </a:spcAft>
+              <a:defRPr/>
+            </a:pPr>
+            <a:r>
+              <a:rPr lang="en-US" sz="800" dirty="0">
+                <a:solidFill>
+                  <a:srgbClr val="FC584C"/>
+                </a:solidFill>
+                <a:latin typeface="Arial" panose="020B0604020202020204" pitchFamily="34" charset="0"/>
+                <a:cs typeface="Arial" panose="020B0604020202020204" pitchFamily="34" charset="0"/>
+              </a:rPr>
+              <a:t>Security group</a:t>
+            </a:r>
+          </a:p>
+          <a:p>
+            <a:pPr algn="ctr" eaLnBrk="1" fontAlgn="auto" hangingPunct="1">
+              <a:spcBef>
+                <a:spcPts val="0"/>
+              </a:spcBef>
+              <a:spcAft>
+                <a:spcPts val="0"/>
+              </a:spcAft>
+              <a:defRPr/>
+            </a:pPr>
+            <a:r>
+              <a:rPr lang="en-US" sz="800" dirty="0">
+                <a:solidFill>
+                  <a:srgbClr val="FC584C"/>
+                </a:solidFill>
+                <a:latin typeface="Arial" panose="020B0604020202020204" pitchFamily="34" charset="0"/>
+                <a:cs typeface="Arial" panose="020B0604020202020204" pitchFamily="34" charset="0"/>
+              </a:rPr>
+              <a:t>Database</a:t>
+            </a:r>
+          </a:p>
+        </p:txBody>
+      </p:sp>
+    </p:spTree>
+    <p:extLst>
+      <p:ext uri="{BB962C8B-B14F-4D97-AF65-F5344CB8AC3E}">
+        <p14:creationId xmlns:p14="http://schemas.microsoft.com/office/powerpoint/2010/main" val="1696751525"/>
+      </p:ext>
+    </p:extLst>
+  </p:cSld>
+  <p:clrMapOvr>
+    <a:masterClrMapping/>
+  </p:clrMapOvr>
+</p:sld>
+</file>
+
 <file path=ppt/theme/theme1.xml><?xml version="1.0" encoding="utf-8"?>
 <a:theme xmlns:a="http://schemas.openxmlformats.org/drawingml/2006/main" name="1_Title-and-content_DB">
   <a:themeElements>

</xml_diff>

<commit_message>
Added S3 bucket template
</commit_message>
<xml_diff>
--- a/Infrastructure/Network_Architect.pptx
+++ b/Infrastructure/Network_Architect.pptx
@@ -8,6 +8,8 @@
     <p:sldId id="471" r:id="rId2"/>
     <p:sldId id="470" r:id="rId3"/>
     <p:sldId id="472" r:id="rId4"/>
+    <p:sldId id="473" r:id="rId5"/>
+    <p:sldId id="474" r:id="rId6"/>
   </p:sldIdLst>
   <p:sldSz cx="12192000" cy="6858000"/>
   <p:notesSz cx="6858000" cy="9144000"/>
@@ -11559,7 +11561,7 @@
             <a:pPr eaLnBrk="1" hangingPunct="1"/>
             <a:r>
               <a:rPr lang="en-US" altLang="en-US" dirty="0"/>
-              <a:t>VPC_1</a:t>
+              <a:t>vpc_1</a:t>
             </a:r>
           </a:p>
         </p:txBody>
@@ -13990,7 +13992,7 @@
             <a:pPr eaLnBrk="1" hangingPunct="1"/>
             <a:r>
               <a:rPr lang="en-US" altLang="en-US" dirty="0"/>
-              <a:t>SECURITY_GROUP_1</a:t>
+              <a:t>security_group_1</a:t>
             </a:r>
           </a:p>
         </p:txBody>
@@ -14009,7 +14011,7 @@
         </p:nvSpPr>
         <p:spPr>
           <a:xfrm>
-            <a:off x="1427369" y="2088481"/>
+            <a:off x="607564" y="2088481"/>
             <a:ext cx="6831151" cy="3394919"/>
           </a:xfrm>
           <a:prstGeom prst="rect">
@@ -14096,7 +14098,7 @@
         </p:nvSpPr>
         <p:spPr>
           <a:xfrm>
-            <a:off x="1353758" y="1209216"/>
+            <a:off x="533953" y="1209216"/>
             <a:ext cx="7167409" cy="4715862"/>
           </a:xfrm>
           <a:prstGeom prst="rect">
@@ -14185,7 +14187,7 @@
         </p:nvSpPr>
         <p:spPr>
           <a:xfrm>
-            <a:off x="1805285" y="1702744"/>
+            <a:off x="985480" y="1702744"/>
             <a:ext cx="1943131" cy="3891076"/>
           </a:xfrm>
           <a:prstGeom prst="rect">
@@ -14275,7 +14277,7 @@
         </p:nvSpPr>
         <p:spPr>
           <a:xfrm>
-            <a:off x="1892328" y="2918754"/>
+            <a:off x="1072523" y="2918754"/>
             <a:ext cx="6072055" cy="976172"/>
           </a:xfrm>
           <a:prstGeom prst="rect">
@@ -14362,7 +14364,7 @@
         </p:nvSpPr>
         <p:spPr>
           <a:xfrm>
-            <a:off x="6033521" y="1702744"/>
+            <a:off x="5213716" y="1702744"/>
             <a:ext cx="2017905" cy="3891076"/>
           </a:xfrm>
           <a:prstGeom prst="rect">
@@ -14452,7 +14454,7 @@
         </p:nvSpPr>
         <p:spPr>
           <a:xfrm>
-            <a:off x="1892328" y="4421346"/>
+            <a:off x="1072523" y="4421346"/>
             <a:ext cx="6072055" cy="976172"/>
           </a:xfrm>
           <a:prstGeom prst="rect">
@@ -14553,7 +14555,7 @@
         </p:blipFill>
         <p:spPr>
           <a:xfrm>
-            <a:off x="1353758" y="1203046"/>
+            <a:off x="533953" y="1203046"/>
             <a:ext cx="400579" cy="400579"/>
           </a:xfrm>
           <a:prstGeom prst="rect">
@@ -14589,7 +14591,7 @@
         </p:blipFill>
         <p:spPr>
           <a:xfrm>
-            <a:off x="1418660" y="2092126"/>
+            <a:off x="598855" y="2092126"/>
             <a:ext cx="340775" cy="340775"/>
           </a:xfrm>
           <a:prstGeom prst="rect">
@@ -14810,7 +14812,7 @@
         </p:nvSpPr>
         <p:spPr>
           <a:xfrm>
-            <a:off x="1970370" y="4473145"/>
+            <a:off x="1150565" y="4473145"/>
             <a:ext cx="1677239" cy="830389"/>
           </a:xfrm>
           <a:prstGeom prst="rect">
@@ -14903,7 +14905,7 @@
         </p:nvSpPr>
         <p:spPr>
           <a:xfrm>
-            <a:off x="6112046" y="4473145"/>
+            <a:off x="5292241" y="4473145"/>
             <a:ext cx="1693906" cy="830389"/>
           </a:xfrm>
           <a:prstGeom prst="rect">
@@ -14999,7 +15001,7 @@
         </p:blipFill>
         <p:spPr bwMode="auto">
           <a:xfrm>
-            <a:off x="1970370" y="4474269"/>
+            <a:off x="1150565" y="4474269"/>
             <a:ext cx="274637" cy="274637"/>
           </a:xfrm>
           <a:prstGeom prst="rect">
@@ -15059,7 +15061,7 @@
         </p:blipFill>
         <p:spPr bwMode="auto">
           <a:xfrm>
-            <a:off x="6112046" y="4478374"/>
+            <a:off x="5292241" y="4478374"/>
             <a:ext cx="274637" cy="274637"/>
           </a:xfrm>
           <a:prstGeom prst="rect">
@@ -15104,7 +15106,7 @@
         </p:nvSpPr>
         <p:spPr>
           <a:xfrm>
-            <a:off x="1970370" y="2981492"/>
+            <a:off x="1150565" y="2981492"/>
             <a:ext cx="1677239" cy="881957"/>
           </a:xfrm>
           <a:prstGeom prst="rect">
@@ -15212,7 +15214,7 @@
         </p:blipFill>
         <p:spPr bwMode="auto">
           <a:xfrm>
-            <a:off x="1970370" y="2981492"/>
+            <a:off x="1150565" y="2981492"/>
             <a:ext cx="260938" cy="260937"/>
           </a:xfrm>
           <a:prstGeom prst="rect">
@@ -15257,7 +15259,7 @@
         </p:nvSpPr>
         <p:spPr>
           <a:xfrm>
-            <a:off x="6128713" y="2981492"/>
+            <a:off x="5308908" y="2981492"/>
             <a:ext cx="1677239" cy="881957"/>
           </a:xfrm>
           <a:prstGeom prst="rect">
@@ -15365,7 +15367,7 @@
         </p:blipFill>
         <p:spPr bwMode="auto">
           <a:xfrm>
-            <a:off x="6128713" y="2981492"/>
+            <a:off x="5308908" y="2981492"/>
             <a:ext cx="260938" cy="260937"/>
           </a:xfrm>
           <a:prstGeom prst="rect">
@@ -15412,7 +15414,7 @@
         </p:nvSpPr>
         <p:spPr bwMode="auto">
           <a:xfrm>
-            <a:off x="3726555" y="2352799"/>
+            <a:off x="2906750" y="2352799"/>
             <a:ext cx="968331" cy="215444"/>
           </a:xfrm>
           <a:prstGeom prst="rect">
@@ -15587,7 +15589,7 @@
         </p:blipFill>
         <p:spPr bwMode="auto">
           <a:xfrm>
-            <a:off x="4068792" y="2130032"/>
+            <a:off x="3248987" y="2130032"/>
             <a:ext cx="262302" cy="262302"/>
           </a:xfrm>
           <a:prstGeom prst="rect">
@@ -15632,7 +15634,7 @@
         </p:nvSpPr>
         <p:spPr>
           <a:xfrm>
-            <a:off x="2467956" y="4331659"/>
+            <a:off x="1648151" y="4331659"/>
             <a:ext cx="852176" cy="200055"/>
           </a:xfrm>
           <a:prstGeom prst="rect">
@@ -15713,7 +15715,7 @@
         </p:blipFill>
         <p:spPr>
           <a:xfrm>
-            <a:off x="2776850" y="4024216"/>
+            <a:off x="1957045" y="4024216"/>
             <a:ext cx="289999" cy="289999"/>
           </a:xfrm>
           <a:prstGeom prst="rect">
@@ -15735,7 +15737,7 @@
         </p:nvSpPr>
         <p:spPr>
           <a:xfrm>
-            <a:off x="6652559" y="4336996"/>
+            <a:off x="5832754" y="4336996"/>
             <a:ext cx="852176" cy="200055"/>
           </a:xfrm>
           <a:prstGeom prst="rect">
@@ -15816,7 +15818,7 @@
         </p:blipFill>
         <p:spPr>
           <a:xfrm>
-            <a:off x="6961453" y="4029553"/>
+            <a:off x="6141648" y="4029553"/>
             <a:ext cx="289999" cy="289999"/>
           </a:xfrm>
           <a:prstGeom prst="rect">
@@ -15840,8 +15842,8 @@
         </p:nvSpPr>
         <p:spPr>
           <a:xfrm>
-            <a:off x="8670464" y="1284354"/>
-            <a:ext cx="2954089" cy="3655211"/>
+            <a:off x="7890243" y="1284354"/>
+            <a:ext cx="4154612" cy="3655211"/>
           </a:xfrm>
           <a:prstGeom prst="rect">
             <a:avLst/>
@@ -16021,7 +16023,7 @@
             </a:pPr>
             <a:r>
               <a:rPr lang="en-US" sz="1200" b="1" dirty="0"/>
-              <a:t>Optional:</a:t>
+              <a:t>New resources added:</a:t>
             </a:r>
           </a:p>
           <a:p>
@@ -16032,8 +16034,16 @@
             </a:pPr>
             <a:r>
               <a:rPr lang="en-US" sz="1000" dirty="0"/>
-              <a:t>NAT Gateway1 &amp; NAT Gateway2</a:t>
-            </a:r>
+              <a:t>WebDMZ and DatabaseSG</a:t>
+            </a:r>
+          </a:p>
+          <a:p>
+            <a:pPr>
+              <a:spcBef>
+                <a:spcPts val="600"/>
+              </a:spcBef>
+            </a:pPr>
+            <a:endParaRPr lang="en-US" sz="1200" b="1" dirty="0"/>
           </a:p>
           <a:p>
             <a:pPr>
@@ -16048,8 +16058,12 @@
           </a:p>
           <a:p>
             <a:r>
+              <a:rPr lang="en-AU" sz="1000" dirty="0" err="1"/>
+              <a:t>WebDMZ</a:t>
+            </a:r>
+            <a:r>
               <a:rPr lang="en-AU" sz="1000" dirty="0"/>
-              <a:t>VPC:</a:t>
+              <a:t>:</a:t>
             </a:r>
           </a:p>
           <a:p>
@@ -16064,13 +16078,54 @@
                   <a:srgbClr val="FF9300"/>
                 </a:solidFill>
               </a:rPr>
-              <a:t>sharedinf-vpcid</a:t>
-            </a:r>
-          </a:p>
-          <a:p>
+              <a:t>${</a:t>
+            </a:r>
+            <a:r>
+              <a:rPr lang="en-AU" sz="1000" dirty="0" err="1">
+                <a:solidFill>
+                  <a:srgbClr val="FF9300"/>
+                </a:solidFill>
+              </a:rPr>
+              <a:t>VpcStackName</a:t>
+            </a:r>
+            <a:r>
+              <a:rPr lang="en-AU" sz="1000" dirty="0">
+                <a:solidFill>
+                  <a:srgbClr val="FF9300"/>
+                </a:solidFill>
+              </a:rPr>
+              <a:t>}-</a:t>
+            </a:r>
+            <a:r>
+              <a:rPr lang="en-AU" sz="1000" dirty="0" err="1">
+                <a:solidFill>
+                  <a:srgbClr val="FF9300"/>
+                </a:solidFill>
+              </a:rPr>
+              <a:t>sharedinf-webdmzid</a:t>
+            </a:r>
+            <a:endParaRPr lang="en-AU" sz="1000" dirty="0">
+              <a:solidFill>
+                <a:srgbClr val="FF9300"/>
+              </a:solidFill>
+            </a:endParaRPr>
+          </a:p>
+          <a:p>
+            <a:pPr lvl="1"/>
+            <a:endParaRPr lang="en-AU" sz="1000" dirty="0">
+              <a:solidFill>
+                <a:srgbClr val="FF9300"/>
+              </a:solidFill>
+            </a:endParaRPr>
+          </a:p>
+          <a:p>
+            <a:r>
+              <a:rPr lang="en-AU" sz="1000" dirty="0" err="1"/>
+              <a:t>DatabaseSG</a:t>
+            </a:r>
             <a:r>
               <a:rPr lang="en-AU" sz="1000" dirty="0"/>
-              <a:t>PublicSubnet1:</a:t>
+              <a:t>:</a:t>
             </a:r>
           </a:p>
           <a:p>
@@ -16085,70 +16140,121 @@
                   <a:srgbClr val="FF9300"/>
                 </a:solidFill>
               </a:rPr>
-              <a:t>sharedinf-publicsubnet1</a:t>
-            </a:r>
-          </a:p>
-          <a:p>
-            <a:r>
-              <a:rPr lang="en-AU" sz="1000" dirty="0"/>
-              <a:t>PublicSubnet2:</a:t>
+              <a:t>${</a:t>
+            </a:r>
+            <a:r>
+              <a:rPr lang="en-AU" sz="1000" dirty="0" err="1">
+                <a:solidFill>
+                  <a:srgbClr val="FF9300"/>
+                </a:solidFill>
+              </a:rPr>
+              <a:t>VpcStackName</a:t>
+            </a:r>
+            <a:r>
+              <a:rPr lang="en-AU" sz="1000" dirty="0">
+                <a:solidFill>
+                  <a:srgbClr val="FF9300"/>
+                </a:solidFill>
+              </a:rPr>
+              <a:t>}-</a:t>
+            </a:r>
+            <a:r>
+              <a:rPr lang="en-AU" sz="1000" dirty="0" err="1">
+                <a:solidFill>
+                  <a:srgbClr val="FF9300"/>
+                </a:solidFill>
+              </a:rPr>
+              <a:t>sharedinf-databasesgid</a:t>
+            </a:r>
+            <a:r>
+              <a:rPr lang="en-AU" sz="1000" dirty="0">
+                <a:solidFill>
+                  <a:srgbClr val="FF9300"/>
+                </a:solidFill>
+              </a:rPr>
+              <a:t> </a:t>
             </a:r>
           </a:p>
           <a:p>
             <a:pPr lvl="1"/>
-            <a:r>
-              <a:rPr lang="en-AU" sz="1000" dirty="0"/>
-              <a:t>Name: </a:t>
-            </a:r>
-            <a:r>
-              <a:rPr lang="en-AU" sz="1000" dirty="0">
-                <a:solidFill>
-                  <a:srgbClr val="FF9300"/>
-                </a:solidFill>
-              </a:rPr>
-              <a:t>sharedinf-publicsubnet2</a:t>
-            </a:r>
-          </a:p>
-          <a:p>
-            <a:r>
-              <a:rPr lang="en-AU" sz="1000" dirty="0"/>
-              <a:t>PrivateSubnet1:</a:t>
-            </a:r>
-          </a:p>
-          <a:p>
-            <a:pPr lvl="1"/>
-            <a:r>
-              <a:rPr lang="en-AU" sz="1000" dirty="0"/>
-              <a:t>Name: </a:t>
-            </a:r>
-            <a:r>
-              <a:rPr lang="en-AU" sz="1000" dirty="0">
-                <a:solidFill>
-                  <a:srgbClr val="FF9300"/>
-                </a:solidFill>
-              </a:rPr>
-              <a:t>sharedinf-privatesubnet1</a:t>
-            </a:r>
-          </a:p>
-          <a:p>
-            <a:r>
-              <a:rPr lang="en-AU" sz="1000" dirty="0"/>
-              <a:t>PrivateSubnet2:</a:t>
-            </a:r>
-          </a:p>
-          <a:p>
-            <a:pPr lvl="1"/>
-            <a:r>
-              <a:rPr lang="en-AU" sz="1000" dirty="0"/>
-              <a:t>Name: </a:t>
-            </a:r>
-            <a:r>
-              <a:rPr lang="en-AU" sz="1000" dirty="0">
-                <a:solidFill>
-                  <a:srgbClr val="FF9300"/>
-                </a:solidFill>
-              </a:rPr>
-              <a:t>sharedinf-privatesubnet2</a:t>
+            <a:endParaRPr lang="en-AU" sz="1000" dirty="0">
+              <a:solidFill>
+                <a:srgbClr val="FF9300"/>
+              </a:solidFill>
+            </a:endParaRPr>
+          </a:p>
+          <a:p>
+            <a:pPr>
+              <a:spcBef>
+                <a:spcPts val="600"/>
+              </a:spcBef>
+            </a:pPr>
+            <a:r>
+              <a:rPr lang="en-US" sz="1000" b="1" dirty="0"/>
+              <a:t>Ingress policy for WebDMZ:</a:t>
+            </a:r>
+          </a:p>
+          <a:p>
+            <a:pPr marL="171450" indent="-171450">
+              <a:spcBef>
+                <a:spcPts val="600"/>
+              </a:spcBef>
+              <a:buFont typeface="Arial" panose="020B0604020202020204" pitchFamily="34" charset="0"/>
+              <a:buChar char="•"/>
+            </a:pPr>
+            <a:r>
+              <a:rPr lang="en-US" sz="1000" dirty="0"/>
+              <a:t>Allow http/https from Internet</a:t>
+            </a:r>
+          </a:p>
+          <a:p>
+            <a:pPr marL="171450" indent="-171450">
+              <a:spcBef>
+                <a:spcPts val="600"/>
+              </a:spcBef>
+              <a:buFont typeface="Arial" panose="020B0604020202020204" pitchFamily="34" charset="0"/>
+              <a:buChar char="•"/>
+            </a:pPr>
+            <a:r>
+              <a:rPr lang="en-US" sz="1000" dirty="0"/>
+              <a:t>Allow SSH from Internet</a:t>
+            </a:r>
+          </a:p>
+          <a:p>
+            <a:pPr marL="171450" indent="-171450">
+              <a:spcBef>
+                <a:spcPts val="600"/>
+              </a:spcBef>
+              <a:buFont typeface="Arial" panose="020B0604020202020204" pitchFamily="34" charset="0"/>
+              <a:buChar char="•"/>
+            </a:pPr>
+            <a:r>
+              <a:rPr lang="en-US" sz="1000" dirty="0"/>
+              <a:t>Allow SQL from DatabaseSG</a:t>
+            </a:r>
+          </a:p>
+          <a:p>
+            <a:pPr>
+              <a:spcBef>
+                <a:spcPts val="600"/>
+              </a:spcBef>
+            </a:pPr>
+            <a:r>
+              <a:rPr lang="en-US" sz="1000" b="1" dirty="0"/>
+              <a:t>Ingress policy for DatabaseSG:</a:t>
+            </a:r>
+          </a:p>
+          <a:p>
+            <a:pPr marL="171450" indent="-171450">
+              <a:spcBef>
+                <a:spcPts val="600"/>
+              </a:spcBef>
+              <a:buFont typeface="Arial" panose="020B0604020202020204" pitchFamily="34" charset="0"/>
+              <a:buChar char="•"/>
+            </a:pPr>
+            <a:r>
+              <a:rPr lang="en-US" sz="1000" dirty="0"/>
+              <a:t>Allow SQL from WebDMZ</a:t>
             </a:r>
           </a:p>
           <a:p>
@@ -16170,7 +16276,7 @@
         </p:nvSpPr>
         <p:spPr>
           <a:xfrm>
-            <a:off x="4005574" y="2531382"/>
+            <a:off x="3185769" y="2531382"/>
             <a:ext cx="1765300" cy="345808"/>
           </a:xfrm>
           <a:prstGeom prst="rect">
@@ -16260,7 +16366,7 @@
         </p:nvSpPr>
         <p:spPr>
           <a:xfrm>
-            <a:off x="3994781" y="3985851"/>
+            <a:off x="3174976" y="3985851"/>
             <a:ext cx="1765300" cy="345808"/>
           </a:xfrm>
           <a:prstGeom prst="rect">
@@ -16340,6 +16446,4027 @@
     <p:extLst>
       <p:ext uri="{BB962C8B-B14F-4D97-AF65-F5344CB8AC3E}">
         <p14:creationId xmlns:p14="http://schemas.microsoft.com/office/powerpoint/2010/main" val="1696751525"/>
+      </p:ext>
+    </p:extLst>
+  </p:cSld>
+  <p:clrMapOvr>
+    <a:masterClrMapping/>
+  </p:clrMapOvr>
+</p:sld>
+</file>
+
+<file path=ppt/slides/slide4.xml><?xml version="1.0" encoding="utf-8"?>
+<p:sld xmlns:a="http://schemas.openxmlformats.org/drawingml/2006/main" xmlns:r="http://schemas.openxmlformats.org/officeDocument/2006/relationships" xmlns:p="http://schemas.openxmlformats.org/presentationml/2006/main">
+  <p:cSld>
+    <p:spTree>
+      <p:nvGrpSpPr>
+        <p:cNvPr id="1" name=""/>
+        <p:cNvGrpSpPr/>
+        <p:nvPr/>
+      </p:nvGrpSpPr>
+      <p:grpSpPr>
+        <a:xfrm>
+          <a:off x="0" y="0"/>
+          <a:ext cx="0" cy="0"/>
+          <a:chOff x="0" y="0"/>
+          <a:chExt cx="0" cy="0"/>
+        </a:xfrm>
+      </p:grpSpPr>
+      <p:sp>
+        <p:nvSpPr>
+          <p:cNvPr id="47117" name="Slide Number Placeholder 37">
+            <a:extLst>
+              <a:ext uri="{FF2B5EF4-FFF2-40B4-BE49-F238E27FC236}">
+                <a16:creationId xmlns:a16="http://schemas.microsoft.com/office/drawing/2014/main" id="{2E567938-C0BD-E540-B624-F078B8BCE8A1}"/>
+              </a:ext>
+            </a:extLst>
+          </p:cNvPr>
+          <p:cNvSpPr>
+            <a:spLocks noGrp="1" noChangeArrowheads="1"/>
+          </p:cNvSpPr>
+          <p:nvPr>
+            <p:ph type="sldNum" sz="quarter" idx="4"/>
+          </p:nvPr>
+        </p:nvSpPr>
+        <p:spPr bwMode="auto">
+          <a:noFill/>
+          <a:extLst>
+            <a:ext uri="{909E8E84-426E-40DD-AFC4-6F175D3DCCD1}">
+              <a14:hiddenFill xmlns:a14="http://schemas.microsoft.com/office/drawing/2010/main">
+                <a:solidFill>
+                  <a:srgbClr val="FFFFFF"/>
+                </a:solidFill>
+              </a14:hiddenFill>
+            </a:ext>
+            <a:ext uri="{91240B29-F687-4F45-9708-019B960494DF}">
+              <a14:hiddenLine xmlns:a14="http://schemas.microsoft.com/office/drawing/2010/main" w="9525">
+                <a:solidFill>
+                  <a:srgbClr val="000000"/>
+                </a:solidFill>
+                <a:miter lim="800000"/>
+                <a:headEnd/>
+                <a:tailEnd/>
+              </a14:hiddenLine>
+            </a:ext>
+          </a:extLst>
+        </p:spPr>
+        <p:txBody>
+          <a:bodyPr wrap="square" numCol="1" anchorCtr="0" compatLnSpc="1">
+            <a:prstTxWarp prst="textNoShape">
+              <a:avLst/>
+            </a:prstTxWarp>
+          </a:bodyPr>
+          <a:lstStyle>
+            <a:lvl1pPr>
+              <a:defRPr>
+                <a:solidFill>
+                  <a:schemeClr val="tx1"/>
+                </a:solidFill>
+                <a:latin typeface="Calibri" panose="020F0502020204030204" pitchFamily="34" charset="0"/>
+              </a:defRPr>
+            </a:lvl1pPr>
+            <a:lvl2pPr marL="742950" indent="-285750">
+              <a:defRPr>
+                <a:solidFill>
+                  <a:schemeClr val="tx1"/>
+                </a:solidFill>
+                <a:latin typeface="Calibri" panose="020F0502020204030204" pitchFamily="34" charset="0"/>
+              </a:defRPr>
+            </a:lvl2pPr>
+            <a:lvl3pPr marL="1143000" indent="-228600">
+              <a:defRPr>
+                <a:solidFill>
+                  <a:schemeClr val="tx1"/>
+                </a:solidFill>
+                <a:latin typeface="Calibri" panose="020F0502020204030204" pitchFamily="34" charset="0"/>
+              </a:defRPr>
+            </a:lvl3pPr>
+            <a:lvl4pPr marL="1600200" indent="-228600">
+              <a:defRPr>
+                <a:solidFill>
+                  <a:schemeClr val="tx1"/>
+                </a:solidFill>
+                <a:latin typeface="Calibri" panose="020F0502020204030204" pitchFamily="34" charset="0"/>
+              </a:defRPr>
+            </a:lvl4pPr>
+            <a:lvl5pPr marL="2057400" indent="-228600">
+              <a:defRPr>
+                <a:solidFill>
+                  <a:schemeClr val="tx1"/>
+                </a:solidFill>
+                <a:latin typeface="Calibri" panose="020F0502020204030204" pitchFamily="34" charset="0"/>
+              </a:defRPr>
+            </a:lvl5pPr>
+            <a:lvl6pPr marL="2514600" indent="-228600" eaLnBrk="0" fontAlgn="base" hangingPunct="0">
+              <a:spcBef>
+                <a:spcPct val="0"/>
+              </a:spcBef>
+              <a:spcAft>
+                <a:spcPct val="0"/>
+              </a:spcAft>
+              <a:defRPr>
+                <a:solidFill>
+                  <a:schemeClr val="tx1"/>
+                </a:solidFill>
+                <a:latin typeface="Calibri" panose="020F0502020204030204" pitchFamily="34" charset="0"/>
+              </a:defRPr>
+            </a:lvl6pPr>
+            <a:lvl7pPr marL="2971800" indent="-228600" eaLnBrk="0" fontAlgn="base" hangingPunct="0">
+              <a:spcBef>
+                <a:spcPct val="0"/>
+              </a:spcBef>
+              <a:spcAft>
+                <a:spcPct val="0"/>
+              </a:spcAft>
+              <a:defRPr>
+                <a:solidFill>
+                  <a:schemeClr val="tx1"/>
+                </a:solidFill>
+                <a:latin typeface="Calibri" panose="020F0502020204030204" pitchFamily="34" charset="0"/>
+              </a:defRPr>
+            </a:lvl7pPr>
+            <a:lvl8pPr marL="3429000" indent="-228600" eaLnBrk="0" fontAlgn="base" hangingPunct="0">
+              <a:spcBef>
+                <a:spcPct val="0"/>
+              </a:spcBef>
+              <a:spcAft>
+                <a:spcPct val="0"/>
+              </a:spcAft>
+              <a:defRPr>
+                <a:solidFill>
+                  <a:schemeClr val="tx1"/>
+                </a:solidFill>
+                <a:latin typeface="Calibri" panose="020F0502020204030204" pitchFamily="34" charset="0"/>
+              </a:defRPr>
+            </a:lvl8pPr>
+            <a:lvl9pPr marL="3886200" indent="-228600" eaLnBrk="0" fontAlgn="base" hangingPunct="0">
+              <a:spcBef>
+                <a:spcPct val="0"/>
+              </a:spcBef>
+              <a:spcAft>
+                <a:spcPct val="0"/>
+              </a:spcAft>
+              <a:defRPr>
+                <a:solidFill>
+                  <a:schemeClr val="tx1"/>
+                </a:solidFill>
+                <a:latin typeface="Calibri" panose="020F0502020204030204" pitchFamily="34" charset="0"/>
+              </a:defRPr>
+            </a:lvl9pPr>
+          </a:lstStyle>
+          <a:p>
+            <a:pPr marL="0" marR="0" lvl="0" indent="0" algn="r" defTabSz="914400" rtl="0" eaLnBrk="0" fontAlgn="base" latinLnBrk="0" hangingPunct="0">
+              <a:lnSpc>
+                <a:spcPct val="100000"/>
+              </a:lnSpc>
+              <a:spcBef>
+                <a:spcPct val="0"/>
+              </a:spcBef>
+              <a:spcAft>
+                <a:spcPct val="0"/>
+              </a:spcAft>
+              <a:buClrTx/>
+              <a:buSzTx/>
+              <a:buFontTx/>
+              <a:buNone/>
+              <a:tabLst/>
+              <a:defRPr/>
+            </a:pPr>
+            <a:fld id="{006A2D43-0584-8040-91B5-2138A277CB9C}" type="slidenum">
+              <a:rPr kumimoji="0" lang="en-US" altLang="en-US" sz="1200" b="0" i="0" u="none" strike="noStrike" kern="1200" cap="none" spc="0" normalizeH="0" baseline="0" noProof="0" smtClean="0">
+                <a:ln>
+                  <a:noFill/>
+                </a:ln>
+                <a:solidFill>
+                  <a:prstClr val="white"/>
+                </a:solidFill>
+                <a:effectLst/>
+                <a:uLnTx/>
+                <a:uFillTx/>
+                <a:latin typeface="Arial" panose="020B0604020202020204" pitchFamily="34" charset="0"/>
+                <a:ea typeface="+mn-ea"/>
+                <a:cs typeface="Arial" panose="020B0604020202020204" pitchFamily="34" charset="0"/>
+              </a:rPr>
+              <a:pPr marL="0" marR="0" lvl="0" indent="0" algn="r" defTabSz="914400" rtl="0" eaLnBrk="0" fontAlgn="base" latinLnBrk="0" hangingPunct="0">
+                <a:lnSpc>
+                  <a:spcPct val="100000"/>
+                </a:lnSpc>
+                <a:spcBef>
+                  <a:spcPct val="0"/>
+                </a:spcBef>
+                <a:spcAft>
+                  <a:spcPct val="0"/>
+                </a:spcAft>
+                <a:buClrTx/>
+                <a:buSzTx/>
+                <a:buFontTx/>
+                <a:buNone/>
+                <a:tabLst/>
+                <a:defRPr/>
+              </a:pPr>
+              <a:t>4</a:t>
+            </a:fld>
+            <a:endParaRPr kumimoji="0" lang="en-US" altLang="en-US" sz="1200" b="0" i="0" u="none" strike="noStrike" kern="1200" cap="none" spc="0" normalizeH="0" baseline="0" noProof="0" dirty="0">
+              <a:ln>
+                <a:noFill/>
+              </a:ln>
+              <a:solidFill>
+                <a:prstClr val="white"/>
+              </a:solidFill>
+              <a:effectLst/>
+              <a:uLnTx/>
+              <a:uFillTx/>
+              <a:latin typeface="Arial" panose="020B0604020202020204" pitchFamily="34" charset="0"/>
+              <a:ea typeface="+mn-ea"/>
+              <a:cs typeface="Arial" panose="020B0604020202020204" pitchFamily="34" charset="0"/>
+            </a:endParaRPr>
+          </a:p>
+        </p:txBody>
+      </p:sp>
+      <p:sp>
+        <p:nvSpPr>
+          <p:cNvPr id="47105" name="Title 1">
+            <a:extLst>
+              <a:ext uri="{FF2B5EF4-FFF2-40B4-BE49-F238E27FC236}">
+                <a16:creationId xmlns:a16="http://schemas.microsoft.com/office/drawing/2014/main" id="{6EA39E97-4C97-AD40-972C-394E863845C9}"/>
+              </a:ext>
+            </a:extLst>
+          </p:cNvPr>
+          <p:cNvSpPr>
+            <a:spLocks noGrp="1" noChangeArrowheads="1"/>
+          </p:cNvSpPr>
+          <p:nvPr>
+            <p:ph type="title"/>
+          </p:nvPr>
+        </p:nvSpPr>
+        <p:spPr/>
+        <p:txBody>
+          <a:bodyPr/>
+          <a:lstStyle/>
+          <a:p>
+            <a:pPr eaLnBrk="1" hangingPunct="1"/>
+            <a:r>
+              <a:rPr lang="en-US" altLang="en-US" dirty="0"/>
+              <a:t>networkACL_1</a:t>
+            </a:r>
+          </a:p>
+        </p:txBody>
+      </p:sp>
+      <p:sp>
+        <p:nvSpPr>
+          <p:cNvPr id="48" name="Rectangle 47">
+            <a:extLst>
+              <a:ext uri="{FF2B5EF4-FFF2-40B4-BE49-F238E27FC236}">
+                <a16:creationId xmlns:a16="http://schemas.microsoft.com/office/drawing/2014/main" id="{D4ED084E-134F-3C43-88B0-C497DC66EF56}"/>
+              </a:ext>
+            </a:extLst>
+          </p:cNvPr>
+          <p:cNvSpPr/>
+          <p:nvPr/>
+        </p:nvSpPr>
+        <p:spPr>
+          <a:xfrm>
+            <a:off x="607564" y="2088481"/>
+            <a:ext cx="6831151" cy="3394919"/>
+          </a:xfrm>
+          <a:prstGeom prst="rect">
+            <a:avLst/>
+          </a:prstGeom>
+          <a:noFill/>
+          <a:ln w="12700">
+            <a:solidFill>
+              <a:schemeClr val="accent6"/>
+            </a:solidFill>
+          </a:ln>
+        </p:spPr>
+        <p:style>
+          <a:lnRef idx="2">
+            <a:schemeClr val="accent1">
+              <a:shade val="50000"/>
+            </a:schemeClr>
+          </a:lnRef>
+          <a:fillRef idx="1">
+            <a:schemeClr val="accent1"/>
+          </a:fillRef>
+          <a:effectRef idx="0">
+            <a:schemeClr val="accent1"/>
+          </a:effectRef>
+          <a:fontRef idx="minor">
+            <a:schemeClr val="lt1"/>
+          </a:fontRef>
+        </p:style>
+        <p:txBody>
+          <a:bodyPr rot="0" spcFirstLastPara="0" vertOverflow="overflow" horzOverflow="overflow" vert="horz" wrap="square" lIns="457200" tIns="91440" rIns="91440" bIns="45720" numCol="1" spcCol="0" rtlCol="0" fromWordArt="0" anchor="t" anchorCtr="0" forceAA="0" compatLnSpc="1">
+            <a:prstTxWarp prst="textNoShape">
+              <a:avLst/>
+            </a:prstTxWarp>
+            <a:noAutofit/>
+          </a:bodyPr>
+          <a:lstStyle/>
+          <a:p>
+            <a:pPr marL="0" marR="0" lvl="0" indent="0" algn="l" defTabSz="914400" rtl="0" eaLnBrk="0" fontAlgn="base" latinLnBrk="0" hangingPunct="0">
+              <a:lnSpc>
+                <a:spcPct val="100000"/>
+              </a:lnSpc>
+              <a:spcBef>
+                <a:spcPct val="0"/>
+              </a:spcBef>
+              <a:spcAft>
+                <a:spcPct val="0"/>
+              </a:spcAft>
+              <a:buClrTx/>
+              <a:buSzTx/>
+              <a:buFontTx/>
+              <a:buNone/>
+              <a:tabLst/>
+              <a:defRPr/>
+            </a:pPr>
+            <a:r>
+              <a:rPr kumimoji="0" lang="en-US" sz="1200" b="0" i="0" u="none" strike="noStrike" kern="1200" cap="none" spc="0" normalizeH="0" baseline="0" noProof="0" dirty="0">
+                <a:ln w="0"/>
+                <a:solidFill>
+                  <a:srgbClr val="70AD47"/>
+                </a:solidFill>
+                <a:effectLst/>
+                <a:uLnTx/>
+                <a:uFillTx/>
+                <a:latin typeface="Arial" panose="020B0604020202020204" pitchFamily="34" charset="0"/>
+                <a:ea typeface="+mn-ea"/>
+                <a:cs typeface="Arial" panose="020B0604020202020204" pitchFamily="34" charset="0"/>
+              </a:rPr>
+              <a:t>VPC</a:t>
+            </a:r>
+          </a:p>
+        </p:txBody>
+      </p:sp>
+      <p:sp>
+        <p:nvSpPr>
+          <p:cNvPr id="49" name="Rectangle 48">
+            <a:extLst>
+              <a:ext uri="{FF2B5EF4-FFF2-40B4-BE49-F238E27FC236}">
+                <a16:creationId xmlns:a16="http://schemas.microsoft.com/office/drawing/2014/main" id="{C4B84CB2-3636-3247-BF16-7F5D8F01E041}"/>
+              </a:ext>
+            </a:extLst>
+          </p:cNvPr>
+          <p:cNvSpPr/>
+          <p:nvPr/>
+        </p:nvSpPr>
+        <p:spPr>
+          <a:xfrm>
+            <a:off x="533953" y="1209216"/>
+            <a:ext cx="7167409" cy="4715862"/>
+          </a:xfrm>
+          <a:prstGeom prst="rect">
+            <a:avLst/>
+          </a:prstGeom>
+          <a:noFill/>
+          <a:ln w="12700">
+            <a:solidFill>
+              <a:srgbClr val="FAFAFA"/>
+            </a:solidFill>
+          </a:ln>
+        </p:spPr>
+        <p:style>
+          <a:lnRef idx="2">
+            <a:schemeClr val="accent1">
+              <a:shade val="50000"/>
+            </a:schemeClr>
+          </a:lnRef>
+          <a:fillRef idx="1">
+            <a:schemeClr val="accent1"/>
+          </a:fillRef>
+          <a:effectRef idx="0">
+            <a:schemeClr val="accent1"/>
+          </a:effectRef>
+          <a:fontRef idx="minor">
+            <a:schemeClr val="lt1"/>
+          </a:fontRef>
+        </p:style>
+        <p:txBody>
+          <a:bodyPr rot="0" spcFirstLastPara="0" vertOverflow="overflow" horzOverflow="overflow" vert="horz" wrap="square" lIns="457200" tIns="91440" rIns="91440" bIns="45720" numCol="1" spcCol="0" rtlCol="0" fromWordArt="0" anchor="t" anchorCtr="0" forceAA="0" compatLnSpc="1">
+            <a:prstTxWarp prst="textNoShape">
+              <a:avLst/>
+            </a:prstTxWarp>
+            <a:noAutofit/>
+          </a:bodyPr>
+          <a:lstStyle/>
+          <a:p>
+            <a:pPr marL="0" marR="0" lvl="0" indent="0" algn="l" defTabSz="914400" rtl="0" eaLnBrk="0" fontAlgn="base" latinLnBrk="0" hangingPunct="0">
+              <a:lnSpc>
+                <a:spcPct val="100000"/>
+              </a:lnSpc>
+              <a:spcBef>
+                <a:spcPct val="0"/>
+              </a:spcBef>
+              <a:spcAft>
+                <a:spcPct val="0"/>
+              </a:spcAft>
+              <a:buClrTx/>
+              <a:buSzTx/>
+              <a:buFontTx/>
+              <a:buNone/>
+              <a:tabLst/>
+              <a:defRPr/>
+            </a:pPr>
+            <a:r>
+              <a:rPr kumimoji="0" lang="en-US" sz="1200" b="0" i="0" u="none" strike="noStrike" kern="1200" cap="none" spc="0" normalizeH="0" baseline="0" noProof="0" dirty="0">
+                <a:ln>
+                  <a:noFill/>
+                </a:ln>
+                <a:solidFill>
+                  <a:srgbClr val="FAFAFA"/>
+                </a:solidFill>
+                <a:effectLst/>
+                <a:uLnTx/>
+                <a:uFillTx/>
+                <a:latin typeface="Arial" panose="020B0604020202020204" pitchFamily="34" charset="0"/>
+                <a:ea typeface="+mn-ea"/>
+                <a:cs typeface="Arial" panose="020B0604020202020204" pitchFamily="34" charset="0"/>
+              </a:rPr>
+              <a:t>AWS Cloud</a:t>
+            </a:r>
+          </a:p>
+        </p:txBody>
+      </p:sp>
+      <p:sp>
+        <p:nvSpPr>
+          <p:cNvPr id="50" name="Rectangle 49">
+            <a:extLst>
+              <a:ext uri="{FF2B5EF4-FFF2-40B4-BE49-F238E27FC236}">
+                <a16:creationId xmlns:a16="http://schemas.microsoft.com/office/drawing/2014/main" id="{850D0C08-8DB5-A34E-9C0A-542E572D39EE}"/>
+              </a:ext>
+            </a:extLst>
+          </p:cNvPr>
+          <p:cNvSpPr/>
+          <p:nvPr/>
+        </p:nvSpPr>
+        <p:spPr>
+          <a:xfrm>
+            <a:off x="985480" y="1702744"/>
+            <a:ext cx="1943131" cy="3891076"/>
+          </a:xfrm>
+          <a:prstGeom prst="rect">
+            <a:avLst/>
+          </a:prstGeom>
+          <a:noFill/>
+          <a:ln w="12700">
+            <a:solidFill>
+              <a:srgbClr val="00A0C8"/>
+            </a:solidFill>
+            <a:prstDash val="dash"/>
+          </a:ln>
+        </p:spPr>
+        <p:style>
+          <a:lnRef idx="2">
+            <a:schemeClr val="accent1">
+              <a:shade val="50000"/>
+            </a:schemeClr>
+          </a:lnRef>
+          <a:fillRef idx="1">
+            <a:schemeClr val="accent1"/>
+          </a:fillRef>
+          <a:effectRef idx="0">
+            <a:schemeClr val="accent1"/>
+          </a:effectRef>
+          <a:fontRef idx="minor">
+            <a:schemeClr val="lt1"/>
+          </a:fontRef>
+        </p:style>
+        <p:txBody>
+          <a:bodyPr rot="0" spcFirstLastPara="0" vertOverflow="overflow" horzOverflow="overflow" vert="horz" wrap="square" lIns="91440" tIns="91440" rIns="91440" bIns="45720" numCol="1" spcCol="0" rtlCol="0" fromWordArt="0" anchor="t" anchorCtr="0" forceAA="0" compatLnSpc="1">
+            <a:prstTxWarp prst="textNoShape">
+              <a:avLst/>
+            </a:prstTxWarp>
+            <a:noAutofit/>
+          </a:bodyPr>
+          <a:lstStyle/>
+          <a:p>
+            <a:pPr marL="0" marR="0" lvl="0" indent="0" algn="ctr" defTabSz="914400" rtl="0" eaLnBrk="0" fontAlgn="base" latinLnBrk="0" hangingPunct="0">
+              <a:lnSpc>
+                <a:spcPct val="100000"/>
+              </a:lnSpc>
+              <a:spcBef>
+                <a:spcPct val="0"/>
+              </a:spcBef>
+              <a:spcAft>
+                <a:spcPct val="0"/>
+              </a:spcAft>
+              <a:buClrTx/>
+              <a:buSzTx/>
+              <a:buFontTx/>
+              <a:buNone/>
+              <a:tabLst/>
+              <a:defRPr/>
+            </a:pPr>
+            <a:r>
+              <a:rPr kumimoji="0" lang="en-US" sz="1200" b="0" i="0" u="none" strike="noStrike" kern="1200" cap="none" spc="0" normalizeH="0" baseline="0" noProof="0" dirty="0">
+                <a:ln>
+                  <a:noFill/>
+                </a:ln>
+                <a:solidFill>
+                  <a:srgbClr val="00A0C8"/>
+                </a:solidFill>
+                <a:effectLst/>
+                <a:uLnTx/>
+                <a:uFillTx/>
+                <a:latin typeface="Arial" panose="020B0604020202020204" pitchFamily="34" charset="0"/>
+                <a:ea typeface="+mn-ea"/>
+                <a:cs typeface="Arial" panose="020B0604020202020204" pitchFamily="34" charset="0"/>
+              </a:rPr>
+              <a:t>Availability Zone 1</a:t>
+            </a:r>
+          </a:p>
+        </p:txBody>
+      </p:sp>
+      <p:sp>
+        <p:nvSpPr>
+          <p:cNvPr id="51" name="Rectangle 50">
+            <a:extLst>
+              <a:ext uri="{FF2B5EF4-FFF2-40B4-BE49-F238E27FC236}">
+                <a16:creationId xmlns:a16="http://schemas.microsoft.com/office/drawing/2014/main" id="{DC1E2E24-48B0-E648-A152-EDE87C541201}"/>
+              </a:ext>
+            </a:extLst>
+          </p:cNvPr>
+          <p:cNvSpPr/>
+          <p:nvPr/>
+        </p:nvSpPr>
+        <p:spPr>
+          <a:xfrm>
+            <a:off x="1072523" y="2918754"/>
+            <a:ext cx="6072055" cy="976172"/>
+          </a:xfrm>
+          <a:prstGeom prst="rect">
+            <a:avLst/>
+          </a:prstGeom>
+          <a:noFill/>
+          <a:ln w="12700">
+            <a:solidFill>
+              <a:srgbClr val="FF9900"/>
+            </a:solidFill>
+            <a:prstDash val="dash"/>
+          </a:ln>
+        </p:spPr>
+        <p:style>
+          <a:lnRef idx="2">
+            <a:schemeClr val="accent1">
+              <a:shade val="50000"/>
+            </a:schemeClr>
+          </a:lnRef>
+          <a:fillRef idx="1">
+            <a:schemeClr val="accent1"/>
+          </a:fillRef>
+          <a:effectRef idx="0">
+            <a:schemeClr val="accent1"/>
+          </a:effectRef>
+          <a:fontRef idx="minor">
+            <a:schemeClr val="lt1"/>
+          </a:fontRef>
+        </p:style>
+        <p:txBody>
+          <a:bodyPr rot="0" spcFirstLastPara="0" vertOverflow="overflow" horzOverflow="overflow" vert="horz" wrap="square" lIns="91440" tIns="91440" rIns="91440" bIns="45720" numCol="1" spcCol="0" rtlCol="0" fromWordArt="0" anchor="t" anchorCtr="0" forceAA="0" compatLnSpc="1">
+            <a:prstTxWarp prst="textNoShape">
+              <a:avLst/>
+            </a:prstTxWarp>
+            <a:noAutofit/>
+          </a:bodyPr>
+          <a:lstStyle/>
+          <a:p>
+            <a:pPr marL="0" marR="0" lvl="0" indent="0" algn="ctr" defTabSz="914400" rtl="0" eaLnBrk="0" fontAlgn="base" latinLnBrk="0" hangingPunct="0">
+              <a:lnSpc>
+                <a:spcPct val="100000"/>
+              </a:lnSpc>
+              <a:spcBef>
+                <a:spcPct val="0"/>
+              </a:spcBef>
+              <a:spcAft>
+                <a:spcPct val="0"/>
+              </a:spcAft>
+              <a:buClrTx/>
+              <a:buSzTx/>
+              <a:buFontTx/>
+              <a:buNone/>
+              <a:tabLst/>
+              <a:defRPr/>
+            </a:pPr>
+            <a:endParaRPr kumimoji="0" lang="en-US" sz="1400" b="0" i="0" u="none" strike="noStrike" kern="1200" cap="none" spc="0" normalizeH="0" baseline="0" noProof="0" dirty="0">
+              <a:ln>
+                <a:noFill/>
+              </a:ln>
+              <a:solidFill>
+                <a:srgbClr val="FF9900"/>
+              </a:solidFill>
+              <a:effectLst/>
+              <a:uLnTx/>
+              <a:uFillTx/>
+              <a:latin typeface="Calibri" panose="020F0502020204030204"/>
+              <a:ea typeface="+mn-ea"/>
+              <a:cs typeface="+mn-cs"/>
+            </a:endParaRPr>
+          </a:p>
+        </p:txBody>
+      </p:sp>
+      <p:sp>
+        <p:nvSpPr>
+          <p:cNvPr id="52" name="Rectangle 51">
+            <a:extLst>
+              <a:ext uri="{FF2B5EF4-FFF2-40B4-BE49-F238E27FC236}">
+                <a16:creationId xmlns:a16="http://schemas.microsoft.com/office/drawing/2014/main" id="{3FC0DD88-617F-1443-9D58-968DC97591C9}"/>
+              </a:ext>
+            </a:extLst>
+          </p:cNvPr>
+          <p:cNvSpPr/>
+          <p:nvPr/>
+        </p:nvSpPr>
+        <p:spPr>
+          <a:xfrm>
+            <a:off x="5213716" y="1702744"/>
+            <a:ext cx="2017905" cy="3891076"/>
+          </a:xfrm>
+          <a:prstGeom prst="rect">
+            <a:avLst/>
+          </a:prstGeom>
+          <a:noFill/>
+          <a:ln w="12700">
+            <a:solidFill>
+              <a:srgbClr val="00A0C8"/>
+            </a:solidFill>
+            <a:prstDash val="dash"/>
+          </a:ln>
+        </p:spPr>
+        <p:style>
+          <a:lnRef idx="2">
+            <a:schemeClr val="accent1">
+              <a:shade val="50000"/>
+            </a:schemeClr>
+          </a:lnRef>
+          <a:fillRef idx="1">
+            <a:schemeClr val="accent1"/>
+          </a:fillRef>
+          <a:effectRef idx="0">
+            <a:schemeClr val="accent1"/>
+          </a:effectRef>
+          <a:fontRef idx="minor">
+            <a:schemeClr val="lt1"/>
+          </a:fontRef>
+        </p:style>
+        <p:txBody>
+          <a:bodyPr rot="0" spcFirstLastPara="0" vertOverflow="overflow" horzOverflow="overflow" vert="horz" wrap="square" lIns="91440" tIns="91440" rIns="91440" bIns="45720" numCol="1" spcCol="0" rtlCol="0" fromWordArt="0" anchor="t" anchorCtr="0" forceAA="0" compatLnSpc="1">
+            <a:prstTxWarp prst="textNoShape">
+              <a:avLst/>
+            </a:prstTxWarp>
+            <a:noAutofit/>
+          </a:bodyPr>
+          <a:lstStyle/>
+          <a:p>
+            <a:pPr marL="0" marR="0" lvl="0" indent="0" algn="ctr" defTabSz="914400" rtl="0" eaLnBrk="0" fontAlgn="base" latinLnBrk="0" hangingPunct="0">
+              <a:lnSpc>
+                <a:spcPct val="100000"/>
+              </a:lnSpc>
+              <a:spcBef>
+                <a:spcPct val="0"/>
+              </a:spcBef>
+              <a:spcAft>
+                <a:spcPct val="0"/>
+              </a:spcAft>
+              <a:buClrTx/>
+              <a:buSzTx/>
+              <a:buFontTx/>
+              <a:buNone/>
+              <a:tabLst/>
+              <a:defRPr/>
+            </a:pPr>
+            <a:r>
+              <a:rPr kumimoji="0" lang="en-US" sz="1200" b="0" i="0" u="none" strike="noStrike" kern="1200" cap="none" spc="0" normalizeH="0" baseline="0" noProof="0" dirty="0">
+                <a:ln>
+                  <a:noFill/>
+                </a:ln>
+                <a:solidFill>
+                  <a:srgbClr val="00A0C8"/>
+                </a:solidFill>
+                <a:effectLst/>
+                <a:uLnTx/>
+                <a:uFillTx/>
+                <a:latin typeface="Arial" panose="020B0604020202020204" pitchFamily="34" charset="0"/>
+                <a:ea typeface="+mn-ea"/>
+                <a:cs typeface="Arial" panose="020B0604020202020204" pitchFamily="34" charset="0"/>
+              </a:rPr>
+              <a:t>Availability Zone 2</a:t>
+            </a:r>
+          </a:p>
+        </p:txBody>
+      </p:sp>
+      <p:sp>
+        <p:nvSpPr>
+          <p:cNvPr id="53" name="Rectangle 52">
+            <a:extLst>
+              <a:ext uri="{FF2B5EF4-FFF2-40B4-BE49-F238E27FC236}">
+                <a16:creationId xmlns:a16="http://schemas.microsoft.com/office/drawing/2014/main" id="{00B4B0C8-6D14-284D-B119-75AD2529DE7F}"/>
+              </a:ext>
+            </a:extLst>
+          </p:cNvPr>
+          <p:cNvSpPr/>
+          <p:nvPr/>
+        </p:nvSpPr>
+        <p:spPr>
+          <a:xfrm>
+            <a:off x="1072523" y="4421346"/>
+            <a:ext cx="6072055" cy="976172"/>
+          </a:xfrm>
+          <a:prstGeom prst="rect">
+            <a:avLst/>
+          </a:prstGeom>
+          <a:noFill/>
+          <a:ln w="12700">
+            <a:solidFill>
+              <a:srgbClr val="FF9900"/>
+            </a:solidFill>
+            <a:prstDash val="dash"/>
+          </a:ln>
+        </p:spPr>
+        <p:style>
+          <a:lnRef idx="2">
+            <a:schemeClr val="accent1">
+              <a:shade val="50000"/>
+            </a:schemeClr>
+          </a:lnRef>
+          <a:fillRef idx="1">
+            <a:schemeClr val="accent1"/>
+          </a:fillRef>
+          <a:effectRef idx="0">
+            <a:schemeClr val="accent1"/>
+          </a:effectRef>
+          <a:fontRef idx="minor">
+            <a:schemeClr val="lt1"/>
+          </a:fontRef>
+        </p:style>
+        <p:txBody>
+          <a:bodyPr rot="0" spcFirstLastPara="0" vertOverflow="overflow" horzOverflow="overflow" vert="horz" wrap="square" lIns="91440" tIns="91440" rIns="91440" bIns="45720" numCol="1" spcCol="0" rtlCol="0" fromWordArt="0" anchor="t" anchorCtr="0" forceAA="0" compatLnSpc="1">
+            <a:prstTxWarp prst="textNoShape">
+              <a:avLst/>
+            </a:prstTxWarp>
+            <a:noAutofit/>
+          </a:bodyPr>
+          <a:lstStyle/>
+          <a:p>
+            <a:pPr marL="0" marR="0" lvl="0" indent="0" algn="ctr" defTabSz="914400" rtl="0" eaLnBrk="0" fontAlgn="base" latinLnBrk="0" hangingPunct="0">
+              <a:lnSpc>
+                <a:spcPct val="100000"/>
+              </a:lnSpc>
+              <a:spcBef>
+                <a:spcPct val="0"/>
+              </a:spcBef>
+              <a:spcAft>
+                <a:spcPct val="0"/>
+              </a:spcAft>
+              <a:buClrTx/>
+              <a:buSzTx/>
+              <a:buFontTx/>
+              <a:buNone/>
+              <a:tabLst/>
+              <a:defRPr/>
+            </a:pPr>
+            <a:endParaRPr kumimoji="0" lang="en-US" sz="1400" b="0" i="0" u="none" strike="noStrike" kern="1200" cap="none" spc="0" normalizeH="0" baseline="0" noProof="0" dirty="0">
+              <a:ln>
+                <a:noFill/>
+              </a:ln>
+              <a:solidFill>
+                <a:srgbClr val="FF9900"/>
+              </a:solidFill>
+              <a:effectLst/>
+              <a:uLnTx/>
+              <a:uFillTx/>
+              <a:latin typeface="Calibri" panose="020F0502020204030204"/>
+              <a:ea typeface="+mn-ea"/>
+              <a:cs typeface="+mn-cs"/>
+            </a:endParaRPr>
+          </a:p>
+        </p:txBody>
+      </p:sp>
+      <p:pic>
+        <p:nvPicPr>
+          <p:cNvPr id="62" name="Graphic 61">
+            <a:extLst>
+              <a:ext uri="{FF2B5EF4-FFF2-40B4-BE49-F238E27FC236}">
+                <a16:creationId xmlns:a16="http://schemas.microsoft.com/office/drawing/2014/main" id="{2E7BD715-16E7-3746-B184-5D905EBA0972}"/>
+              </a:ext>
+            </a:extLst>
+          </p:cNvPr>
+          <p:cNvPicPr>
+            <a:picLocks noChangeAspect="1"/>
+          </p:cNvPicPr>
+          <p:nvPr/>
+        </p:nvPicPr>
+        <p:blipFill>
+          <a:blip r:embed="rId2">
+            <a:extLst>
+              <a:ext uri="{96DAC541-7B7A-43D3-8B79-37D633B846F1}">
+                <asvg:svgBlip xmlns:asvg="http://schemas.microsoft.com/office/drawing/2016/SVG/main" r:embed="rId3"/>
+              </a:ext>
+            </a:extLst>
+          </a:blip>
+          <a:stretch>
+            <a:fillRect/>
+          </a:stretch>
+        </p:blipFill>
+        <p:spPr>
+          <a:xfrm>
+            <a:off x="533953" y="1203046"/>
+            <a:ext cx="400579" cy="400579"/>
+          </a:xfrm>
+          <a:prstGeom prst="rect">
+            <a:avLst/>
+          </a:prstGeom>
+        </p:spPr>
+      </p:pic>
+      <p:pic>
+        <p:nvPicPr>
+          <p:cNvPr id="64" name="Graphic 63">
+            <a:extLst>
+              <a:ext uri="{FF2B5EF4-FFF2-40B4-BE49-F238E27FC236}">
+                <a16:creationId xmlns:a16="http://schemas.microsoft.com/office/drawing/2014/main" id="{277E78C7-E420-A64E-90B6-C4B20061174A}"/>
+              </a:ext>
+            </a:extLst>
+          </p:cNvPr>
+          <p:cNvPicPr>
+            <a:picLocks noChangeAspect="1"/>
+          </p:cNvPicPr>
+          <p:nvPr/>
+        </p:nvPicPr>
+        <p:blipFill>
+          <a:blip r:embed="rId4">
+            <a:extLst>
+              <a:ext uri="{96DAC541-7B7A-43D3-8B79-37D633B846F1}">
+                <asvg:svgBlip xmlns:asvg="http://schemas.microsoft.com/office/drawing/2016/SVG/main" r:embed="rId5"/>
+              </a:ext>
+            </a:extLst>
+          </a:blip>
+          <a:stretch>
+            <a:fillRect/>
+          </a:stretch>
+        </p:blipFill>
+        <p:spPr>
+          <a:xfrm>
+            <a:off x="598855" y="2092126"/>
+            <a:ext cx="340775" cy="340775"/>
+          </a:xfrm>
+          <a:prstGeom prst="rect">
+            <a:avLst/>
+          </a:prstGeom>
+        </p:spPr>
+      </p:pic>
+      <p:sp>
+        <p:nvSpPr>
+          <p:cNvPr id="38" name="Footer Placeholder 3">
+            <a:extLst>
+              <a:ext uri="{FF2B5EF4-FFF2-40B4-BE49-F238E27FC236}">
+                <a16:creationId xmlns:a16="http://schemas.microsoft.com/office/drawing/2014/main" id="{D0396B8E-F8E8-A04C-B870-9D224E3AAF12}"/>
+              </a:ext>
+            </a:extLst>
+          </p:cNvPr>
+          <p:cNvSpPr txBox="1">
+            <a:spLocks noChangeArrowheads="1"/>
+          </p:cNvSpPr>
+          <p:nvPr/>
+        </p:nvSpPr>
+        <p:spPr bwMode="auto">
+          <a:xfrm>
+            <a:off x="1090613" y="6249988"/>
+            <a:ext cx="4462462" cy="365125"/>
+          </a:xfrm>
+          <a:prstGeom prst="rect">
+            <a:avLst/>
+          </a:prstGeom>
+          <a:noFill/>
+          <a:extLst>
+            <a:ext uri="{909E8E84-426E-40DD-AFC4-6F175D3DCCD1}">
+              <a14:hiddenFill xmlns:a14="http://schemas.microsoft.com/office/drawing/2010/main">
+                <a:solidFill>
+                  <a:srgbClr val="FFFFFF"/>
+                </a:solidFill>
+              </a14:hiddenFill>
+            </a:ext>
+            <a:ext uri="{91240B29-F687-4F45-9708-019B960494DF}">
+              <a14:hiddenLine xmlns:a14="http://schemas.microsoft.com/office/drawing/2010/main" w="9525">
+                <a:solidFill>
+                  <a:srgbClr val="000000"/>
+                </a:solidFill>
+                <a:miter lim="800000"/>
+                <a:headEnd/>
+                <a:tailEnd/>
+              </a14:hiddenLine>
+            </a:ext>
+          </a:extLst>
+        </p:spPr>
+        <p:txBody>
+          <a:bodyPr vert="horz" wrap="square" lIns="91440" tIns="45720" rIns="91440" bIns="45720" numCol="1" rtlCol="0" anchor="ctr" anchorCtr="0" compatLnSpc="1">
+            <a:prstTxWarp prst="textNoShape">
+              <a:avLst/>
+            </a:prstTxWarp>
+          </a:bodyPr>
+          <a:lstStyle>
+            <a:defPPr>
+              <a:defRPr lang="en-US"/>
+            </a:defPPr>
+            <a:lvl1pPr marL="0" marR="0" indent="0" algn="l" defTabSz="914400" rtl="0" eaLnBrk="1" fontAlgn="auto" latinLnBrk="0" hangingPunct="1">
+              <a:lnSpc>
+                <a:spcPct val="100000"/>
+              </a:lnSpc>
+              <a:spcBef>
+                <a:spcPts val="0"/>
+              </a:spcBef>
+              <a:spcAft>
+                <a:spcPts val="0"/>
+              </a:spcAft>
+              <a:buClrTx/>
+              <a:buSzTx/>
+              <a:buFontTx/>
+              <a:buNone/>
+              <a:tabLst/>
+              <a:defRPr sz="1000" kern="1200">
+                <a:solidFill>
+                  <a:schemeClr val="bg1"/>
+                </a:solidFill>
+                <a:latin typeface="Arial" panose="020B0604020202020204" pitchFamily="34" charset="0"/>
+                <a:ea typeface="+mn-ea"/>
+                <a:cs typeface="Arial" panose="020B0604020202020204" pitchFamily="34" charset="0"/>
+              </a:defRPr>
+            </a:lvl1pPr>
+            <a:lvl2pPr marL="457200" algn="l" defTabSz="914400" rtl="0" eaLnBrk="0" fontAlgn="base" latinLnBrk="0" hangingPunct="0">
+              <a:spcBef>
+                <a:spcPct val="0"/>
+              </a:spcBef>
+              <a:spcAft>
+                <a:spcPct val="0"/>
+              </a:spcAft>
+              <a:defRPr sz="1800" kern="1200">
+                <a:solidFill>
+                  <a:schemeClr val="tx1"/>
+                </a:solidFill>
+                <a:latin typeface="Calibri" panose="020F0502020204030204" pitchFamily="34" charset="0"/>
+                <a:ea typeface="+mn-ea"/>
+                <a:cs typeface="+mn-cs"/>
+              </a:defRPr>
+            </a:lvl2pPr>
+            <a:lvl3pPr marL="914400" algn="l" defTabSz="914400" rtl="0" eaLnBrk="0" fontAlgn="base" latinLnBrk="0" hangingPunct="0">
+              <a:spcBef>
+                <a:spcPct val="0"/>
+              </a:spcBef>
+              <a:spcAft>
+                <a:spcPct val="0"/>
+              </a:spcAft>
+              <a:defRPr sz="1800" kern="1200">
+                <a:solidFill>
+                  <a:schemeClr val="tx1"/>
+                </a:solidFill>
+                <a:latin typeface="Calibri" panose="020F0502020204030204" pitchFamily="34" charset="0"/>
+                <a:ea typeface="+mn-ea"/>
+                <a:cs typeface="+mn-cs"/>
+              </a:defRPr>
+            </a:lvl3pPr>
+            <a:lvl4pPr marL="1371600" algn="l" defTabSz="914400" rtl="0" eaLnBrk="0" fontAlgn="base" latinLnBrk="0" hangingPunct="0">
+              <a:spcBef>
+                <a:spcPct val="0"/>
+              </a:spcBef>
+              <a:spcAft>
+                <a:spcPct val="0"/>
+              </a:spcAft>
+              <a:defRPr sz="1800" kern="1200">
+                <a:solidFill>
+                  <a:schemeClr val="tx1"/>
+                </a:solidFill>
+                <a:latin typeface="Calibri" panose="020F0502020204030204" pitchFamily="34" charset="0"/>
+                <a:ea typeface="+mn-ea"/>
+                <a:cs typeface="+mn-cs"/>
+              </a:defRPr>
+            </a:lvl4pPr>
+            <a:lvl5pPr marL="1828800" algn="l" defTabSz="914400" rtl="0" eaLnBrk="0" fontAlgn="base" latinLnBrk="0" hangingPunct="0">
+              <a:spcBef>
+                <a:spcPct val="0"/>
+              </a:spcBef>
+              <a:spcAft>
+                <a:spcPct val="0"/>
+              </a:spcAft>
+              <a:defRPr sz="1800" kern="1200">
+                <a:solidFill>
+                  <a:schemeClr val="tx1"/>
+                </a:solidFill>
+                <a:latin typeface="Calibri" panose="020F0502020204030204" pitchFamily="34" charset="0"/>
+                <a:ea typeface="+mn-ea"/>
+                <a:cs typeface="+mn-cs"/>
+              </a:defRPr>
+            </a:lvl5pPr>
+            <a:lvl6pPr marL="2286000" algn="l" defTabSz="914400" rtl="0" eaLnBrk="1" latinLnBrk="0" hangingPunct="1">
+              <a:defRPr sz="1800" kern="1200">
+                <a:solidFill>
+                  <a:schemeClr val="tx1"/>
+                </a:solidFill>
+                <a:latin typeface="Calibri" panose="020F0502020204030204" pitchFamily="34" charset="0"/>
+                <a:ea typeface="+mn-ea"/>
+                <a:cs typeface="+mn-cs"/>
+              </a:defRPr>
+            </a:lvl6pPr>
+            <a:lvl7pPr marL="2743200" algn="l" defTabSz="914400" rtl="0" eaLnBrk="1" latinLnBrk="0" hangingPunct="1">
+              <a:defRPr sz="1800" kern="1200">
+                <a:solidFill>
+                  <a:schemeClr val="tx1"/>
+                </a:solidFill>
+                <a:latin typeface="Calibri" panose="020F0502020204030204" pitchFamily="34" charset="0"/>
+                <a:ea typeface="+mn-ea"/>
+                <a:cs typeface="+mn-cs"/>
+              </a:defRPr>
+            </a:lvl7pPr>
+            <a:lvl8pPr marL="3200400" algn="l" defTabSz="914400" rtl="0" eaLnBrk="1" latinLnBrk="0" hangingPunct="1">
+              <a:defRPr sz="1800" kern="1200">
+                <a:solidFill>
+                  <a:schemeClr val="tx1"/>
+                </a:solidFill>
+                <a:latin typeface="Calibri" panose="020F0502020204030204" pitchFamily="34" charset="0"/>
+                <a:ea typeface="+mn-ea"/>
+                <a:cs typeface="+mn-cs"/>
+              </a:defRPr>
+            </a:lvl8pPr>
+            <a:lvl9pPr marL="3657600" algn="l" defTabSz="914400" rtl="0" eaLnBrk="1" latinLnBrk="0" hangingPunct="1">
+              <a:defRPr sz="1800" kern="1200">
+                <a:solidFill>
+                  <a:schemeClr val="tx1"/>
+                </a:solidFill>
+                <a:latin typeface="Calibri" panose="020F0502020204030204" pitchFamily="34" charset="0"/>
+                <a:ea typeface="+mn-ea"/>
+                <a:cs typeface="+mn-cs"/>
+              </a:defRPr>
+            </a:lvl9pPr>
+          </a:lstStyle>
+          <a:p>
+            <a:pPr fontAlgn="base">
+              <a:spcBef>
+                <a:spcPct val="0"/>
+              </a:spcBef>
+              <a:spcAft>
+                <a:spcPct val="0"/>
+              </a:spcAft>
+            </a:pPr>
+            <a:r>
+              <a:rPr lang="en-US"/>
+              <a:t>© 2021, AussieCloudGuru. All rights reserved.</a:t>
+            </a:r>
+            <a:endParaRPr lang="en-US" altLang="en-US" dirty="0"/>
+          </a:p>
+        </p:txBody>
+      </p:sp>
+      <p:sp>
+        <p:nvSpPr>
+          <p:cNvPr id="72" name="Rectangle 71">
+            <a:extLst>
+              <a:ext uri="{FF2B5EF4-FFF2-40B4-BE49-F238E27FC236}">
+                <a16:creationId xmlns:a16="http://schemas.microsoft.com/office/drawing/2014/main" id="{3F9D0200-8001-B946-A8D2-F6128AF39CD6}"/>
+              </a:ext>
+            </a:extLst>
+          </p:cNvPr>
+          <p:cNvSpPr/>
+          <p:nvPr/>
+        </p:nvSpPr>
+        <p:spPr>
+          <a:xfrm>
+            <a:off x="1150565" y="4473145"/>
+            <a:ext cx="1677239" cy="830389"/>
+          </a:xfrm>
+          <a:prstGeom prst="rect">
+            <a:avLst/>
+          </a:prstGeom>
+          <a:solidFill>
+            <a:srgbClr val="C1F3FF">
+              <a:alpha val="14902"/>
+            </a:srgbClr>
+          </a:solidFill>
+          <a:ln w="12700">
+            <a:noFill/>
+            <a:prstDash val="dash"/>
+          </a:ln>
+        </p:spPr>
+        <p:style>
+          <a:lnRef idx="2">
+            <a:schemeClr val="accent1">
+              <a:shade val="50000"/>
+            </a:schemeClr>
+          </a:lnRef>
+          <a:fillRef idx="1">
+            <a:schemeClr val="accent1"/>
+          </a:fillRef>
+          <a:effectRef idx="0">
+            <a:schemeClr val="accent1"/>
+          </a:effectRef>
+          <a:fontRef idx="minor">
+            <a:schemeClr val="lt1"/>
+          </a:fontRef>
+        </p:style>
+        <p:txBody>
+          <a:bodyPr lIns="338328"/>
+          <a:lstStyle/>
+          <a:p>
+            <a:pPr eaLnBrk="1" fontAlgn="auto" hangingPunct="1">
+              <a:spcBef>
+                <a:spcPts val="0"/>
+              </a:spcBef>
+              <a:spcAft>
+                <a:spcPts val="0"/>
+              </a:spcAft>
+              <a:defRPr/>
+            </a:pPr>
+            <a:r>
+              <a:rPr lang="en-US" sz="1200" dirty="0">
+                <a:solidFill>
+                  <a:srgbClr val="00A0C8"/>
+                </a:solidFill>
+                <a:latin typeface="Arial" panose="020B0604020202020204" pitchFamily="34" charset="0"/>
+                <a:cs typeface="Arial" panose="020B0604020202020204" pitchFamily="34" charset="0"/>
+              </a:rPr>
+              <a:t>Private subnet1</a:t>
+            </a:r>
+          </a:p>
+          <a:p>
+            <a:pPr eaLnBrk="1" fontAlgn="auto" hangingPunct="1">
+              <a:spcBef>
+                <a:spcPts val="0"/>
+              </a:spcBef>
+              <a:spcAft>
+                <a:spcPts val="0"/>
+              </a:spcAft>
+              <a:defRPr/>
+            </a:pPr>
+            <a:r>
+              <a:rPr lang="en-US" sz="1200" dirty="0">
+                <a:solidFill>
+                  <a:srgbClr val="00A0C8"/>
+                </a:solidFill>
+                <a:latin typeface="Arial" panose="020B0604020202020204" pitchFamily="34" charset="0"/>
+                <a:cs typeface="Arial" panose="020B0604020202020204" pitchFamily="34" charset="0"/>
+              </a:rPr>
+              <a:t>  10.0.30.0/24</a:t>
+            </a:r>
+          </a:p>
+        </p:txBody>
+      </p:sp>
+      <p:sp>
+        <p:nvSpPr>
+          <p:cNvPr id="73" name="Rectangle 72">
+            <a:extLst>
+              <a:ext uri="{FF2B5EF4-FFF2-40B4-BE49-F238E27FC236}">
+                <a16:creationId xmlns:a16="http://schemas.microsoft.com/office/drawing/2014/main" id="{A3E56D60-DC52-5048-B163-A70E6C717B7A}"/>
+              </a:ext>
+            </a:extLst>
+          </p:cNvPr>
+          <p:cNvSpPr/>
+          <p:nvPr/>
+        </p:nvSpPr>
+        <p:spPr>
+          <a:xfrm>
+            <a:off x="5292241" y="4473145"/>
+            <a:ext cx="1693906" cy="830389"/>
+          </a:xfrm>
+          <a:prstGeom prst="rect">
+            <a:avLst/>
+          </a:prstGeom>
+          <a:solidFill>
+            <a:srgbClr val="C1F3FF">
+              <a:alpha val="14902"/>
+            </a:srgbClr>
+          </a:solidFill>
+          <a:ln w="12700">
+            <a:noFill/>
+            <a:prstDash val="dash"/>
+          </a:ln>
+        </p:spPr>
+        <p:style>
+          <a:lnRef idx="2">
+            <a:schemeClr val="accent1">
+              <a:shade val="50000"/>
+            </a:schemeClr>
+          </a:lnRef>
+          <a:fillRef idx="1">
+            <a:schemeClr val="accent1"/>
+          </a:fillRef>
+          <a:effectRef idx="0">
+            <a:schemeClr val="accent1"/>
+          </a:effectRef>
+          <a:fontRef idx="minor">
+            <a:schemeClr val="lt1"/>
+          </a:fontRef>
+        </p:style>
+        <p:txBody>
+          <a:bodyPr lIns="338328"/>
+          <a:lstStyle/>
+          <a:p>
+            <a:pPr>
+              <a:defRPr/>
+            </a:pPr>
+            <a:r>
+              <a:rPr lang="en-US" sz="1200" dirty="0">
+                <a:solidFill>
+                  <a:srgbClr val="00A0C8"/>
+                </a:solidFill>
+                <a:latin typeface="Arial" panose="020B0604020202020204" pitchFamily="34" charset="0"/>
+                <a:cs typeface="Arial" panose="020B0604020202020204" pitchFamily="34" charset="0"/>
+              </a:rPr>
+              <a:t>Private subnet2</a:t>
+            </a:r>
+          </a:p>
+          <a:p>
+            <a:pPr>
+              <a:defRPr/>
+            </a:pPr>
+            <a:r>
+              <a:rPr lang="en-US" sz="1200" dirty="0">
+                <a:solidFill>
+                  <a:srgbClr val="00A0C8"/>
+                </a:solidFill>
+                <a:latin typeface="Arial" panose="020B0604020202020204" pitchFamily="34" charset="0"/>
+                <a:cs typeface="Arial" panose="020B0604020202020204" pitchFamily="34" charset="0"/>
+              </a:rPr>
+              <a:t>  10.0.40.0/24</a:t>
+            </a:r>
+          </a:p>
+        </p:txBody>
+      </p:sp>
+      <p:pic>
+        <p:nvPicPr>
+          <p:cNvPr id="74" name="Graphic 99">
+            <a:extLst>
+              <a:ext uri="{FF2B5EF4-FFF2-40B4-BE49-F238E27FC236}">
+                <a16:creationId xmlns:a16="http://schemas.microsoft.com/office/drawing/2014/main" id="{0350715E-69B4-BF43-ABE2-73D64C420A70}"/>
+              </a:ext>
+            </a:extLst>
+          </p:cNvPr>
+          <p:cNvPicPr>
+            <a:picLocks noChangeAspect="1" noChangeArrowheads="1"/>
+          </p:cNvPicPr>
+          <p:nvPr/>
+        </p:nvPicPr>
+        <p:blipFill>
+          <a:blip r:embed="rId6">
+            <a:extLst>
+              <a:ext uri="{28A0092B-C50C-407E-A947-70E740481C1C}">
+                <a14:useLocalDpi xmlns:a14="http://schemas.microsoft.com/office/drawing/2010/main" val="0"/>
+              </a:ext>
+            </a:extLst>
+          </a:blip>
+          <a:srcRect/>
+          <a:stretch>
+            <a:fillRect/>
+          </a:stretch>
+        </p:blipFill>
+        <p:spPr bwMode="auto">
+          <a:xfrm>
+            <a:off x="1150565" y="4474269"/>
+            <a:ext cx="274637" cy="274637"/>
+          </a:xfrm>
+          <a:prstGeom prst="rect">
+            <a:avLst/>
+          </a:prstGeom>
+          <a:noFill/>
+          <a:ln>
+            <a:noFill/>
+          </a:ln>
+          <a:extLst>
+            <a:ext uri="{909E8E84-426E-40DD-AFC4-6F175D3DCCD1}">
+              <a14:hiddenFill xmlns:a14="http://schemas.microsoft.com/office/drawing/2010/main">
+                <a:solidFill>
+                  <a:srgbClr val="FFFFFF"/>
+                </a:solidFill>
+              </a14:hiddenFill>
+            </a:ext>
+            <a:ext uri="{91240B29-F687-4F45-9708-019B960494DF}">
+              <a14:hiddenLine xmlns:a14="http://schemas.microsoft.com/office/drawing/2010/main" w="9525">
+                <a:solidFill>
+                  <a:srgbClr val="000000"/>
+                </a:solidFill>
+                <a:miter lim="800000"/>
+                <a:headEnd/>
+                <a:tailEnd/>
+              </a14:hiddenLine>
+            </a:ext>
+          </a:extLst>
+        </p:spPr>
+      </p:pic>
+      <p:pic>
+        <p:nvPicPr>
+          <p:cNvPr id="75" name="Graphic 99">
+            <a:extLst>
+              <a:ext uri="{FF2B5EF4-FFF2-40B4-BE49-F238E27FC236}">
+                <a16:creationId xmlns:a16="http://schemas.microsoft.com/office/drawing/2014/main" id="{0D4E25B5-7B47-5541-8BE7-053317DE1ED9}"/>
+              </a:ext>
+            </a:extLst>
+          </p:cNvPr>
+          <p:cNvPicPr>
+            <a:picLocks noChangeAspect="1" noChangeArrowheads="1"/>
+          </p:cNvPicPr>
+          <p:nvPr/>
+        </p:nvPicPr>
+        <p:blipFill>
+          <a:blip r:embed="rId6">
+            <a:extLst>
+              <a:ext uri="{28A0092B-C50C-407E-A947-70E740481C1C}">
+                <a14:useLocalDpi xmlns:a14="http://schemas.microsoft.com/office/drawing/2010/main" val="0"/>
+              </a:ext>
+            </a:extLst>
+          </a:blip>
+          <a:srcRect/>
+          <a:stretch>
+            <a:fillRect/>
+          </a:stretch>
+        </p:blipFill>
+        <p:spPr bwMode="auto">
+          <a:xfrm>
+            <a:off x="5292241" y="4478374"/>
+            <a:ext cx="274637" cy="274637"/>
+          </a:xfrm>
+          <a:prstGeom prst="rect">
+            <a:avLst/>
+          </a:prstGeom>
+          <a:noFill/>
+          <a:ln>
+            <a:noFill/>
+          </a:ln>
+          <a:extLst>
+            <a:ext uri="{909E8E84-426E-40DD-AFC4-6F175D3DCCD1}">
+              <a14:hiddenFill xmlns:a14="http://schemas.microsoft.com/office/drawing/2010/main">
+                <a:solidFill>
+                  <a:srgbClr val="FFFFFF"/>
+                </a:solidFill>
+              </a14:hiddenFill>
+            </a:ext>
+            <a:ext uri="{91240B29-F687-4F45-9708-019B960494DF}">
+              <a14:hiddenLine xmlns:a14="http://schemas.microsoft.com/office/drawing/2010/main" w="9525">
+                <a:solidFill>
+                  <a:srgbClr val="000000"/>
+                </a:solidFill>
+                <a:miter lim="800000"/>
+                <a:headEnd/>
+                <a:tailEnd/>
+              </a14:hiddenLine>
+            </a:ext>
+          </a:extLst>
+        </p:spPr>
+      </p:pic>
+      <p:sp>
+        <p:nvSpPr>
+          <p:cNvPr id="76" name="Rectangle 75">
+            <a:extLst>
+              <a:ext uri="{FF2B5EF4-FFF2-40B4-BE49-F238E27FC236}">
+                <a16:creationId xmlns:a16="http://schemas.microsoft.com/office/drawing/2014/main" id="{BC9F3804-642D-C243-BCC1-0969445CBD75}"/>
+              </a:ext>
+            </a:extLst>
+          </p:cNvPr>
+          <p:cNvSpPr/>
+          <p:nvPr/>
+        </p:nvSpPr>
+        <p:spPr>
+          <a:xfrm>
+            <a:off x="1150565" y="2981492"/>
+            <a:ext cx="1677239" cy="881957"/>
+          </a:xfrm>
+          <a:prstGeom prst="rect">
+            <a:avLst/>
+          </a:prstGeom>
+          <a:solidFill>
+            <a:srgbClr val="E1F2D4">
+              <a:alpha val="20000"/>
+            </a:srgbClr>
+          </a:solidFill>
+          <a:ln w="12700">
+            <a:noFill/>
+            <a:prstDash val="dash"/>
+          </a:ln>
+        </p:spPr>
+        <p:style>
+          <a:lnRef idx="2">
+            <a:schemeClr val="accent1">
+              <a:shade val="50000"/>
+            </a:schemeClr>
+          </a:lnRef>
+          <a:fillRef idx="1">
+            <a:schemeClr val="accent1"/>
+          </a:fillRef>
+          <a:effectRef idx="0">
+            <a:schemeClr val="accent1"/>
+          </a:effectRef>
+          <a:fontRef idx="minor">
+            <a:schemeClr val="lt1"/>
+          </a:fontRef>
+        </p:style>
+        <p:txBody>
+          <a:bodyPr lIns="338328"/>
+          <a:lstStyle/>
+          <a:p>
+            <a:pPr eaLnBrk="1" fontAlgn="auto" hangingPunct="1">
+              <a:spcBef>
+                <a:spcPts val="0"/>
+              </a:spcBef>
+              <a:spcAft>
+                <a:spcPts val="0"/>
+              </a:spcAft>
+              <a:defRPr/>
+            </a:pPr>
+            <a:r>
+              <a:rPr lang="en-US" sz="1200" dirty="0">
+                <a:solidFill>
+                  <a:srgbClr val="69AE35"/>
+                </a:solidFill>
+                <a:latin typeface="Arial" panose="020B0604020202020204" pitchFamily="34" charset="0"/>
+                <a:cs typeface="Arial" panose="020B0604020202020204" pitchFamily="34" charset="0"/>
+              </a:rPr>
+              <a:t>Public subnet1</a:t>
+            </a:r>
+          </a:p>
+          <a:p>
+            <a:pPr eaLnBrk="1" fontAlgn="auto" hangingPunct="1">
+              <a:spcBef>
+                <a:spcPts val="0"/>
+              </a:spcBef>
+              <a:spcAft>
+                <a:spcPts val="0"/>
+              </a:spcAft>
+              <a:defRPr/>
+            </a:pPr>
+            <a:r>
+              <a:rPr lang="en-US" sz="1200" dirty="0">
+                <a:solidFill>
+                  <a:srgbClr val="69AE35"/>
+                </a:solidFill>
+                <a:latin typeface="Arial" panose="020B0604020202020204" pitchFamily="34" charset="0"/>
+                <a:cs typeface="Arial" panose="020B0604020202020204" pitchFamily="34" charset="0"/>
+              </a:rPr>
+              <a:t>10.0.10.0/24</a:t>
+            </a:r>
+          </a:p>
+        </p:txBody>
+      </p:sp>
+      <p:pic>
+        <p:nvPicPr>
+          <p:cNvPr id="77" name="Graphic 107">
+            <a:extLst>
+              <a:ext uri="{FF2B5EF4-FFF2-40B4-BE49-F238E27FC236}">
+                <a16:creationId xmlns:a16="http://schemas.microsoft.com/office/drawing/2014/main" id="{AEF7E3F3-7D39-A747-83E9-CD9372454280}"/>
+              </a:ext>
+            </a:extLst>
+          </p:cNvPr>
+          <p:cNvPicPr>
+            <a:picLocks noChangeAspect="1" noChangeArrowheads="1"/>
+          </p:cNvPicPr>
+          <p:nvPr/>
+        </p:nvPicPr>
+        <p:blipFill>
+          <a:blip r:embed="rId7">
+            <a:extLst>
+              <a:ext uri="{28A0092B-C50C-407E-A947-70E740481C1C}">
+                <a14:useLocalDpi xmlns:a14="http://schemas.microsoft.com/office/drawing/2010/main" val="0"/>
+              </a:ext>
+            </a:extLst>
+          </a:blip>
+          <a:srcRect/>
+          <a:stretch>
+            <a:fillRect/>
+          </a:stretch>
+        </p:blipFill>
+        <p:spPr bwMode="auto">
+          <a:xfrm>
+            <a:off x="1150565" y="2981492"/>
+            <a:ext cx="260938" cy="260937"/>
+          </a:xfrm>
+          <a:prstGeom prst="rect">
+            <a:avLst/>
+          </a:prstGeom>
+          <a:noFill/>
+          <a:ln>
+            <a:noFill/>
+          </a:ln>
+          <a:extLst>
+            <a:ext uri="{909E8E84-426E-40DD-AFC4-6F175D3DCCD1}">
+              <a14:hiddenFill xmlns:a14="http://schemas.microsoft.com/office/drawing/2010/main">
+                <a:solidFill>
+                  <a:srgbClr val="FFFFFF"/>
+                </a:solidFill>
+              </a14:hiddenFill>
+            </a:ext>
+            <a:ext uri="{91240B29-F687-4F45-9708-019B960494DF}">
+              <a14:hiddenLine xmlns:a14="http://schemas.microsoft.com/office/drawing/2010/main" w="9525">
+                <a:solidFill>
+                  <a:srgbClr val="000000"/>
+                </a:solidFill>
+                <a:miter lim="800000"/>
+                <a:headEnd/>
+                <a:tailEnd/>
+              </a14:hiddenLine>
+            </a:ext>
+          </a:extLst>
+        </p:spPr>
+      </p:pic>
+      <p:sp>
+        <p:nvSpPr>
+          <p:cNvPr id="78" name="Rectangle 77">
+            <a:extLst>
+              <a:ext uri="{FF2B5EF4-FFF2-40B4-BE49-F238E27FC236}">
+                <a16:creationId xmlns:a16="http://schemas.microsoft.com/office/drawing/2014/main" id="{086164C9-29A7-5746-BB05-E6CEFB28A9AB}"/>
+              </a:ext>
+            </a:extLst>
+          </p:cNvPr>
+          <p:cNvSpPr/>
+          <p:nvPr/>
+        </p:nvSpPr>
+        <p:spPr>
+          <a:xfrm>
+            <a:off x="5308908" y="2981492"/>
+            <a:ext cx="1677239" cy="881957"/>
+          </a:xfrm>
+          <a:prstGeom prst="rect">
+            <a:avLst/>
+          </a:prstGeom>
+          <a:solidFill>
+            <a:srgbClr val="E1F2D4">
+              <a:alpha val="20000"/>
+            </a:srgbClr>
+          </a:solidFill>
+          <a:ln w="12700">
+            <a:noFill/>
+            <a:prstDash val="dash"/>
+          </a:ln>
+        </p:spPr>
+        <p:style>
+          <a:lnRef idx="2">
+            <a:schemeClr val="accent1">
+              <a:shade val="50000"/>
+            </a:schemeClr>
+          </a:lnRef>
+          <a:fillRef idx="1">
+            <a:schemeClr val="accent1"/>
+          </a:fillRef>
+          <a:effectRef idx="0">
+            <a:schemeClr val="accent1"/>
+          </a:effectRef>
+          <a:fontRef idx="minor">
+            <a:schemeClr val="lt1"/>
+          </a:fontRef>
+        </p:style>
+        <p:txBody>
+          <a:bodyPr lIns="338328"/>
+          <a:lstStyle/>
+          <a:p>
+            <a:pPr eaLnBrk="1" fontAlgn="auto" hangingPunct="1">
+              <a:spcBef>
+                <a:spcPts val="0"/>
+              </a:spcBef>
+              <a:spcAft>
+                <a:spcPts val="0"/>
+              </a:spcAft>
+              <a:defRPr/>
+            </a:pPr>
+            <a:r>
+              <a:rPr lang="en-US" sz="1200" dirty="0">
+                <a:solidFill>
+                  <a:srgbClr val="69AE35"/>
+                </a:solidFill>
+                <a:latin typeface="Arial" panose="020B0604020202020204" pitchFamily="34" charset="0"/>
+                <a:cs typeface="Arial" panose="020B0604020202020204" pitchFamily="34" charset="0"/>
+              </a:rPr>
+              <a:t>Public subnet2</a:t>
+            </a:r>
+          </a:p>
+          <a:p>
+            <a:pPr eaLnBrk="1" fontAlgn="auto" hangingPunct="1">
+              <a:spcBef>
+                <a:spcPts val="0"/>
+              </a:spcBef>
+              <a:spcAft>
+                <a:spcPts val="0"/>
+              </a:spcAft>
+              <a:defRPr/>
+            </a:pPr>
+            <a:r>
+              <a:rPr lang="en-US" sz="1200" dirty="0">
+                <a:solidFill>
+                  <a:srgbClr val="69AE35"/>
+                </a:solidFill>
+                <a:latin typeface="Arial" panose="020B0604020202020204" pitchFamily="34" charset="0"/>
+                <a:cs typeface="Arial" panose="020B0604020202020204" pitchFamily="34" charset="0"/>
+              </a:rPr>
+              <a:t>10.0.20.0/24</a:t>
+            </a:r>
+          </a:p>
+        </p:txBody>
+      </p:sp>
+      <p:pic>
+        <p:nvPicPr>
+          <p:cNvPr id="79" name="Graphic 107">
+            <a:extLst>
+              <a:ext uri="{FF2B5EF4-FFF2-40B4-BE49-F238E27FC236}">
+                <a16:creationId xmlns:a16="http://schemas.microsoft.com/office/drawing/2014/main" id="{5626D393-FE13-7E4B-BA3F-A2C1C5A89099}"/>
+              </a:ext>
+            </a:extLst>
+          </p:cNvPr>
+          <p:cNvPicPr>
+            <a:picLocks noChangeAspect="1" noChangeArrowheads="1"/>
+          </p:cNvPicPr>
+          <p:nvPr/>
+        </p:nvPicPr>
+        <p:blipFill>
+          <a:blip r:embed="rId7">
+            <a:extLst>
+              <a:ext uri="{28A0092B-C50C-407E-A947-70E740481C1C}">
+                <a14:useLocalDpi xmlns:a14="http://schemas.microsoft.com/office/drawing/2010/main" val="0"/>
+              </a:ext>
+            </a:extLst>
+          </a:blip>
+          <a:srcRect/>
+          <a:stretch>
+            <a:fillRect/>
+          </a:stretch>
+        </p:blipFill>
+        <p:spPr bwMode="auto">
+          <a:xfrm>
+            <a:off x="5308908" y="2981492"/>
+            <a:ext cx="260938" cy="260937"/>
+          </a:xfrm>
+          <a:prstGeom prst="rect">
+            <a:avLst/>
+          </a:prstGeom>
+          <a:noFill/>
+          <a:ln>
+            <a:noFill/>
+          </a:ln>
+          <a:extLst>
+            <a:ext uri="{909E8E84-426E-40DD-AFC4-6F175D3DCCD1}">
+              <a14:hiddenFill xmlns:a14="http://schemas.microsoft.com/office/drawing/2010/main">
+                <a:solidFill>
+                  <a:srgbClr val="FFFFFF"/>
+                </a:solidFill>
+              </a14:hiddenFill>
+            </a:ext>
+            <a:ext uri="{91240B29-F687-4F45-9708-019B960494DF}">
+              <a14:hiddenLine xmlns:a14="http://schemas.microsoft.com/office/drawing/2010/main" w="9525">
+                <a:solidFill>
+                  <a:srgbClr val="000000"/>
+                </a:solidFill>
+                <a:miter lim="800000"/>
+                <a:headEnd/>
+                <a:tailEnd/>
+              </a14:hiddenLine>
+            </a:ext>
+          </a:extLst>
+        </p:spPr>
+      </p:pic>
+      <p:sp>
+        <p:nvSpPr>
+          <p:cNvPr id="82" name="TextBox 12">
+            <a:extLst>
+              <a:ext uri="{FF2B5EF4-FFF2-40B4-BE49-F238E27FC236}">
+                <a16:creationId xmlns:a16="http://schemas.microsoft.com/office/drawing/2014/main" id="{F9CBC4C8-1AC9-A245-9EB0-1985F570C926}"/>
+              </a:ext>
+            </a:extLst>
+          </p:cNvPr>
+          <p:cNvSpPr txBox="1">
+            <a:spLocks noChangeArrowheads="1"/>
+          </p:cNvSpPr>
+          <p:nvPr/>
+        </p:nvSpPr>
+        <p:spPr bwMode="auto">
+          <a:xfrm>
+            <a:off x="2906750" y="2352799"/>
+            <a:ext cx="968331" cy="215444"/>
+          </a:xfrm>
+          <a:prstGeom prst="rect">
+            <a:avLst/>
+          </a:prstGeom>
+          <a:noFill/>
+          <a:ln>
+            <a:noFill/>
+          </a:ln>
+          <a:extLst>
+            <a:ext uri="{909E8E84-426E-40DD-AFC4-6F175D3DCCD1}">
+              <a14:hiddenFill xmlns:a14="http://schemas.microsoft.com/office/drawing/2010/main">
+                <a:solidFill>
+                  <a:srgbClr val="FFFFFF"/>
+                </a:solidFill>
+              </a14:hiddenFill>
+            </a:ext>
+            <a:ext uri="{91240B29-F687-4F45-9708-019B960494DF}">
+              <a14:hiddenLine xmlns:a14="http://schemas.microsoft.com/office/drawing/2010/main" w="9525">
+                <a:solidFill>
+                  <a:srgbClr val="000000"/>
+                </a:solidFill>
+                <a:miter lim="800000"/>
+                <a:headEnd/>
+                <a:tailEnd/>
+              </a14:hiddenLine>
+            </a:ext>
+          </a:extLst>
+        </p:spPr>
+        <p:txBody>
+          <a:bodyPr wrap="square">
+            <a:spAutoFit/>
+          </a:bodyPr>
+          <a:lstStyle>
+            <a:lvl1pPr>
+              <a:defRPr>
+                <a:solidFill>
+                  <a:schemeClr val="tx1"/>
+                </a:solidFill>
+                <a:latin typeface="Calibri" panose="020F0502020204030204" pitchFamily="34" charset="0"/>
+              </a:defRPr>
+            </a:lvl1pPr>
+            <a:lvl2pPr marL="742950" indent="-285750">
+              <a:defRPr>
+                <a:solidFill>
+                  <a:schemeClr val="tx1"/>
+                </a:solidFill>
+                <a:latin typeface="Calibri" panose="020F0502020204030204" pitchFamily="34" charset="0"/>
+              </a:defRPr>
+            </a:lvl2pPr>
+            <a:lvl3pPr marL="1143000" indent="-228600">
+              <a:defRPr>
+                <a:solidFill>
+                  <a:schemeClr val="tx1"/>
+                </a:solidFill>
+                <a:latin typeface="Calibri" panose="020F0502020204030204" pitchFamily="34" charset="0"/>
+              </a:defRPr>
+            </a:lvl3pPr>
+            <a:lvl4pPr marL="1600200" indent="-228600">
+              <a:defRPr>
+                <a:solidFill>
+                  <a:schemeClr val="tx1"/>
+                </a:solidFill>
+                <a:latin typeface="Calibri" panose="020F0502020204030204" pitchFamily="34" charset="0"/>
+              </a:defRPr>
+            </a:lvl4pPr>
+            <a:lvl5pPr marL="2057400" indent="-228600">
+              <a:defRPr>
+                <a:solidFill>
+                  <a:schemeClr val="tx1"/>
+                </a:solidFill>
+                <a:latin typeface="Calibri" panose="020F0502020204030204" pitchFamily="34" charset="0"/>
+              </a:defRPr>
+            </a:lvl5pPr>
+            <a:lvl6pPr marL="2514600" indent="-228600" eaLnBrk="0" fontAlgn="base" hangingPunct="0">
+              <a:spcBef>
+                <a:spcPct val="0"/>
+              </a:spcBef>
+              <a:spcAft>
+                <a:spcPct val="0"/>
+              </a:spcAft>
+              <a:defRPr>
+                <a:solidFill>
+                  <a:schemeClr val="tx1"/>
+                </a:solidFill>
+                <a:latin typeface="Calibri" panose="020F0502020204030204" pitchFamily="34" charset="0"/>
+              </a:defRPr>
+            </a:lvl6pPr>
+            <a:lvl7pPr marL="2971800" indent="-228600" eaLnBrk="0" fontAlgn="base" hangingPunct="0">
+              <a:spcBef>
+                <a:spcPct val="0"/>
+              </a:spcBef>
+              <a:spcAft>
+                <a:spcPct val="0"/>
+              </a:spcAft>
+              <a:defRPr>
+                <a:solidFill>
+                  <a:schemeClr val="tx1"/>
+                </a:solidFill>
+                <a:latin typeface="Calibri" panose="020F0502020204030204" pitchFamily="34" charset="0"/>
+              </a:defRPr>
+            </a:lvl7pPr>
+            <a:lvl8pPr marL="3429000" indent="-228600" eaLnBrk="0" fontAlgn="base" hangingPunct="0">
+              <a:spcBef>
+                <a:spcPct val="0"/>
+              </a:spcBef>
+              <a:spcAft>
+                <a:spcPct val="0"/>
+              </a:spcAft>
+              <a:defRPr>
+                <a:solidFill>
+                  <a:schemeClr val="tx1"/>
+                </a:solidFill>
+                <a:latin typeface="Calibri" panose="020F0502020204030204" pitchFamily="34" charset="0"/>
+              </a:defRPr>
+            </a:lvl8pPr>
+            <a:lvl9pPr marL="3886200" indent="-228600" eaLnBrk="0" fontAlgn="base" hangingPunct="0">
+              <a:spcBef>
+                <a:spcPct val="0"/>
+              </a:spcBef>
+              <a:spcAft>
+                <a:spcPct val="0"/>
+              </a:spcAft>
+              <a:defRPr>
+                <a:solidFill>
+                  <a:schemeClr val="tx1"/>
+                </a:solidFill>
+                <a:latin typeface="Calibri" panose="020F0502020204030204" pitchFamily="34" charset="0"/>
+              </a:defRPr>
+            </a:lvl9pPr>
+          </a:lstStyle>
+          <a:p>
+            <a:pPr algn="ctr" eaLnBrk="1" hangingPunct="1"/>
+            <a:r>
+              <a:rPr lang="en-US" altLang="en-US" sz="800" dirty="0">
+                <a:solidFill>
+                  <a:schemeClr val="bg1"/>
+                </a:solidFill>
+                <a:latin typeface="Arial" panose="020B0604020202020204" pitchFamily="34" charset="0"/>
+                <a:ea typeface="Amazon Ember" panose="020B0603020204020204" pitchFamily="34" charset="0"/>
+                <a:cs typeface="Arial" panose="020B0604020202020204" pitchFamily="34" charset="0"/>
+              </a:rPr>
+              <a:t>Internet gateway</a:t>
+            </a:r>
+          </a:p>
+        </p:txBody>
+      </p:sp>
+      <p:pic>
+        <p:nvPicPr>
+          <p:cNvPr id="83" name="Graphic 10">
+            <a:extLst>
+              <a:ext uri="{FF2B5EF4-FFF2-40B4-BE49-F238E27FC236}">
+                <a16:creationId xmlns:a16="http://schemas.microsoft.com/office/drawing/2014/main" id="{18B79DB9-DFDD-1145-B518-825244496939}"/>
+              </a:ext>
+            </a:extLst>
+          </p:cNvPr>
+          <p:cNvPicPr>
+            <a:picLocks noChangeAspect="1" noChangeArrowheads="1"/>
+          </p:cNvPicPr>
+          <p:nvPr/>
+        </p:nvPicPr>
+        <p:blipFill>
+          <a:blip r:embed="rId8">
+            <a:extLst>
+              <a:ext uri="{96DAC541-7B7A-43D3-8B79-37D633B846F1}">
+                <asvg:svgBlip xmlns:asvg="http://schemas.microsoft.com/office/drawing/2016/SVG/main" r:embed="rId9"/>
+              </a:ext>
+            </a:extLst>
+          </a:blip>
+          <a:srcRect/>
+          <a:stretch/>
+        </p:blipFill>
+        <p:spPr bwMode="auto">
+          <a:xfrm>
+            <a:off x="3248987" y="2130032"/>
+            <a:ext cx="262302" cy="262302"/>
+          </a:xfrm>
+          <a:prstGeom prst="rect">
+            <a:avLst/>
+          </a:prstGeom>
+          <a:noFill/>
+          <a:ln>
+            <a:noFill/>
+          </a:ln>
+          <a:extLst>
+            <a:ext uri="{909E8E84-426E-40DD-AFC4-6F175D3DCCD1}">
+              <a14:hiddenFill xmlns:a14="http://schemas.microsoft.com/office/drawing/2010/main">
+                <a:solidFill>
+                  <a:srgbClr val="FFFFFF"/>
+                </a:solidFill>
+              </a14:hiddenFill>
+            </a:ext>
+            <a:ext uri="{91240B29-F687-4F45-9708-019B960494DF}">
+              <a14:hiddenLine xmlns:a14="http://schemas.microsoft.com/office/drawing/2010/main" w="9525">
+                <a:solidFill>
+                  <a:srgbClr val="000000"/>
+                </a:solidFill>
+                <a:miter lim="800000"/>
+                <a:headEnd/>
+                <a:tailEnd/>
+              </a14:hiddenLine>
+            </a:ext>
+          </a:extLst>
+        </p:spPr>
+      </p:pic>
+      <p:sp>
+        <p:nvSpPr>
+          <p:cNvPr id="54" name="TextBox 53">
+            <a:extLst>
+              <a:ext uri="{FF2B5EF4-FFF2-40B4-BE49-F238E27FC236}">
+                <a16:creationId xmlns:a16="http://schemas.microsoft.com/office/drawing/2014/main" id="{6CEE8AB2-3FC6-3643-894C-4B461D9242D4}"/>
+              </a:ext>
+            </a:extLst>
+          </p:cNvPr>
+          <p:cNvSpPr txBox="1"/>
+          <p:nvPr/>
+        </p:nvSpPr>
+        <p:spPr>
+          <a:xfrm>
+            <a:off x="1648151" y="4331659"/>
+            <a:ext cx="852176" cy="200055"/>
+          </a:xfrm>
+          <a:prstGeom prst="rect">
+            <a:avLst/>
+          </a:prstGeom>
+          <a:solidFill>
+            <a:srgbClr val="8C5DDF"/>
+          </a:solidFill>
+        </p:spPr>
+        <p:txBody>
+          <a:bodyPr wrap="square" rtlCol="0">
+            <a:spAutoFit/>
+          </a:bodyPr>
+          <a:lstStyle/>
+          <a:p>
+            <a:pPr marL="0" marR="0" lvl="0" indent="0" algn="ctr" defTabSz="914400" rtl="0" eaLnBrk="0" fontAlgn="base" latinLnBrk="0" hangingPunct="0">
+              <a:lnSpc>
+                <a:spcPct val="100000"/>
+              </a:lnSpc>
+              <a:spcBef>
+                <a:spcPct val="0"/>
+              </a:spcBef>
+              <a:spcAft>
+                <a:spcPct val="0"/>
+              </a:spcAft>
+              <a:buClrTx/>
+              <a:buSzTx/>
+              <a:buFontTx/>
+              <a:buNone/>
+              <a:tabLst/>
+              <a:defRPr/>
+            </a:pPr>
+            <a:r>
+              <a:rPr kumimoji="0" lang="en-US" sz="700" b="0" i="0" u="none" strike="noStrike" kern="1200" cap="none" spc="0" normalizeH="0" baseline="0" noProof="0" dirty="0">
+                <a:ln>
+                  <a:noFill/>
+                </a:ln>
+                <a:solidFill>
+                  <a:srgbClr val="FAFAFA"/>
+                </a:solidFill>
+                <a:effectLst/>
+                <a:uLnTx/>
+                <a:uFillTx/>
+                <a:latin typeface="Arial" panose="020B0604020202020204" pitchFamily="34" charset="0"/>
+                <a:ea typeface="+mn-ea"/>
+                <a:cs typeface="Arial" panose="020B0604020202020204" pitchFamily="34" charset="0"/>
+              </a:rPr>
+              <a:t>NAT gateway1</a:t>
+            </a:r>
+          </a:p>
+        </p:txBody>
+      </p:sp>
+      <p:pic>
+        <p:nvPicPr>
+          <p:cNvPr id="70" name="Graphic 69">
+            <a:extLst>
+              <a:ext uri="{FF2B5EF4-FFF2-40B4-BE49-F238E27FC236}">
+                <a16:creationId xmlns:a16="http://schemas.microsoft.com/office/drawing/2014/main" id="{4E0C94BC-0F12-A340-88D9-FA05B186F071}"/>
+              </a:ext>
+            </a:extLst>
+          </p:cNvPr>
+          <p:cNvPicPr>
+            <a:picLocks noChangeAspect="1"/>
+          </p:cNvPicPr>
+          <p:nvPr/>
+        </p:nvPicPr>
+        <p:blipFill>
+          <a:blip r:embed="rId10">
+            <a:extLst>
+              <a:ext uri="{96DAC541-7B7A-43D3-8B79-37D633B846F1}">
+                <asvg:svgBlip xmlns:asvg="http://schemas.microsoft.com/office/drawing/2016/SVG/main" r:embed="rId11"/>
+              </a:ext>
+            </a:extLst>
+          </a:blip>
+          <a:stretch>
+            <a:fillRect/>
+          </a:stretch>
+        </p:blipFill>
+        <p:spPr>
+          <a:xfrm>
+            <a:off x="1957045" y="4024216"/>
+            <a:ext cx="289999" cy="289999"/>
+          </a:xfrm>
+          <a:prstGeom prst="rect">
+            <a:avLst/>
+          </a:prstGeom>
+        </p:spPr>
+      </p:pic>
+      <p:sp>
+        <p:nvSpPr>
+          <p:cNvPr id="84" name="TextBox 83">
+            <a:extLst>
+              <a:ext uri="{FF2B5EF4-FFF2-40B4-BE49-F238E27FC236}">
+                <a16:creationId xmlns:a16="http://schemas.microsoft.com/office/drawing/2014/main" id="{1A3867E0-DB43-2D44-B95C-C7A424E41BCF}"/>
+              </a:ext>
+            </a:extLst>
+          </p:cNvPr>
+          <p:cNvSpPr txBox="1"/>
+          <p:nvPr/>
+        </p:nvSpPr>
+        <p:spPr>
+          <a:xfrm>
+            <a:off x="5832754" y="4336996"/>
+            <a:ext cx="852176" cy="200055"/>
+          </a:xfrm>
+          <a:prstGeom prst="rect">
+            <a:avLst/>
+          </a:prstGeom>
+          <a:solidFill>
+            <a:srgbClr val="8C5DDF"/>
+          </a:solidFill>
+        </p:spPr>
+        <p:txBody>
+          <a:bodyPr wrap="square" rtlCol="0">
+            <a:spAutoFit/>
+          </a:bodyPr>
+          <a:lstStyle/>
+          <a:p>
+            <a:pPr marL="0" marR="0" lvl="0" indent="0" algn="ctr" defTabSz="914400" rtl="0" eaLnBrk="0" fontAlgn="base" latinLnBrk="0" hangingPunct="0">
+              <a:lnSpc>
+                <a:spcPct val="100000"/>
+              </a:lnSpc>
+              <a:spcBef>
+                <a:spcPct val="0"/>
+              </a:spcBef>
+              <a:spcAft>
+                <a:spcPct val="0"/>
+              </a:spcAft>
+              <a:buClrTx/>
+              <a:buSzTx/>
+              <a:buFontTx/>
+              <a:buNone/>
+              <a:tabLst/>
+              <a:defRPr/>
+            </a:pPr>
+            <a:r>
+              <a:rPr kumimoji="0" lang="en-US" sz="700" b="0" i="0" u="none" strike="noStrike" kern="1200" cap="none" spc="0" normalizeH="0" baseline="0" noProof="0" dirty="0">
+                <a:ln>
+                  <a:noFill/>
+                </a:ln>
+                <a:solidFill>
+                  <a:srgbClr val="FAFAFA"/>
+                </a:solidFill>
+                <a:effectLst/>
+                <a:uLnTx/>
+                <a:uFillTx/>
+                <a:latin typeface="Arial" panose="020B0604020202020204" pitchFamily="34" charset="0"/>
+                <a:ea typeface="+mn-ea"/>
+                <a:cs typeface="Arial" panose="020B0604020202020204" pitchFamily="34" charset="0"/>
+              </a:rPr>
+              <a:t>NAT gateway2</a:t>
+            </a:r>
+          </a:p>
+        </p:txBody>
+      </p:sp>
+      <p:pic>
+        <p:nvPicPr>
+          <p:cNvPr id="85" name="Graphic 84">
+            <a:extLst>
+              <a:ext uri="{FF2B5EF4-FFF2-40B4-BE49-F238E27FC236}">
+                <a16:creationId xmlns:a16="http://schemas.microsoft.com/office/drawing/2014/main" id="{2EDC3945-48CC-B145-95BA-F0253A7AC70D}"/>
+              </a:ext>
+            </a:extLst>
+          </p:cNvPr>
+          <p:cNvPicPr>
+            <a:picLocks noChangeAspect="1"/>
+          </p:cNvPicPr>
+          <p:nvPr/>
+        </p:nvPicPr>
+        <p:blipFill>
+          <a:blip r:embed="rId10">
+            <a:extLst>
+              <a:ext uri="{96DAC541-7B7A-43D3-8B79-37D633B846F1}">
+                <asvg:svgBlip xmlns:asvg="http://schemas.microsoft.com/office/drawing/2016/SVG/main" r:embed="rId11"/>
+              </a:ext>
+            </a:extLst>
+          </a:blip>
+          <a:stretch>
+            <a:fillRect/>
+          </a:stretch>
+        </p:blipFill>
+        <p:spPr>
+          <a:xfrm>
+            <a:off x="6141648" y="4029553"/>
+            <a:ext cx="289999" cy="289999"/>
+          </a:xfrm>
+          <a:prstGeom prst="rect">
+            <a:avLst/>
+          </a:prstGeom>
+        </p:spPr>
+      </p:pic>
+      <p:sp>
+        <p:nvSpPr>
+          <p:cNvPr id="86" name="Content Placeholder 3">
+            <a:extLst>
+              <a:ext uri="{FF2B5EF4-FFF2-40B4-BE49-F238E27FC236}">
+                <a16:creationId xmlns:a16="http://schemas.microsoft.com/office/drawing/2014/main" id="{BA4C86CF-BE68-D448-96A4-03FA680D42A7}"/>
+              </a:ext>
+            </a:extLst>
+          </p:cNvPr>
+          <p:cNvSpPr txBox="1">
+            <a:spLocks noChangeArrowheads="1"/>
+          </p:cNvSpPr>
+          <p:nvPr/>
+        </p:nvSpPr>
+        <p:spPr>
+          <a:xfrm>
+            <a:off x="7890243" y="1284354"/>
+            <a:ext cx="4154612" cy="4309466"/>
+          </a:xfrm>
+          <a:prstGeom prst="rect">
+            <a:avLst/>
+          </a:prstGeom>
+        </p:spPr>
+        <p:txBody>
+          <a:bodyPr/>
+          <a:lstStyle>
+            <a:lvl1pPr marL="0" indent="0" algn="l" defTabSz="914400" rtl="0" eaLnBrk="1" latinLnBrk="0" hangingPunct="1">
+              <a:lnSpc>
+                <a:spcPct val="90000"/>
+              </a:lnSpc>
+              <a:spcBef>
+                <a:spcPts val="1000"/>
+              </a:spcBef>
+              <a:buFont typeface="Arial" panose="020B0604020202020204" pitchFamily="34" charset="0"/>
+              <a:buNone/>
+              <a:defRPr sz="2400" kern="1200">
+                <a:solidFill>
+                  <a:schemeClr val="bg1"/>
+                </a:solidFill>
+                <a:latin typeface="Arial" panose="020B0604020202020204" pitchFamily="34" charset="0"/>
+                <a:ea typeface="+mn-ea"/>
+                <a:cs typeface="Arial" panose="020B0604020202020204" pitchFamily="34" charset="0"/>
+              </a:defRPr>
+            </a:lvl1pPr>
+            <a:lvl2pPr marL="457200" indent="0" algn="l" defTabSz="914400" rtl="0" eaLnBrk="1" latinLnBrk="0" hangingPunct="1">
+              <a:lnSpc>
+                <a:spcPct val="90000"/>
+              </a:lnSpc>
+              <a:spcBef>
+                <a:spcPts val="500"/>
+              </a:spcBef>
+              <a:buFont typeface="Arial" panose="020B0604020202020204" pitchFamily="34" charset="0"/>
+              <a:buNone/>
+              <a:defRPr sz="2000" kern="1200">
+                <a:solidFill>
+                  <a:schemeClr val="bg1"/>
+                </a:solidFill>
+                <a:latin typeface="Arial" panose="020B0604020202020204" pitchFamily="34" charset="0"/>
+                <a:ea typeface="+mn-ea"/>
+                <a:cs typeface="Arial" panose="020B0604020202020204" pitchFamily="34" charset="0"/>
+              </a:defRPr>
+            </a:lvl2pPr>
+            <a:lvl3pPr marL="914400" indent="0" algn="l" defTabSz="914400" rtl="0" eaLnBrk="1" latinLnBrk="0" hangingPunct="1">
+              <a:lnSpc>
+                <a:spcPct val="90000"/>
+              </a:lnSpc>
+              <a:spcBef>
+                <a:spcPts val="500"/>
+              </a:spcBef>
+              <a:buFont typeface="Arial" panose="020B0604020202020204" pitchFamily="34" charset="0"/>
+              <a:buNone/>
+              <a:defRPr sz="1800" kern="1200">
+                <a:solidFill>
+                  <a:schemeClr val="bg1"/>
+                </a:solidFill>
+                <a:latin typeface="Arial" panose="020B0604020202020204" pitchFamily="34" charset="0"/>
+                <a:ea typeface="+mn-ea"/>
+                <a:cs typeface="Arial" panose="020B0604020202020204" pitchFamily="34" charset="0"/>
+              </a:defRPr>
+            </a:lvl3pPr>
+            <a:lvl4pPr marL="1371600" indent="0" algn="l" defTabSz="914400" rtl="0" eaLnBrk="1" latinLnBrk="0" hangingPunct="1">
+              <a:lnSpc>
+                <a:spcPct val="90000"/>
+              </a:lnSpc>
+              <a:spcBef>
+                <a:spcPts val="500"/>
+              </a:spcBef>
+              <a:buFont typeface="Arial" panose="020B0604020202020204" pitchFamily="34" charset="0"/>
+              <a:buNone/>
+              <a:defRPr sz="1600" kern="1200">
+                <a:solidFill>
+                  <a:schemeClr val="bg1"/>
+                </a:solidFill>
+                <a:latin typeface="Arial" panose="020B0604020202020204" pitchFamily="34" charset="0"/>
+                <a:ea typeface="+mn-ea"/>
+                <a:cs typeface="Arial" panose="020B0604020202020204" pitchFamily="34" charset="0"/>
+              </a:defRPr>
+            </a:lvl4pPr>
+            <a:lvl5pPr marL="2057400" indent="-228600" algn="l" defTabSz="914400" rtl="0" eaLnBrk="1" latinLnBrk="0" hangingPunct="1">
+              <a:lnSpc>
+                <a:spcPct val="90000"/>
+              </a:lnSpc>
+              <a:spcBef>
+                <a:spcPts val="500"/>
+              </a:spcBef>
+              <a:buFont typeface="Arial" panose="020B0604020202020204" pitchFamily="34" charset="0"/>
+              <a:buChar char="•"/>
+              <a:defRPr sz="1800" kern="1200">
+                <a:solidFill>
+                  <a:schemeClr val="tx1"/>
+                </a:solidFill>
+                <a:latin typeface="Arial" panose="020B0604020202020204" pitchFamily="34" charset="0"/>
+                <a:ea typeface="+mn-ea"/>
+                <a:cs typeface="Arial" panose="020B0604020202020204" pitchFamily="34" charset="0"/>
+              </a:defRPr>
+            </a:lvl5pPr>
+            <a:lvl6pPr marL="2514600" indent="-228600" algn="l" defTabSz="914400" rtl="0" eaLnBrk="1" latinLnBrk="0" hangingPunct="1">
+              <a:lnSpc>
+                <a:spcPct val="90000"/>
+              </a:lnSpc>
+              <a:spcBef>
+                <a:spcPts val="500"/>
+              </a:spcBef>
+              <a:buFont typeface="Arial" panose="020B0604020202020204" pitchFamily="34" charset="0"/>
+              <a:buChar char="•"/>
+              <a:defRPr sz="1800" kern="1200">
+                <a:solidFill>
+                  <a:schemeClr val="tx1"/>
+                </a:solidFill>
+                <a:latin typeface="+mn-lt"/>
+                <a:ea typeface="+mn-ea"/>
+                <a:cs typeface="+mn-cs"/>
+              </a:defRPr>
+            </a:lvl6pPr>
+            <a:lvl7pPr marL="2971800" indent="-228600" algn="l" defTabSz="914400" rtl="0" eaLnBrk="1" latinLnBrk="0" hangingPunct="1">
+              <a:lnSpc>
+                <a:spcPct val="90000"/>
+              </a:lnSpc>
+              <a:spcBef>
+                <a:spcPts val="500"/>
+              </a:spcBef>
+              <a:buFont typeface="Arial" panose="020B0604020202020204" pitchFamily="34" charset="0"/>
+              <a:buChar char="•"/>
+              <a:defRPr sz="1800" kern="1200">
+                <a:solidFill>
+                  <a:schemeClr val="tx1"/>
+                </a:solidFill>
+                <a:latin typeface="+mn-lt"/>
+                <a:ea typeface="+mn-ea"/>
+                <a:cs typeface="+mn-cs"/>
+              </a:defRPr>
+            </a:lvl7pPr>
+            <a:lvl8pPr marL="3429000" indent="-228600" algn="l" defTabSz="914400" rtl="0" eaLnBrk="1" latinLnBrk="0" hangingPunct="1">
+              <a:lnSpc>
+                <a:spcPct val="90000"/>
+              </a:lnSpc>
+              <a:spcBef>
+                <a:spcPts val="500"/>
+              </a:spcBef>
+              <a:buFont typeface="Arial" panose="020B0604020202020204" pitchFamily="34" charset="0"/>
+              <a:buChar char="•"/>
+              <a:defRPr sz="1800" kern="1200">
+                <a:solidFill>
+                  <a:schemeClr val="tx1"/>
+                </a:solidFill>
+                <a:latin typeface="+mn-lt"/>
+                <a:ea typeface="+mn-ea"/>
+                <a:cs typeface="+mn-cs"/>
+              </a:defRPr>
+            </a:lvl8pPr>
+            <a:lvl9pPr marL="3886200" indent="-228600" algn="l" defTabSz="914400" rtl="0" eaLnBrk="1" latinLnBrk="0" hangingPunct="1">
+              <a:lnSpc>
+                <a:spcPct val="90000"/>
+              </a:lnSpc>
+              <a:spcBef>
+                <a:spcPts val="500"/>
+              </a:spcBef>
+              <a:buFont typeface="Arial" panose="020B0604020202020204" pitchFamily="34" charset="0"/>
+              <a:buChar char="•"/>
+              <a:defRPr sz="1800" kern="1200">
+                <a:solidFill>
+                  <a:schemeClr val="tx1"/>
+                </a:solidFill>
+                <a:latin typeface="+mn-lt"/>
+                <a:ea typeface="+mn-ea"/>
+                <a:cs typeface="+mn-cs"/>
+              </a:defRPr>
+            </a:lvl9pPr>
+          </a:lstStyle>
+          <a:p>
+            <a:pPr>
+              <a:spcBef>
+                <a:spcPts val="600"/>
+              </a:spcBef>
+            </a:pPr>
+            <a:r>
+              <a:rPr lang="en-US" sz="1200" b="1" dirty="0"/>
+              <a:t>New resources added:</a:t>
+            </a:r>
+          </a:p>
+          <a:p>
+            <a:pPr>
+              <a:spcBef>
+                <a:spcPts val="600"/>
+              </a:spcBef>
+            </a:pPr>
+            <a:r>
+              <a:rPr lang="en-US" sz="1000" dirty="0"/>
+              <a:t>PublicNetworkACL</a:t>
+            </a:r>
+          </a:p>
+          <a:p>
+            <a:pPr>
+              <a:spcBef>
+                <a:spcPts val="600"/>
+              </a:spcBef>
+            </a:pPr>
+            <a:endParaRPr lang="en-US" sz="1200" b="1" dirty="0"/>
+          </a:p>
+          <a:p>
+            <a:pPr>
+              <a:spcBef>
+                <a:spcPts val="600"/>
+              </a:spcBef>
+            </a:pPr>
+            <a:r>
+              <a:rPr lang="en-US" sz="1200" b="1" dirty="0"/>
+              <a:t>Output/Export Name:</a:t>
+            </a:r>
+          </a:p>
+          <a:p>
+            <a:r>
+              <a:rPr lang="en-AU" sz="1000" dirty="0" err="1"/>
+              <a:t>WebDMZ</a:t>
+            </a:r>
+            <a:r>
+              <a:rPr lang="en-AU" sz="1000" dirty="0"/>
+              <a:t>:</a:t>
+            </a:r>
+          </a:p>
+          <a:p>
+            <a:pPr lvl="1"/>
+            <a:r>
+              <a:rPr lang="en-AU" sz="1000" dirty="0"/>
+              <a:t>Name: </a:t>
+            </a:r>
+            <a:r>
+              <a:rPr lang="en-AU" sz="1000" dirty="0">
+                <a:solidFill>
+                  <a:srgbClr val="FF9300"/>
+                </a:solidFill>
+              </a:rPr>
+              <a:t>${</a:t>
+            </a:r>
+            <a:r>
+              <a:rPr lang="en-AU" sz="1000" dirty="0" err="1">
+                <a:solidFill>
+                  <a:srgbClr val="FF9300"/>
+                </a:solidFill>
+              </a:rPr>
+              <a:t>VpcStackName</a:t>
+            </a:r>
+            <a:r>
+              <a:rPr lang="en-AU" sz="1000" dirty="0">
+                <a:solidFill>
+                  <a:srgbClr val="FF9300"/>
+                </a:solidFill>
+              </a:rPr>
+              <a:t>}-</a:t>
+            </a:r>
+            <a:r>
+              <a:rPr lang="en-AU" sz="1000" dirty="0" err="1">
+                <a:solidFill>
+                  <a:srgbClr val="FF9300"/>
+                </a:solidFill>
+              </a:rPr>
+              <a:t>sharedinf-publicnetworkacl</a:t>
+            </a:r>
+            <a:r>
+              <a:rPr lang="en-AU" sz="1000" dirty="0">
+                <a:solidFill>
+                  <a:srgbClr val="FF9300"/>
+                </a:solidFill>
+              </a:rPr>
+              <a:t> </a:t>
+            </a:r>
+          </a:p>
+          <a:p>
+            <a:pPr lvl="1"/>
+            <a:endParaRPr lang="en-AU" sz="1000" dirty="0">
+              <a:solidFill>
+                <a:srgbClr val="FF9300"/>
+              </a:solidFill>
+            </a:endParaRPr>
+          </a:p>
+          <a:p>
+            <a:pPr>
+              <a:spcBef>
+                <a:spcPts val="600"/>
+              </a:spcBef>
+            </a:pPr>
+            <a:r>
+              <a:rPr lang="en-US" sz="1200" b="1" dirty="0"/>
+              <a:t>Subnets associations:</a:t>
+            </a:r>
+          </a:p>
+          <a:p>
+            <a:pPr marL="171450" indent="-171450">
+              <a:spcBef>
+                <a:spcPts val="600"/>
+              </a:spcBef>
+              <a:buFont typeface="Arial" panose="020B0604020202020204" pitchFamily="34" charset="0"/>
+              <a:buChar char="•"/>
+            </a:pPr>
+            <a:r>
+              <a:rPr lang="en-US" sz="1000" dirty="0"/>
+              <a:t>Public subnet1 and Public Subnet2</a:t>
+            </a:r>
+          </a:p>
+          <a:p>
+            <a:pPr>
+              <a:spcBef>
+                <a:spcPts val="600"/>
+              </a:spcBef>
+            </a:pPr>
+            <a:endParaRPr lang="en-US" sz="1200" b="1" dirty="0"/>
+          </a:p>
+          <a:p>
+            <a:pPr>
+              <a:spcBef>
+                <a:spcPts val="600"/>
+              </a:spcBef>
+            </a:pPr>
+            <a:r>
+              <a:rPr lang="en-US" sz="1200" b="1" dirty="0"/>
+              <a:t>Ingress policy:</a:t>
+            </a:r>
+          </a:p>
+          <a:p>
+            <a:pPr marL="171450" indent="-171450">
+              <a:spcBef>
+                <a:spcPts val="600"/>
+              </a:spcBef>
+              <a:buFont typeface="Arial" panose="020B0604020202020204" pitchFamily="34" charset="0"/>
+              <a:buChar char="•"/>
+            </a:pPr>
+            <a:r>
+              <a:rPr lang="en-US" sz="1000" dirty="0"/>
+              <a:t>Allow http/https coming from Internet</a:t>
+            </a:r>
+          </a:p>
+          <a:p>
+            <a:pPr marL="171450" indent="-171450">
+              <a:spcBef>
+                <a:spcPts val="600"/>
+              </a:spcBef>
+              <a:buFont typeface="Arial" panose="020B0604020202020204" pitchFamily="34" charset="0"/>
+              <a:buChar char="•"/>
+            </a:pPr>
+            <a:r>
+              <a:rPr lang="en-US" sz="1000" dirty="0"/>
+              <a:t>Allow SSH coming from Internet</a:t>
+            </a:r>
+          </a:p>
+          <a:p>
+            <a:pPr>
+              <a:spcBef>
+                <a:spcPts val="600"/>
+              </a:spcBef>
+            </a:pPr>
+            <a:endParaRPr lang="en-US" sz="1200" b="1" dirty="0"/>
+          </a:p>
+          <a:p>
+            <a:pPr>
+              <a:spcBef>
+                <a:spcPts val="600"/>
+              </a:spcBef>
+            </a:pPr>
+            <a:r>
+              <a:rPr lang="en-US" sz="1200" b="1" dirty="0"/>
+              <a:t>Egress policy:</a:t>
+            </a:r>
+          </a:p>
+          <a:p>
+            <a:pPr marL="171450" indent="-171450">
+              <a:spcBef>
+                <a:spcPts val="600"/>
+              </a:spcBef>
+              <a:buFont typeface="Arial" panose="020B0604020202020204" pitchFamily="34" charset="0"/>
+              <a:buChar char="•"/>
+            </a:pPr>
+            <a:r>
+              <a:rPr lang="en-US" sz="1000" dirty="0"/>
+              <a:t>Allow all traffic going out to the Internet</a:t>
+            </a:r>
+          </a:p>
+          <a:p>
+            <a:endParaRPr lang="en-US" sz="1200" dirty="0"/>
+          </a:p>
+        </p:txBody>
+      </p:sp>
+      <p:sp>
+        <p:nvSpPr>
+          <p:cNvPr id="28" name="Rectangle 27">
+            <a:extLst>
+              <a:ext uri="{FF2B5EF4-FFF2-40B4-BE49-F238E27FC236}">
+                <a16:creationId xmlns:a16="http://schemas.microsoft.com/office/drawing/2014/main" id="{CECEABEB-EFC7-3946-963A-AA64D906CEF3}"/>
+              </a:ext>
+            </a:extLst>
+          </p:cNvPr>
+          <p:cNvSpPr/>
+          <p:nvPr/>
+        </p:nvSpPr>
+        <p:spPr>
+          <a:xfrm>
+            <a:off x="3185769" y="2531382"/>
+            <a:ext cx="1765300" cy="345808"/>
+          </a:xfrm>
+          <a:prstGeom prst="rect">
+            <a:avLst/>
+          </a:prstGeom>
+          <a:noFill/>
+          <a:ln w="12700">
+            <a:solidFill>
+              <a:srgbClr val="FC584C"/>
+            </a:solidFill>
+          </a:ln>
+        </p:spPr>
+        <p:style>
+          <a:lnRef idx="2">
+            <a:schemeClr val="accent1">
+              <a:shade val="50000"/>
+            </a:schemeClr>
+          </a:lnRef>
+          <a:fillRef idx="1">
+            <a:schemeClr val="accent1"/>
+          </a:fillRef>
+          <a:effectRef idx="0">
+            <a:schemeClr val="accent1"/>
+          </a:effectRef>
+          <a:fontRef idx="minor">
+            <a:schemeClr val="lt1"/>
+          </a:fontRef>
+        </p:style>
+        <p:txBody>
+          <a:bodyPr tIns="91440" anchorCtr="1"/>
+          <a:lstStyle/>
+          <a:p>
+            <a:pPr algn="ctr" eaLnBrk="1" fontAlgn="auto" hangingPunct="1">
+              <a:spcBef>
+                <a:spcPts val="0"/>
+              </a:spcBef>
+              <a:spcAft>
+                <a:spcPts val="0"/>
+              </a:spcAft>
+              <a:defRPr/>
+            </a:pPr>
+            <a:r>
+              <a:rPr lang="en-US" sz="800" dirty="0">
+                <a:solidFill>
+                  <a:srgbClr val="FC584C"/>
+                </a:solidFill>
+                <a:latin typeface="Arial" panose="020B0604020202020204" pitchFamily="34" charset="0"/>
+                <a:cs typeface="Arial" panose="020B0604020202020204" pitchFamily="34" charset="0"/>
+              </a:rPr>
+              <a:t>Security group</a:t>
+            </a:r>
+          </a:p>
+          <a:p>
+            <a:pPr algn="ctr" eaLnBrk="1" fontAlgn="auto" hangingPunct="1">
+              <a:spcBef>
+                <a:spcPts val="0"/>
+              </a:spcBef>
+              <a:spcAft>
+                <a:spcPts val="0"/>
+              </a:spcAft>
+              <a:defRPr/>
+            </a:pPr>
+            <a:r>
+              <a:rPr lang="en-US" sz="800" dirty="0">
+                <a:solidFill>
+                  <a:srgbClr val="FC584C"/>
+                </a:solidFill>
+                <a:latin typeface="Arial" panose="020B0604020202020204" pitchFamily="34" charset="0"/>
+                <a:cs typeface="Arial" panose="020B0604020202020204" pitchFamily="34" charset="0"/>
+              </a:rPr>
+              <a:t>WebDMZ</a:t>
+            </a:r>
+          </a:p>
+        </p:txBody>
+      </p:sp>
+      <p:sp>
+        <p:nvSpPr>
+          <p:cNvPr id="29" name="Rectangle 28">
+            <a:extLst>
+              <a:ext uri="{FF2B5EF4-FFF2-40B4-BE49-F238E27FC236}">
+                <a16:creationId xmlns:a16="http://schemas.microsoft.com/office/drawing/2014/main" id="{B4C12889-980A-004D-B90E-05F2010ABC3E}"/>
+              </a:ext>
+            </a:extLst>
+          </p:cNvPr>
+          <p:cNvSpPr/>
+          <p:nvPr/>
+        </p:nvSpPr>
+        <p:spPr>
+          <a:xfrm>
+            <a:off x="3174976" y="3985851"/>
+            <a:ext cx="1765300" cy="345808"/>
+          </a:xfrm>
+          <a:prstGeom prst="rect">
+            <a:avLst/>
+          </a:prstGeom>
+          <a:noFill/>
+          <a:ln w="12700">
+            <a:solidFill>
+              <a:srgbClr val="FC584C"/>
+            </a:solidFill>
+          </a:ln>
+        </p:spPr>
+        <p:style>
+          <a:lnRef idx="2">
+            <a:schemeClr val="accent1">
+              <a:shade val="50000"/>
+            </a:schemeClr>
+          </a:lnRef>
+          <a:fillRef idx="1">
+            <a:schemeClr val="accent1"/>
+          </a:fillRef>
+          <a:effectRef idx="0">
+            <a:schemeClr val="accent1"/>
+          </a:effectRef>
+          <a:fontRef idx="minor">
+            <a:schemeClr val="lt1"/>
+          </a:fontRef>
+        </p:style>
+        <p:txBody>
+          <a:bodyPr tIns="91440" anchorCtr="1"/>
+          <a:lstStyle/>
+          <a:p>
+            <a:pPr algn="ctr" eaLnBrk="1" fontAlgn="auto" hangingPunct="1">
+              <a:spcBef>
+                <a:spcPts val="0"/>
+              </a:spcBef>
+              <a:spcAft>
+                <a:spcPts val="0"/>
+              </a:spcAft>
+              <a:defRPr/>
+            </a:pPr>
+            <a:r>
+              <a:rPr lang="en-US" sz="800" dirty="0">
+                <a:solidFill>
+                  <a:srgbClr val="FC584C"/>
+                </a:solidFill>
+                <a:latin typeface="Arial" panose="020B0604020202020204" pitchFamily="34" charset="0"/>
+                <a:cs typeface="Arial" panose="020B0604020202020204" pitchFamily="34" charset="0"/>
+              </a:rPr>
+              <a:t>Security group</a:t>
+            </a:r>
+          </a:p>
+          <a:p>
+            <a:pPr algn="ctr" eaLnBrk="1" fontAlgn="auto" hangingPunct="1">
+              <a:spcBef>
+                <a:spcPts val="0"/>
+              </a:spcBef>
+              <a:spcAft>
+                <a:spcPts val="0"/>
+              </a:spcAft>
+              <a:defRPr/>
+            </a:pPr>
+            <a:r>
+              <a:rPr lang="en-US" sz="800" dirty="0">
+                <a:solidFill>
+                  <a:srgbClr val="FC584C"/>
+                </a:solidFill>
+                <a:latin typeface="Arial" panose="020B0604020202020204" pitchFamily="34" charset="0"/>
+                <a:cs typeface="Arial" panose="020B0604020202020204" pitchFamily="34" charset="0"/>
+              </a:rPr>
+              <a:t>Database</a:t>
+            </a:r>
+          </a:p>
+        </p:txBody>
+      </p:sp>
+      <p:sp>
+        <p:nvSpPr>
+          <p:cNvPr id="30" name="Rectangle 29">
+            <a:extLst>
+              <a:ext uri="{FF2B5EF4-FFF2-40B4-BE49-F238E27FC236}">
+                <a16:creationId xmlns:a16="http://schemas.microsoft.com/office/drawing/2014/main" id="{AFE7079F-F852-7C46-84CE-9F54F0E57B95}"/>
+              </a:ext>
+            </a:extLst>
+          </p:cNvPr>
+          <p:cNvSpPr/>
+          <p:nvPr/>
+        </p:nvSpPr>
+        <p:spPr>
+          <a:xfrm>
+            <a:off x="3174976" y="1652855"/>
+            <a:ext cx="1765300" cy="345808"/>
+          </a:xfrm>
+          <a:prstGeom prst="rect">
+            <a:avLst/>
+          </a:prstGeom>
+          <a:noFill/>
+          <a:ln w="12700">
+            <a:solidFill>
+              <a:srgbClr val="FC584C"/>
+            </a:solidFill>
+          </a:ln>
+        </p:spPr>
+        <p:style>
+          <a:lnRef idx="2">
+            <a:schemeClr val="accent1">
+              <a:shade val="50000"/>
+            </a:schemeClr>
+          </a:lnRef>
+          <a:fillRef idx="1">
+            <a:schemeClr val="accent1"/>
+          </a:fillRef>
+          <a:effectRef idx="0">
+            <a:schemeClr val="accent1"/>
+          </a:effectRef>
+          <a:fontRef idx="minor">
+            <a:schemeClr val="lt1"/>
+          </a:fontRef>
+        </p:style>
+        <p:txBody>
+          <a:bodyPr tIns="91440" anchorCtr="1"/>
+          <a:lstStyle/>
+          <a:p>
+            <a:pPr algn="ctr" eaLnBrk="1" fontAlgn="auto" hangingPunct="1">
+              <a:spcBef>
+                <a:spcPts val="0"/>
+              </a:spcBef>
+              <a:spcAft>
+                <a:spcPts val="0"/>
+              </a:spcAft>
+              <a:defRPr/>
+            </a:pPr>
+            <a:r>
+              <a:rPr lang="en-US" sz="800" dirty="0">
+                <a:solidFill>
+                  <a:srgbClr val="FC584C"/>
+                </a:solidFill>
+                <a:latin typeface="Arial" panose="020B0604020202020204" pitchFamily="34" charset="0"/>
+                <a:cs typeface="Arial" panose="020B0604020202020204" pitchFamily="34" charset="0"/>
+              </a:rPr>
+              <a:t>PublicNetworkACL</a:t>
+            </a:r>
+          </a:p>
+        </p:txBody>
+      </p:sp>
+    </p:spTree>
+    <p:extLst>
+      <p:ext uri="{BB962C8B-B14F-4D97-AF65-F5344CB8AC3E}">
+        <p14:creationId xmlns:p14="http://schemas.microsoft.com/office/powerpoint/2010/main" val="2035596729"/>
+      </p:ext>
+    </p:extLst>
+  </p:cSld>
+  <p:clrMapOvr>
+    <a:masterClrMapping/>
+  </p:clrMapOvr>
+</p:sld>
+</file>
+
+<file path=ppt/slides/slide5.xml><?xml version="1.0" encoding="utf-8"?>
+<p:sld xmlns:a="http://schemas.openxmlformats.org/drawingml/2006/main" xmlns:r="http://schemas.openxmlformats.org/officeDocument/2006/relationships" xmlns:p="http://schemas.openxmlformats.org/presentationml/2006/main">
+  <p:cSld>
+    <p:spTree>
+      <p:nvGrpSpPr>
+        <p:cNvPr id="1" name=""/>
+        <p:cNvGrpSpPr/>
+        <p:nvPr/>
+      </p:nvGrpSpPr>
+      <p:grpSpPr>
+        <a:xfrm>
+          <a:off x="0" y="0"/>
+          <a:ext cx="0" cy="0"/>
+          <a:chOff x="0" y="0"/>
+          <a:chExt cx="0" cy="0"/>
+        </a:xfrm>
+      </p:grpSpPr>
+      <p:sp>
+        <p:nvSpPr>
+          <p:cNvPr id="47117" name="Slide Number Placeholder 37">
+            <a:extLst>
+              <a:ext uri="{FF2B5EF4-FFF2-40B4-BE49-F238E27FC236}">
+                <a16:creationId xmlns:a16="http://schemas.microsoft.com/office/drawing/2014/main" id="{2E567938-C0BD-E540-B624-F078B8BCE8A1}"/>
+              </a:ext>
+            </a:extLst>
+          </p:cNvPr>
+          <p:cNvSpPr>
+            <a:spLocks noGrp="1" noChangeArrowheads="1"/>
+          </p:cNvSpPr>
+          <p:nvPr>
+            <p:ph type="sldNum" sz="quarter" idx="4"/>
+          </p:nvPr>
+        </p:nvSpPr>
+        <p:spPr bwMode="auto">
+          <a:noFill/>
+          <a:extLst>
+            <a:ext uri="{909E8E84-426E-40DD-AFC4-6F175D3DCCD1}">
+              <a14:hiddenFill xmlns:a14="http://schemas.microsoft.com/office/drawing/2010/main">
+                <a:solidFill>
+                  <a:srgbClr val="FFFFFF"/>
+                </a:solidFill>
+              </a14:hiddenFill>
+            </a:ext>
+            <a:ext uri="{91240B29-F687-4F45-9708-019B960494DF}">
+              <a14:hiddenLine xmlns:a14="http://schemas.microsoft.com/office/drawing/2010/main" w="9525">
+                <a:solidFill>
+                  <a:srgbClr val="000000"/>
+                </a:solidFill>
+                <a:miter lim="800000"/>
+                <a:headEnd/>
+                <a:tailEnd/>
+              </a14:hiddenLine>
+            </a:ext>
+          </a:extLst>
+        </p:spPr>
+        <p:txBody>
+          <a:bodyPr wrap="square" numCol="1" anchorCtr="0" compatLnSpc="1">
+            <a:prstTxWarp prst="textNoShape">
+              <a:avLst/>
+            </a:prstTxWarp>
+          </a:bodyPr>
+          <a:lstStyle>
+            <a:lvl1pPr>
+              <a:defRPr>
+                <a:solidFill>
+                  <a:schemeClr val="tx1"/>
+                </a:solidFill>
+                <a:latin typeface="Calibri" panose="020F0502020204030204" pitchFamily="34" charset="0"/>
+              </a:defRPr>
+            </a:lvl1pPr>
+            <a:lvl2pPr marL="742950" indent="-285750">
+              <a:defRPr>
+                <a:solidFill>
+                  <a:schemeClr val="tx1"/>
+                </a:solidFill>
+                <a:latin typeface="Calibri" panose="020F0502020204030204" pitchFamily="34" charset="0"/>
+              </a:defRPr>
+            </a:lvl2pPr>
+            <a:lvl3pPr marL="1143000" indent="-228600">
+              <a:defRPr>
+                <a:solidFill>
+                  <a:schemeClr val="tx1"/>
+                </a:solidFill>
+                <a:latin typeface="Calibri" panose="020F0502020204030204" pitchFamily="34" charset="0"/>
+              </a:defRPr>
+            </a:lvl3pPr>
+            <a:lvl4pPr marL="1600200" indent="-228600">
+              <a:defRPr>
+                <a:solidFill>
+                  <a:schemeClr val="tx1"/>
+                </a:solidFill>
+                <a:latin typeface="Calibri" panose="020F0502020204030204" pitchFamily="34" charset="0"/>
+              </a:defRPr>
+            </a:lvl4pPr>
+            <a:lvl5pPr marL="2057400" indent="-228600">
+              <a:defRPr>
+                <a:solidFill>
+                  <a:schemeClr val="tx1"/>
+                </a:solidFill>
+                <a:latin typeface="Calibri" panose="020F0502020204030204" pitchFamily="34" charset="0"/>
+              </a:defRPr>
+            </a:lvl5pPr>
+            <a:lvl6pPr marL="2514600" indent="-228600" eaLnBrk="0" fontAlgn="base" hangingPunct="0">
+              <a:spcBef>
+                <a:spcPct val="0"/>
+              </a:spcBef>
+              <a:spcAft>
+                <a:spcPct val="0"/>
+              </a:spcAft>
+              <a:defRPr>
+                <a:solidFill>
+                  <a:schemeClr val="tx1"/>
+                </a:solidFill>
+                <a:latin typeface="Calibri" panose="020F0502020204030204" pitchFamily="34" charset="0"/>
+              </a:defRPr>
+            </a:lvl6pPr>
+            <a:lvl7pPr marL="2971800" indent="-228600" eaLnBrk="0" fontAlgn="base" hangingPunct="0">
+              <a:spcBef>
+                <a:spcPct val="0"/>
+              </a:spcBef>
+              <a:spcAft>
+                <a:spcPct val="0"/>
+              </a:spcAft>
+              <a:defRPr>
+                <a:solidFill>
+                  <a:schemeClr val="tx1"/>
+                </a:solidFill>
+                <a:latin typeface="Calibri" panose="020F0502020204030204" pitchFamily="34" charset="0"/>
+              </a:defRPr>
+            </a:lvl7pPr>
+            <a:lvl8pPr marL="3429000" indent="-228600" eaLnBrk="0" fontAlgn="base" hangingPunct="0">
+              <a:spcBef>
+                <a:spcPct val="0"/>
+              </a:spcBef>
+              <a:spcAft>
+                <a:spcPct val="0"/>
+              </a:spcAft>
+              <a:defRPr>
+                <a:solidFill>
+                  <a:schemeClr val="tx1"/>
+                </a:solidFill>
+                <a:latin typeface="Calibri" panose="020F0502020204030204" pitchFamily="34" charset="0"/>
+              </a:defRPr>
+            </a:lvl8pPr>
+            <a:lvl9pPr marL="3886200" indent="-228600" eaLnBrk="0" fontAlgn="base" hangingPunct="0">
+              <a:spcBef>
+                <a:spcPct val="0"/>
+              </a:spcBef>
+              <a:spcAft>
+                <a:spcPct val="0"/>
+              </a:spcAft>
+              <a:defRPr>
+                <a:solidFill>
+                  <a:schemeClr val="tx1"/>
+                </a:solidFill>
+                <a:latin typeface="Calibri" panose="020F0502020204030204" pitchFamily="34" charset="0"/>
+              </a:defRPr>
+            </a:lvl9pPr>
+          </a:lstStyle>
+          <a:p>
+            <a:pPr marL="0" marR="0" lvl="0" indent="0" algn="r" defTabSz="914400" rtl="0" eaLnBrk="0" fontAlgn="base" latinLnBrk="0" hangingPunct="0">
+              <a:lnSpc>
+                <a:spcPct val="100000"/>
+              </a:lnSpc>
+              <a:spcBef>
+                <a:spcPct val="0"/>
+              </a:spcBef>
+              <a:spcAft>
+                <a:spcPct val="0"/>
+              </a:spcAft>
+              <a:buClrTx/>
+              <a:buSzTx/>
+              <a:buFontTx/>
+              <a:buNone/>
+              <a:tabLst/>
+              <a:defRPr/>
+            </a:pPr>
+            <a:fld id="{006A2D43-0584-8040-91B5-2138A277CB9C}" type="slidenum">
+              <a:rPr kumimoji="0" lang="en-US" altLang="en-US" sz="1200" b="0" i="0" u="none" strike="noStrike" kern="1200" cap="none" spc="0" normalizeH="0" baseline="0" noProof="0" smtClean="0">
+                <a:ln>
+                  <a:noFill/>
+                </a:ln>
+                <a:solidFill>
+                  <a:prstClr val="white"/>
+                </a:solidFill>
+                <a:effectLst/>
+                <a:uLnTx/>
+                <a:uFillTx/>
+                <a:latin typeface="Arial" panose="020B0604020202020204" pitchFamily="34" charset="0"/>
+                <a:ea typeface="+mn-ea"/>
+                <a:cs typeface="Arial" panose="020B0604020202020204" pitchFamily="34" charset="0"/>
+              </a:rPr>
+              <a:pPr marL="0" marR="0" lvl="0" indent="0" algn="r" defTabSz="914400" rtl="0" eaLnBrk="0" fontAlgn="base" latinLnBrk="0" hangingPunct="0">
+                <a:lnSpc>
+                  <a:spcPct val="100000"/>
+                </a:lnSpc>
+                <a:spcBef>
+                  <a:spcPct val="0"/>
+                </a:spcBef>
+                <a:spcAft>
+                  <a:spcPct val="0"/>
+                </a:spcAft>
+                <a:buClrTx/>
+                <a:buSzTx/>
+                <a:buFontTx/>
+                <a:buNone/>
+                <a:tabLst/>
+                <a:defRPr/>
+              </a:pPr>
+              <a:t>5</a:t>
+            </a:fld>
+            <a:endParaRPr kumimoji="0" lang="en-US" altLang="en-US" sz="1200" b="0" i="0" u="none" strike="noStrike" kern="1200" cap="none" spc="0" normalizeH="0" baseline="0" noProof="0" dirty="0">
+              <a:ln>
+                <a:noFill/>
+              </a:ln>
+              <a:solidFill>
+                <a:prstClr val="white"/>
+              </a:solidFill>
+              <a:effectLst/>
+              <a:uLnTx/>
+              <a:uFillTx/>
+              <a:latin typeface="Arial" panose="020B0604020202020204" pitchFamily="34" charset="0"/>
+              <a:ea typeface="+mn-ea"/>
+              <a:cs typeface="Arial" panose="020B0604020202020204" pitchFamily="34" charset="0"/>
+            </a:endParaRPr>
+          </a:p>
+        </p:txBody>
+      </p:sp>
+      <p:sp>
+        <p:nvSpPr>
+          <p:cNvPr id="47105" name="Title 1">
+            <a:extLst>
+              <a:ext uri="{FF2B5EF4-FFF2-40B4-BE49-F238E27FC236}">
+                <a16:creationId xmlns:a16="http://schemas.microsoft.com/office/drawing/2014/main" id="{6EA39E97-4C97-AD40-972C-394E863845C9}"/>
+              </a:ext>
+            </a:extLst>
+          </p:cNvPr>
+          <p:cNvSpPr>
+            <a:spLocks noGrp="1" noChangeArrowheads="1"/>
+          </p:cNvSpPr>
+          <p:nvPr>
+            <p:ph type="title"/>
+          </p:nvPr>
+        </p:nvSpPr>
+        <p:spPr/>
+        <p:txBody>
+          <a:bodyPr/>
+          <a:lstStyle/>
+          <a:p>
+            <a:pPr eaLnBrk="1" hangingPunct="1"/>
+            <a:r>
+              <a:rPr lang="en-US" altLang="en-US" dirty="0"/>
+              <a:t>s3_bucket_1</a:t>
+            </a:r>
+          </a:p>
+        </p:txBody>
+      </p:sp>
+      <p:sp>
+        <p:nvSpPr>
+          <p:cNvPr id="49" name="Rectangle 48">
+            <a:extLst>
+              <a:ext uri="{FF2B5EF4-FFF2-40B4-BE49-F238E27FC236}">
+                <a16:creationId xmlns:a16="http://schemas.microsoft.com/office/drawing/2014/main" id="{C4B84CB2-3636-3247-BF16-7F5D8F01E041}"/>
+              </a:ext>
+            </a:extLst>
+          </p:cNvPr>
+          <p:cNvSpPr/>
+          <p:nvPr/>
+        </p:nvSpPr>
+        <p:spPr>
+          <a:xfrm>
+            <a:off x="533953" y="1209216"/>
+            <a:ext cx="4048557" cy="3352274"/>
+          </a:xfrm>
+          <a:prstGeom prst="rect">
+            <a:avLst/>
+          </a:prstGeom>
+          <a:noFill/>
+          <a:ln w="12700">
+            <a:solidFill>
+              <a:srgbClr val="FAFAFA"/>
+            </a:solidFill>
+          </a:ln>
+        </p:spPr>
+        <p:style>
+          <a:lnRef idx="2">
+            <a:schemeClr val="accent1">
+              <a:shade val="50000"/>
+            </a:schemeClr>
+          </a:lnRef>
+          <a:fillRef idx="1">
+            <a:schemeClr val="accent1"/>
+          </a:fillRef>
+          <a:effectRef idx="0">
+            <a:schemeClr val="accent1"/>
+          </a:effectRef>
+          <a:fontRef idx="minor">
+            <a:schemeClr val="lt1"/>
+          </a:fontRef>
+        </p:style>
+        <p:txBody>
+          <a:bodyPr rot="0" spcFirstLastPara="0" vertOverflow="overflow" horzOverflow="overflow" vert="horz" wrap="square" lIns="457200" tIns="91440" rIns="91440" bIns="45720" numCol="1" spcCol="0" rtlCol="0" fromWordArt="0" anchor="t" anchorCtr="0" forceAA="0" compatLnSpc="1">
+            <a:prstTxWarp prst="textNoShape">
+              <a:avLst/>
+            </a:prstTxWarp>
+            <a:noAutofit/>
+          </a:bodyPr>
+          <a:lstStyle/>
+          <a:p>
+            <a:pPr marL="0" marR="0" lvl="0" indent="0" algn="l" defTabSz="914400" rtl="0" eaLnBrk="0" fontAlgn="base" latinLnBrk="0" hangingPunct="0">
+              <a:lnSpc>
+                <a:spcPct val="100000"/>
+              </a:lnSpc>
+              <a:spcBef>
+                <a:spcPct val="0"/>
+              </a:spcBef>
+              <a:spcAft>
+                <a:spcPct val="0"/>
+              </a:spcAft>
+              <a:buClrTx/>
+              <a:buSzTx/>
+              <a:buFontTx/>
+              <a:buNone/>
+              <a:tabLst/>
+              <a:defRPr/>
+            </a:pPr>
+            <a:r>
+              <a:rPr kumimoji="0" lang="en-US" sz="1200" b="0" i="0" u="none" strike="noStrike" kern="1200" cap="none" spc="0" normalizeH="0" baseline="0" noProof="0" dirty="0">
+                <a:ln>
+                  <a:noFill/>
+                </a:ln>
+                <a:solidFill>
+                  <a:srgbClr val="FAFAFA"/>
+                </a:solidFill>
+                <a:effectLst/>
+                <a:uLnTx/>
+                <a:uFillTx/>
+                <a:latin typeface="Arial" panose="020B0604020202020204" pitchFamily="34" charset="0"/>
+                <a:ea typeface="+mn-ea"/>
+                <a:cs typeface="Arial" panose="020B0604020202020204" pitchFamily="34" charset="0"/>
+              </a:rPr>
+              <a:t>AWS Cloud</a:t>
+            </a:r>
+          </a:p>
+        </p:txBody>
+      </p:sp>
+      <p:pic>
+        <p:nvPicPr>
+          <p:cNvPr id="62" name="Graphic 61">
+            <a:extLst>
+              <a:ext uri="{FF2B5EF4-FFF2-40B4-BE49-F238E27FC236}">
+                <a16:creationId xmlns:a16="http://schemas.microsoft.com/office/drawing/2014/main" id="{2E7BD715-16E7-3746-B184-5D905EBA0972}"/>
+              </a:ext>
+            </a:extLst>
+          </p:cNvPr>
+          <p:cNvPicPr>
+            <a:picLocks noChangeAspect="1"/>
+          </p:cNvPicPr>
+          <p:nvPr/>
+        </p:nvPicPr>
+        <p:blipFill>
+          <a:blip r:embed="rId2">
+            <a:extLst>
+              <a:ext uri="{96DAC541-7B7A-43D3-8B79-37D633B846F1}">
+                <asvg:svgBlip xmlns:asvg="http://schemas.microsoft.com/office/drawing/2016/SVG/main" r:embed="rId3"/>
+              </a:ext>
+            </a:extLst>
+          </a:blip>
+          <a:stretch>
+            <a:fillRect/>
+          </a:stretch>
+        </p:blipFill>
+        <p:spPr>
+          <a:xfrm>
+            <a:off x="533953" y="1203046"/>
+            <a:ext cx="400579" cy="400579"/>
+          </a:xfrm>
+          <a:prstGeom prst="rect">
+            <a:avLst/>
+          </a:prstGeom>
+        </p:spPr>
+      </p:pic>
+      <p:sp>
+        <p:nvSpPr>
+          <p:cNvPr id="38" name="Footer Placeholder 3">
+            <a:extLst>
+              <a:ext uri="{FF2B5EF4-FFF2-40B4-BE49-F238E27FC236}">
+                <a16:creationId xmlns:a16="http://schemas.microsoft.com/office/drawing/2014/main" id="{D0396B8E-F8E8-A04C-B870-9D224E3AAF12}"/>
+              </a:ext>
+            </a:extLst>
+          </p:cNvPr>
+          <p:cNvSpPr txBox="1">
+            <a:spLocks noChangeArrowheads="1"/>
+          </p:cNvSpPr>
+          <p:nvPr/>
+        </p:nvSpPr>
+        <p:spPr bwMode="auto">
+          <a:xfrm>
+            <a:off x="1090613" y="6249988"/>
+            <a:ext cx="4462462" cy="365125"/>
+          </a:xfrm>
+          <a:prstGeom prst="rect">
+            <a:avLst/>
+          </a:prstGeom>
+          <a:noFill/>
+          <a:extLst>
+            <a:ext uri="{909E8E84-426E-40DD-AFC4-6F175D3DCCD1}">
+              <a14:hiddenFill xmlns:a14="http://schemas.microsoft.com/office/drawing/2010/main">
+                <a:solidFill>
+                  <a:srgbClr val="FFFFFF"/>
+                </a:solidFill>
+              </a14:hiddenFill>
+            </a:ext>
+            <a:ext uri="{91240B29-F687-4F45-9708-019B960494DF}">
+              <a14:hiddenLine xmlns:a14="http://schemas.microsoft.com/office/drawing/2010/main" w="9525">
+                <a:solidFill>
+                  <a:srgbClr val="000000"/>
+                </a:solidFill>
+                <a:miter lim="800000"/>
+                <a:headEnd/>
+                <a:tailEnd/>
+              </a14:hiddenLine>
+            </a:ext>
+          </a:extLst>
+        </p:spPr>
+        <p:txBody>
+          <a:bodyPr vert="horz" wrap="square" lIns="91440" tIns="45720" rIns="91440" bIns="45720" numCol="1" rtlCol="0" anchor="ctr" anchorCtr="0" compatLnSpc="1">
+            <a:prstTxWarp prst="textNoShape">
+              <a:avLst/>
+            </a:prstTxWarp>
+          </a:bodyPr>
+          <a:lstStyle>
+            <a:defPPr>
+              <a:defRPr lang="en-US"/>
+            </a:defPPr>
+            <a:lvl1pPr marL="0" marR="0" indent="0" algn="l" defTabSz="914400" rtl="0" eaLnBrk="1" fontAlgn="auto" latinLnBrk="0" hangingPunct="1">
+              <a:lnSpc>
+                <a:spcPct val="100000"/>
+              </a:lnSpc>
+              <a:spcBef>
+                <a:spcPts val="0"/>
+              </a:spcBef>
+              <a:spcAft>
+                <a:spcPts val="0"/>
+              </a:spcAft>
+              <a:buClrTx/>
+              <a:buSzTx/>
+              <a:buFontTx/>
+              <a:buNone/>
+              <a:tabLst/>
+              <a:defRPr sz="1000" kern="1200">
+                <a:solidFill>
+                  <a:schemeClr val="bg1"/>
+                </a:solidFill>
+                <a:latin typeface="Arial" panose="020B0604020202020204" pitchFamily="34" charset="0"/>
+                <a:ea typeface="+mn-ea"/>
+                <a:cs typeface="Arial" panose="020B0604020202020204" pitchFamily="34" charset="0"/>
+              </a:defRPr>
+            </a:lvl1pPr>
+            <a:lvl2pPr marL="457200" algn="l" defTabSz="914400" rtl="0" eaLnBrk="0" fontAlgn="base" latinLnBrk="0" hangingPunct="0">
+              <a:spcBef>
+                <a:spcPct val="0"/>
+              </a:spcBef>
+              <a:spcAft>
+                <a:spcPct val="0"/>
+              </a:spcAft>
+              <a:defRPr sz="1800" kern="1200">
+                <a:solidFill>
+                  <a:schemeClr val="tx1"/>
+                </a:solidFill>
+                <a:latin typeface="Calibri" panose="020F0502020204030204" pitchFamily="34" charset="0"/>
+                <a:ea typeface="+mn-ea"/>
+                <a:cs typeface="+mn-cs"/>
+              </a:defRPr>
+            </a:lvl2pPr>
+            <a:lvl3pPr marL="914400" algn="l" defTabSz="914400" rtl="0" eaLnBrk="0" fontAlgn="base" latinLnBrk="0" hangingPunct="0">
+              <a:spcBef>
+                <a:spcPct val="0"/>
+              </a:spcBef>
+              <a:spcAft>
+                <a:spcPct val="0"/>
+              </a:spcAft>
+              <a:defRPr sz="1800" kern="1200">
+                <a:solidFill>
+                  <a:schemeClr val="tx1"/>
+                </a:solidFill>
+                <a:latin typeface="Calibri" panose="020F0502020204030204" pitchFamily="34" charset="0"/>
+                <a:ea typeface="+mn-ea"/>
+                <a:cs typeface="+mn-cs"/>
+              </a:defRPr>
+            </a:lvl3pPr>
+            <a:lvl4pPr marL="1371600" algn="l" defTabSz="914400" rtl="0" eaLnBrk="0" fontAlgn="base" latinLnBrk="0" hangingPunct="0">
+              <a:spcBef>
+                <a:spcPct val="0"/>
+              </a:spcBef>
+              <a:spcAft>
+                <a:spcPct val="0"/>
+              </a:spcAft>
+              <a:defRPr sz="1800" kern="1200">
+                <a:solidFill>
+                  <a:schemeClr val="tx1"/>
+                </a:solidFill>
+                <a:latin typeface="Calibri" panose="020F0502020204030204" pitchFamily="34" charset="0"/>
+                <a:ea typeface="+mn-ea"/>
+                <a:cs typeface="+mn-cs"/>
+              </a:defRPr>
+            </a:lvl4pPr>
+            <a:lvl5pPr marL="1828800" algn="l" defTabSz="914400" rtl="0" eaLnBrk="0" fontAlgn="base" latinLnBrk="0" hangingPunct="0">
+              <a:spcBef>
+                <a:spcPct val="0"/>
+              </a:spcBef>
+              <a:spcAft>
+                <a:spcPct val="0"/>
+              </a:spcAft>
+              <a:defRPr sz="1800" kern="1200">
+                <a:solidFill>
+                  <a:schemeClr val="tx1"/>
+                </a:solidFill>
+                <a:latin typeface="Calibri" panose="020F0502020204030204" pitchFamily="34" charset="0"/>
+                <a:ea typeface="+mn-ea"/>
+                <a:cs typeface="+mn-cs"/>
+              </a:defRPr>
+            </a:lvl5pPr>
+            <a:lvl6pPr marL="2286000" algn="l" defTabSz="914400" rtl="0" eaLnBrk="1" latinLnBrk="0" hangingPunct="1">
+              <a:defRPr sz="1800" kern="1200">
+                <a:solidFill>
+                  <a:schemeClr val="tx1"/>
+                </a:solidFill>
+                <a:latin typeface="Calibri" panose="020F0502020204030204" pitchFamily="34" charset="0"/>
+                <a:ea typeface="+mn-ea"/>
+                <a:cs typeface="+mn-cs"/>
+              </a:defRPr>
+            </a:lvl6pPr>
+            <a:lvl7pPr marL="2743200" algn="l" defTabSz="914400" rtl="0" eaLnBrk="1" latinLnBrk="0" hangingPunct="1">
+              <a:defRPr sz="1800" kern="1200">
+                <a:solidFill>
+                  <a:schemeClr val="tx1"/>
+                </a:solidFill>
+                <a:latin typeface="Calibri" panose="020F0502020204030204" pitchFamily="34" charset="0"/>
+                <a:ea typeface="+mn-ea"/>
+                <a:cs typeface="+mn-cs"/>
+              </a:defRPr>
+            </a:lvl7pPr>
+            <a:lvl8pPr marL="3200400" algn="l" defTabSz="914400" rtl="0" eaLnBrk="1" latinLnBrk="0" hangingPunct="1">
+              <a:defRPr sz="1800" kern="1200">
+                <a:solidFill>
+                  <a:schemeClr val="tx1"/>
+                </a:solidFill>
+                <a:latin typeface="Calibri" panose="020F0502020204030204" pitchFamily="34" charset="0"/>
+                <a:ea typeface="+mn-ea"/>
+                <a:cs typeface="+mn-cs"/>
+              </a:defRPr>
+            </a:lvl8pPr>
+            <a:lvl9pPr marL="3657600" algn="l" defTabSz="914400" rtl="0" eaLnBrk="1" latinLnBrk="0" hangingPunct="1">
+              <a:defRPr sz="1800" kern="1200">
+                <a:solidFill>
+                  <a:schemeClr val="tx1"/>
+                </a:solidFill>
+                <a:latin typeface="Calibri" panose="020F0502020204030204" pitchFamily="34" charset="0"/>
+                <a:ea typeface="+mn-ea"/>
+                <a:cs typeface="+mn-cs"/>
+              </a:defRPr>
+            </a:lvl9pPr>
+          </a:lstStyle>
+          <a:p>
+            <a:pPr fontAlgn="base">
+              <a:spcBef>
+                <a:spcPct val="0"/>
+              </a:spcBef>
+              <a:spcAft>
+                <a:spcPct val="0"/>
+              </a:spcAft>
+            </a:pPr>
+            <a:r>
+              <a:rPr lang="en-US"/>
+              <a:t>© 2021, AussieCloudGuru. All rights reserved.</a:t>
+            </a:r>
+            <a:endParaRPr lang="en-US" altLang="en-US" dirty="0"/>
+          </a:p>
+        </p:txBody>
+      </p:sp>
+      <p:sp>
+        <p:nvSpPr>
+          <p:cNvPr id="86" name="Content Placeholder 3">
+            <a:extLst>
+              <a:ext uri="{FF2B5EF4-FFF2-40B4-BE49-F238E27FC236}">
+                <a16:creationId xmlns:a16="http://schemas.microsoft.com/office/drawing/2014/main" id="{BA4C86CF-BE68-D448-96A4-03FA680D42A7}"/>
+              </a:ext>
+            </a:extLst>
+          </p:cNvPr>
+          <p:cNvSpPr txBox="1">
+            <a:spLocks noChangeArrowheads="1"/>
+          </p:cNvSpPr>
+          <p:nvPr/>
+        </p:nvSpPr>
+        <p:spPr>
+          <a:xfrm>
+            <a:off x="7890243" y="1284354"/>
+            <a:ext cx="4154612" cy="4309466"/>
+          </a:xfrm>
+          <a:prstGeom prst="rect">
+            <a:avLst/>
+          </a:prstGeom>
+        </p:spPr>
+        <p:txBody>
+          <a:bodyPr/>
+          <a:lstStyle>
+            <a:lvl1pPr marL="0" indent="0" algn="l" defTabSz="914400" rtl="0" eaLnBrk="1" latinLnBrk="0" hangingPunct="1">
+              <a:lnSpc>
+                <a:spcPct val="90000"/>
+              </a:lnSpc>
+              <a:spcBef>
+                <a:spcPts val="1000"/>
+              </a:spcBef>
+              <a:buFont typeface="Arial" panose="020B0604020202020204" pitchFamily="34" charset="0"/>
+              <a:buNone/>
+              <a:defRPr sz="2400" kern="1200">
+                <a:solidFill>
+                  <a:schemeClr val="bg1"/>
+                </a:solidFill>
+                <a:latin typeface="Arial" panose="020B0604020202020204" pitchFamily="34" charset="0"/>
+                <a:ea typeface="+mn-ea"/>
+                <a:cs typeface="Arial" panose="020B0604020202020204" pitchFamily="34" charset="0"/>
+              </a:defRPr>
+            </a:lvl1pPr>
+            <a:lvl2pPr marL="457200" indent="0" algn="l" defTabSz="914400" rtl="0" eaLnBrk="1" latinLnBrk="0" hangingPunct="1">
+              <a:lnSpc>
+                <a:spcPct val="90000"/>
+              </a:lnSpc>
+              <a:spcBef>
+                <a:spcPts val="500"/>
+              </a:spcBef>
+              <a:buFont typeface="Arial" panose="020B0604020202020204" pitchFamily="34" charset="0"/>
+              <a:buNone/>
+              <a:defRPr sz="2000" kern="1200">
+                <a:solidFill>
+                  <a:schemeClr val="bg1"/>
+                </a:solidFill>
+                <a:latin typeface="Arial" panose="020B0604020202020204" pitchFamily="34" charset="0"/>
+                <a:ea typeface="+mn-ea"/>
+                <a:cs typeface="Arial" panose="020B0604020202020204" pitchFamily="34" charset="0"/>
+              </a:defRPr>
+            </a:lvl2pPr>
+            <a:lvl3pPr marL="914400" indent="0" algn="l" defTabSz="914400" rtl="0" eaLnBrk="1" latinLnBrk="0" hangingPunct="1">
+              <a:lnSpc>
+                <a:spcPct val="90000"/>
+              </a:lnSpc>
+              <a:spcBef>
+                <a:spcPts val="500"/>
+              </a:spcBef>
+              <a:buFont typeface="Arial" panose="020B0604020202020204" pitchFamily="34" charset="0"/>
+              <a:buNone/>
+              <a:defRPr sz="1800" kern="1200">
+                <a:solidFill>
+                  <a:schemeClr val="bg1"/>
+                </a:solidFill>
+                <a:latin typeface="Arial" panose="020B0604020202020204" pitchFamily="34" charset="0"/>
+                <a:ea typeface="+mn-ea"/>
+                <a:cs typeface="Arial" panose="020B0604020202020204" pitchFamily="34" charset="0"/>
+              </a:defRPr>
+            </a:lvl3pPr>
+            <a:lvl4pPr marL="1371600" indent="0" algn="l" defTabSz="914400" rtl="0" eaLnBrk="1" latinLnBrk="0" hangingPunct="1">
+              <a:lnSpc>
+                <a:spcPct val="90000"/>
+              </a:lnSpc>
+              <a:spcBef>
+                <a:spcPts val="500"/>
+              </a:spcBef>
+              <a:buFont typeface="Arial" panose="020B0604020202020204" pitchFamily="34" charset="0"/>
+              <a:buNone/>
+              <a:defRPr sz="1600" kern="1200">
+                <a:solidFill>
+                  <a:schemeClr val="bg1"/>
+                </a:solidFill>
+                <a:latin typeface="Arial" panose="020B0604020202020204" pitchFamily="34" charset="0"/>
+                <a:ea typeface="+mn-ea"/>
+                <a:cs typeface="Arial" panose="020B0604020202020204" pitchFamily="34" charset="0"/>
+              </a:defRPr>
+            </a:lvl4pPr>
+            <a:lvl5pPr marL="2057400" indent="-228600" algn="l" defTabSz="914400" rtl="0" eaLnBrk="1" latinLnBrk="0" hangingPunct="1">
+              <a:lnSpc>
+                <a:spcPct val="90000"/>
+              </a:lnSpc>
+              <a:spcBef>
+                <a:spcPts val="500"/>
+              </a:spcBef>
+              <a:buFont typeface="Arial" panose="020B0604020202020204" pitchFamily="34" charset="0"/>
+              <a:buChar char="•"/>
+              <a:defRPr sz="1800" kern="1200">
+                <a:solidFill>
+                  <a:schemeClr val="tx1"/>
+                </a:solidFill>
+                <a:latin typeface="Arial" panose="020B0604020202020204" pitchFamily="34" charset="0"/>
+                <a:ea typeface="+mn-ea"/>
+                <a:cs typeface="Arial" panose="020B0604020202020204" pitchFamily="34" charset="0"/>
+              </a:defRPr>
+            </a:lvl5pPr>
+            <a:lvl6pPr marL="2514600" indent="-228600" algn="l" defTabSz="914400" rtl="0" eaLnBrk="1" latinLnBrk="0" hangingPunct="1">
+              <a:lnSpc>
+                <a:spcPct val="90000"/>
+              </a:lnSpc>
+              <a:spcBef>
+                <a:spcPts val="500"/>
+              </a:spcBef>
+              <a:buFont typeface="Arial" panose="020B0604020202020204" pitchFamily="34" charset="0"/>
+              <a:buChar char="•"/>
+              <a:defRPr sz="1800" kern="1200">
+                <a:solidFill>
+                  <a:schemeClr val="tx1"/>
+                </a:solidFill>
+                <a:latin typeface="+mn-lt"/>
+                <a:ea typeface="+mn-ea"/>
+                <a:cs typeface="+mn-cs"/>
+              </a:defRPr>
+            </a:lvl6pPr>
+            <a:lvl7pPr marL="2971800" indent="-228600" algn="l" defTabSz="914400" rtl="0" eaLnBrk="1" latinLnBrk="0" hangingPunct="1">
+              <a:lnSpc>
+                <a:spcPct val="90000"/>
+              </a:lnSpc>
+              <a:spcBef>
+                <a:spcPts val="500"/>
+              </a:spcBef>
+              <a:buFont typeface="Arial" panose="020B0604020202020204" pitchFamily="34" charset="0"/>
+              <a:buChar char="•"/>
+              <a:defRPr sz="1800" kern="1200">
+                <a:solidFill>
+                  <a:schemeClr val="tx1"/>
+                </a:solidFill>
+                <a:latin typeface="+mn-lt"/>
+                <a:ea typeface="+mn-ea"/>
+                <a:cs typeface="+mn-cs"/>
+              </a:defRPr>
+            </a:lvl7pPr>
+            <a:lvl8pPr marL="3429000" indent="-228600" algn="l" defTabSz="914400" rtl="0" eaLnBrk="1" latinLnBrk="0" hangingPunct="1">
+              <a:lnSpc>
+                <a:spcPct val="90000"/>
+              </a:lnSpc>
+              <a:spcBef>
+                <a:spcPts val="500"/>
+              </a:spcBef>
+              <a:buFont typeface="Arial" panose="020B0604020202020204" pitchFamily="34" charset="0"/>
+              <a:buChar char="•"/>
+              <a:defRPr sz="1800" kern="1200">
+                <a:solidFill>
+                  <a:schemeClr val="tx1"/>
+                </a:solidFill>
+                <a:latin typeface="+mn-lt"/>
+                <a:ea typeface="+mn-ea"/>
+                <a:cs typeface="+mn-cs"/>
+              </a:defRPr>
+            </a:lvl8pPr>
+            <a:lvl9pPr marL="3886200" indent="-228600" algn="l" defTabSz="914400" rtl="0" eaLnBrk="1" latinLnBrk="0" hangingPunct="1">
+              <a:lnSpc>
+                <a:spcPct val="90000"/>
+              </a:lnSpc>
+              <a:spcBef>
+                <a:spcPts val="500"/>
+              </a:spcBef>
+              <a:buFont typeface="Arial" panose="020B0604020202020204" pitchFamily="34" charset="0"/>
+              <a:buChar char="•"/>
+              <a:defRPr sz="1800" kern="1200">
+                <a:solidFill>
+                  <a:schemeClr val="tx1"/>
+                </a:solidFill>
+                <a:latin typeface="+mn-lt"/>
+                <a:ea typeface="+mn-ea"/>
+                <a:cs typeface="+mn-cs"/>
+              </a:defRPr>
+            </a:lvl9pPr>
+          </a:lstStyle>
+          <a:p>
+            <a:pPr>
+              <a:spcBef>
+                <a:spcPts val="600"/>
+              </a:spcBef>
+            </a:pPr>
+            <a:r>
+              <a:rPr lang="en-US" sz="1200" b="1" dirty="0"/>
+              <a:t>New resources added:</a:t>
+            </a:r>
+          </a:p>
+          <a:p>
+            <a:pPr>
+              <a:spcBef>
+                <a:spcPts val="600"/>
+              </a:spcBef>
+            </a:pPr>
+            <a:r>
+              <a:rPr lang="en-US" sz="1000" dirty="0"/>
+              <a:t>PublicS3Bucket</a:t>
+            </a:r>
+          </a:p>
+          <a:p>
+            <a:pPr>
+              <a:spcBef>
+                <a:spcPts val="600"/>
+              </a:spcBef>
+            </a:pPr>
+            <a:endParaRPr lang="en-US" sz="1200" b="1" dirty="0"/>
+          </a:p>
+          <a:p>
+            <a:pPr>
+              <a:spcBef>
+                <a:spcPts val="600"/>
+              </a:spcBef>
+            </a:pPr>
+            <a:r>
+              <a:rPr lang="en-US" sz="1200" b="1" dirty="0"/>
+              <a:t>Output/Export Name:</a:t>
+            </a:r>
+          </a:p>
+          <a:p>
+            <a:r>
+              <a:rPr lang="en-AU" sz="1000" dirty="0"/>
+              <a:t>PublicS3Bucket:</a:t>
+            </a:r>
+          </a:p>
+          <a:p>
+            <a:pPr lvl="1"/>
+            <a:r>
+              <a:rPr lang="en-AU" sz="1000" dirty="0"/>
+              <a:t>Name: </a:t>
+            </a:r>
+            <a:r>
+              <a:rPr lang="en-AU" sz="1000" dirty="0">
+                <a:solidFill>
+                  <a:srgbClr val="FF9300"/>
+                </a:solidFill>
+              </a:rPr>
+              <a:t>${AWS::</a:t>
+            </a:r>
+            <a:r>
+              <a:rPr lang="en-AU" sz="1000" dirty="0" err="1">
+                <a:solidFill>
+                  <a:srgbClr val="FF9300"/>
+                </a:solidFill>
+              </a:rPr>
+              <a:t>StackName</a:t>
+            </a:r>
+            <a:r>
+              <a:rPr lang="en-AU" sz="1000" dirty="0">
+                <a:solidFill>
+                  <a:srgbClr val="FF9300"/>
+                </a:solidFill>
+              </a:rPr>
+              <a:t>}-sharedinf-publics3bucket </a:t>
+            </a:r>
+          </a:p>
+          <a:p>
+            <a:pPr lvl="1"/>
+            <a:endParaRPr lang="en-AU" sz="1000" dirty="0">
+              <a:solidFill>
+                <a:srgbClr val="FF9300"/>
+              </a:solidFill>
+            </a:endParaRPr>
+          </a:p>
+          <a:p>
+            <a:pPr>
+              <a:spcBef>
+                <a:spcPts val="600"/>
+              </a:spcBef>
+            </a:pPr>
+            <a:r>
+              <a:rPr lang="en-US" sz="1200" b="1" dirty="0"/>
+              <a:t>Access Control List - ACL:</a:t>
+            </a:r>
+          </a:p>
+          <a:p>
+            <a:pPr marL="171450" indent="-171450">
+              <a:spcBef>
+                <a:spcPts val="600"/>
+              </a:spcBef>
+              <a:buFont typeface="Arial" panose="020B0604020202020204" pitchFamily="34" charset="0"/>
+              <a:buChar char="•"/>
+            </a:pPr>
+            <a:r>
+              <a:rPr lang="en-US" sz="1000" dirty="0"/>
+              <a:t>Public Read</a:t>
+            </a:r>
+          </a:p>
+          <a:p>
+            <a:pPr>
+              <a:spcBef>
+                <a:spcPts val="600"/>
+              </a:spcBef>
+            </a:pPr>
+            <a:endParaRPr lang="en-US" sz="1200" b="1" dirty="0"/>
+          </a:p>
+          <a:p>
+            <a:endParaRPr lang="en-US" sz="1200" dirty="0"/>
+          </a:p>
+        </p:txBody>
+      </p:sp>
+      <p:sp>
+        <p:nvSpPr>
+          <p:cNvPr id="31" name="Rectangle 30">
+            <a:extLst>
+              <a:ext uri="{FF2B5EF4-FFF2-40B4-BE49-F238E27FC236}">
+                <a16:creationId xmlns:a16="http://schemas.microsoft.com/office/drawing/2014/main" id="{55B3B9D7-14C1-4842-8858-3785FF340890}"/>
+              </a:ext>
+            </a:extLst>
+          </p:cNvPr>
+          <p:cNvSpPr/>
+          <p:nvPr/>
+        </p:nvSpPr>
+        <p:spPr>
+          <a:xfrm>
+            <a:off x="934531" y="1605211"/>
+            <a:ext cx="3122461" cy="2619947"/>
+          </a:xfrm>
+          <a:prstGeom prst="rect">
+            <a:avLst/>
+          </a:prstGeom>
+          <a:noFill/>
+          <a:ln w="12700">
+            <a:solidFill>
+              <a:srgbClr val="00A0C8"/>
+            </a:solidFill>
+            <a:prstDash val="sysDash"/>
+          </a:ln>
+        </p:spPr>
+        <p:style>
+          <a:lnRef idx="2">
+            <a:schemeClr val="accent1">
+              <a:shade val="50000"/>
+            </a:schemeClr>
+          </a:lnRef>
+          <a:fillRef idx="1">
+            <a:schemeClr val="accent1"/>
+          </a:fillRef>
+          <a:effectRef idx="0">
+            <a:schemeClr val="accent1"/>
+          </a:effectRef>
+          <a:fontRef idx="minor">
+            <a:schemeClr val="lt1"/>
+          </a:fontRef>
+        </p:style>
+        <p:txBody>
+          <a:bodyPr lIns="457200" tIns="91440"/>
+          <a:lstStyle/>
+          <a:p>
+            <a:pPr eaLnBrk="1" fontAlgn="auto" hangingPunct="1">
+              <a:spcBef>
+                <a:spcPts val="0"/>
+              </a:spcBef>
+              <a:spcAft>
+                <a:spcPts val="0"/>
+              </a:spcAft>
+              <a:defRPr/>
+            </a:pPr>
+            <a:r>
+              <a:rPr lang="en-US" sz="1200" dirty="0">
+                <a:solidFill>
+                  <a:srgbClr val="00A0C8"/>
+                </a:solidFill>
+                <a:latin typeface="Arial" panose="020B0604020202020204" pitchFamily="34" charset="0"/>
+                <a:cs typeface="Arial" panose="020B0604020202020204" pitchFamily="34" charset="0"/>
+              </a:rPr>
+              <a:t>Region</a:t>
+            </a:r>
+          </a:p>
+        </p:txBody>
+      </p:sp>
+      <p:pic>
+        <p:nvPicPr>
+          <p:cNvPr id="32" name="Graphic 98">
+            <a:extLst>
+              <a:ext uri="{FF2B5EF4-FFF2-40B4-BE49-F238E27FC236}">
+                <a16:creationId xmlns:a16="http://schemas.microsoft.com/office/drawing/2014/main" id="{93919895-B2C5-E14C-A22E-25C2A354925F}"/>
+              </a:ext>
+            </a:extLst>
+          </p:cNvPr>
+          <p:cNvPicPr>
+            <a:picLocks noChangeAspect="1" noChangeArrowheads="1"/>
+          </p:cNvPicPr>
+          <p:nvPr/>
+        </p:nvPicPr>
+        <p:blipFill>
+          <a:blip r:embed="rId4">
+            <a:extLst>
+              <a:ext uri="{28A0092B-C50C-407E-A947-70E740481C1C}">
+                <a14:useLocalDpi xmlns:a14="http://schemas.microsoft.com/office/drawing/2010/main" val="0"/>
+              </a:ext>
+            </a:extLst>
+          </a:blip>
+          <a:srcRect/>
+          <a:stretch>
+            <a:fillRect/>
+          </a:stretch>
+        </p:blipFill>
+        <p:spPr bwMode="auto">
+          <a:xfrm>
+            <a:off x="934532" y="1603625"/>
+            <a:ext cx="330200" cy="330200"/>
+          </a:xfrm>
+          <a:prstGeom prst="rect">
+            <a:avLst/>
+          </a:prstGeom>
+          <a:noFill/>
+          <a:ln>
+            <a:noFill/>
+          </a:ln>
+          <a:extLst>
+            <a:ext uri="{909E8E84-426E-40DD-AFC4-6F175D3DCCD1}">
+              <a14:hiddenFill xmlns:a14="http://schemas.microsoft.com/office/drawing/2010/main">
+                <a:solidFill>
+                  <a:srgbClr val="FFFFFF"/>
+                </a:solidFill>
+              </a14:hiddenFill>
+            </a:ext>
+            <a:ext uri="{91240B29-F687-4F45-9708-019B960494DF}">
+              <a14:hiddenLine xmlns:a14="http://schemas.microsoft.com/office/drawing/2010/main" w="9525">
+                <a:solidFill>
+                  <a:srgbClr val="000000"/>
+                </a:solidFill>
+                <a:miter lim="800000"/>
+                <a:headEnd/>
+                <a:tailEnd/>
+              </a14:hiddenLine>
+            </a:ext>
+          </a:extLst>
+        </p:spPr>
+      </p:pic>
+      <p:sp>
+        <p:nvSpPr>
+          <p:cNvPr id="33" name="TextBox 20">
+            <a:extLst>
+              <a:ext uri="{FF2B5EF4-FFF2-40B4-BE49-F238E27FC236}">
+                <a16:creationId xmlns:a16="http://schemas.microsoft.com/office/drawing/2014/main" id="{CF0C65B0-EE15-394D-860D-28D0A78A55EF}"/>
+              </a:ext>
+            </a:extLst>
+          </p:cNvPr>
+          <p:cNvSpPr txBox="1">
+            <a:spLocks noChangeArrowheads="1"/>
+          </p:cNvSpPr>
+          <p:nvPr/>
+        </p:nvSpPr>
+        <p:spPr bwMode="auto">
+          <a:xfrm>
+            <a:off x="1790289" y="2850549"/>
+            <a:ext cx="1290638" cy="430887"/>
+          </a:xfrm>
+          <a:prstGeom prst="rect">
+            <a:avLst/>
+          </a:prstGeom>
+          <a:noFill/>
+          <a:ln>
+            <a:noFill/>
+          </a:ln>
+          <a:extLst>
+            <a:ext uri="{909E8E84-426E-40DD-AFC4-6F175D3DCCD1}">
+              <a14:hiddenFill xmlns:a14="http://schemas.microsoft.com/office/drawing/2010/main">
+                <a:solidFill>
+                  <a:srgbClr val="FFFFFF"/>
+                </a:solidFill>
+              </a14:hiddenFill>
+            </a:ext>
+            <a:ext uri="{91240B29-F687-4F45-9708-019B960494DF}">
+              <a14:hiddenLine xmlns:a14="http://schemas.microsoft.com/office/drawing/2010/main" w="9525">
+                <a:solidFill>
+                  <a:srgbClr val="000000"/>
+                </a:solidFill>
+                <a:miter lim="800000"/>
+                <a:headEnd/>
+                <a:tailEnd/>
+              </a14:hiddenLine>
+            </a:ext>
+          </a:extLst>
+        </p:spPr>
+        <p:txBody>
+          <a:bodyPr wrap="square">
+            <a:spAutoFit/>
+          </a:bodyPr>
+          <a:lstStyle>
+            <a:lvl1pPr>
+              <a:defRPr>
+                <a:solidFill>
+                  <a:schemeClr val="tx1"/>
+                </a:solidFill>
+                <a:latin typeface="Calibri" panose="020F0502020204030204" pitchFamily="34" charset="0"/>
+              </a:defRPr>
+            </a:lvl1pPr>
+            <a:lvl2pPr marL="742950" indent="-285750">
+              <a:defRPr>
+                <a:solidFill>
+                  <a:schemeClr val="tx1"/>
+                </a:solidFill>
+                <a:latin typeface="Calibri" panose="020F0502020204030204" pitchFamily="34" charset="0"/>
+              </a:defRPr>
+            </a:lvl2pPr>
+            <a:lvl3pPr marL="1143000" indent="-228600">
+              <a:defRPr>
+                <a:solidFill>
+                  <a:schemeClr val="tx1"/>
+                </a:solidFill>
+                <a:latin typeface="Calibri" panose="020F0502020204030204" pitchFamily="34" charset="0"/>
+              </a:defRPr>
+            </a:lvl3pPr>
+            <a:lvl4pPr marL="1600200" indent="-228600">
+              <a:defRPr>
+                <a:solidFill>
+                  <a:schemeClr val="tx1"/>
+                </a:solidFill>
+                <a:latin typeface="Calibri" panose="020F0502020204030204" pitchFamily="34" charset="0"/>
+              </a:defRPr>
+            </a:lvl4pPr>
+            <a:lvl5pPr marL="2057400" indent="-228600">
+              <a:defRPr>
+                <a:solidFill>
+                  <a:schemeClr val="tx1"/>
+                </a:solidFill>
+                <a:latin typeface="Calibri" panose="020F0502020204030204" pitchFamily="34" charset="0"/>
+              </a:defRPr>
+            </a:lvl5pPr>
+            <a:lvl6pPr marL="2514600" indent="-228600" eaLnBrk="0" fontAlgn="base" hangingPunct="0">
+              <a:spcBef>
+                <a:spcPct val="0"/>
+              </a:spcBef>
+              <a:spcAft>
+                <a:spcPct val="0"/>
+              </a:spcAft>
+              <a:defRPr>
+                <a:solidFill>
+                  <a:schemeClr val="tx1"/>
+                </a:solidFill>
+                <a:latin typeface="Calibri" panose="020F0502020204030204" pitchFamily="34" charset="0"/>
+              </a:defRPr>
+            </a:lvl6pPr>
+            <a:lvl7pPr marL="2971800" indent="-228600" eaLnBrk="0" fontAlgn="base" hangingPunct="0">
+              <a:spcBef>
+                <a:spcPct val="0"/>
+              </a:spcBef>
+              <a:spcAft>
+                <a:spcPct val="0"/>
+              </a:spcAft>
+              <a:defRPr>
+                <a:solidFill>
+                  <a:schemeClr val="tx1"/>
+                </a:solidFill>
+                <a:latin typeface="Calibri" panose="020F0502020204030204" pitchFamily="34" charset="0"/>
+              </a:defRPr>
+            </a:lvl7pPr>
+            <a:lvl8pPr marL="3429000" indent="-228600" eaLnBrk="0" fontAlgn="base" hangingPunct="0">
+              <a:spcBef>
+                <a:spcPct val="0"/>
+              </a:spcBef>
+              <a:spcAft>
+                <a:spcPct val="0"/>
+              </a:spcAft>
+              <a:defRPr>
+                <a:solidFill>
+                  <a:schemeClr val="tx1"/>
+                </a:solidFill>
+                <a:latin typeface="Calibri" panose="020F0502020204030204" pitchFamily="34" charset="0"/>
+              </a:defRPr>
+            </a:lvl8pPr>
+            <a:lvl9pPr marL="3886200" indent="-228600" eaLnBrk="0" fontAlgn="base" hangingPunct="0">
+              <a:spcBef>
+                <a:spcPct val="0"/>
+              </a:spcBef>
+              <a:spcAft>
+                <a:spcPct val="0"/>
+              </a:spcAft>
+              <a:defRPr>
+                <a:solidFill>
+                  <a:schemeClr val="tx1"/>
+                </a:solidFill>
+                <a:latin typeface="Calibri" panose="020F0502020204030204" pitchFamily="34" charset="0"/>
+              </a:defRPr>
+            </a:lvl9pPr>
+          </a:lstStyle>
+          <a:p>
+            <a:pPr algn="ctr" eaLnBrk="1" hangingPunct="1"/>
+            <a:r>
+              <a:rPr lang="en-US" altLang="en-US" sz="1100" dirty="0">
+                <a:solidFill>
+                  <a:schemeClr val="bg1"/>
+                </a:solidFill>
+                <a:latin typeface="Arial" panose="020B0604020202020204" pitchFamily="34" charset="0"/>
+                <a:ea typeface="Amazon Ember" panose="020B0603020204020204" pitchFamily="34" charset="0"/>
+                <a:cs typeface="Arial" panose="020B0604020202020204" pitchFamily="34" charset="0"/>
+              </a:rPr>
+              <a:t>Bucket with</a:t>
+            </a:r>
+          </a:p>
+          <a:p>
+            <a:pPr algn="ctr" eaLnBrk="1" hangingPunct="1"/>
+            <a:r>
+              <a:rPr lang="en-US" altLang="en-US" sz="1100" dirty="0">
+                <a:solidFill>
+                  <a:schemeClr val="bg1"/>
+                </a:solidFill>
+                <a:latin typeface="Arial" panose="020B0604020202020204" pitchFamily="34" charset="0"/>
+                <a:ea typeface="Amazon Ember" panose="020B0603020204020204" pitchFamily="34" charset="0"/>
+                <a:cs typeface="Arial" panose="020B0604020202020204" pitchFamily="34" charset="0"/>
+              </a:rPr>
+              <a:t>objects</a:t>
+            </a:r>
+          </a:p>
+        </p:txBody>
+      </p:sp>
+      <p:pic>
+        <p:nvPicPr>
+          <p:cNvPr id="34" name="Graphic 31">
+            <a:extLst>
+              <a:ext uri="{FF2B5EF4-FFF2-40B4-BE49-F238E27FC236}">
+                <a16:creationId xmlns:a16="http://schemas.microsoft.com/office/drawing/2014/main" id="{180563C1-EC42-7C46-8132-97562209160F}"/>
+              </a:ext>
+            </a:extLst>
+          </p:cNvPr>
+          <p:cNvPicPr>
+            <a:picLocks noChangeAspect="1" noChangeArrowheads="1"/>
+          </p:cNvPicPr>
+          <p:nvPr/>
+        </p:nvPicPr>
+        <p:blipFill>
+          <a:blip r:embed="rId5">
+            <a:extLst>
+              <a:ext uri="{96DAC541-7B7A-43D3-8B79-37D633B846F1}">
+                <asvg:svgBlip xmlns:asvg="http://schemas.microsoft.com/office/drawing/2016/SVG/main" r:embed="rId6"/>
+              </a:ext>
+            </a:extLst>
+          </a:blip>
+          <a:srcRect/>
+          <a:stretch/>
+        </p:blipFill>
+        <p:spPr bwMode="auto">
+          <a:xfrm>
+            <a:off x="2212664" y="2383824"/>
+            <a:ext cx="457200" cy="457200"/>
+          </a:xfrm>
+          <a:prstGeom prst="rect">
+            <a:avLst/>
+          </a:prstGeom>
+          <a:noFill/>
+          <a:ln>
+            <a:noFill/>
+          </a:ln>
+          <a:extLst>
+            <a:ext uri="{909E8E84-426E-40DD-AFC4-6F175D3DCCD1}">
+              <a14:hiddenFill xmlns:a14="http://schemas.microsoft.com/office/drawing/2010/main">
+                <a:solidFill>
+                  <a:srgbClr val="FFFFFF"/>
+                </a:solidFill>
+              </a14:hiddenFill>
+            </a:ext>
+            <a:ext uri="{91240B29-F687-4F45-9708-019B960494DF}">
+              <a14:hiddenLine xmlns:a14="http://schemas.microsoft.com/office/drawing/2010/main" w="9525">
+                <a:solidFill>
+                  <a:srgbClr val="000000"/>
+                </a:solidFill>
+                <a:miter lim="800000"/>
+                <a:headEnd/>
+                <a:tailEnd/>
+              </a14:hiddenLine>
+            </a:ext>
+          </a:extLst>
+        </p:spPr>
+      </p:pic>
+    </p:spTree>
+    <p:extLst>
+      <p:ext uri="{BB962C8B-B14F-4D97-AF65-F5344CB8AC3E}">
+        <p14:creationId xmlns:p14="http://schemas.microsoft.com/office/powerpoint/2010/main" val="1059370044"/>
       </p:ext>
     </p:extLst>
   </p:cSld>

</xml_diff>